<commit_message>
clone 코딩 ppt update
</commit_message>
<xml_diff>
--- a/QuantPricer 클론 코딩_240903.pptx
+++ b/QuantPricer 클론 코딩_240903.pptx
@@ -8,6 +8,12 @@
     <p:sldId id="256" r:id="rId2"/>
     <p:sldId id="257" r:id="rId3"/>
     <p:sldId id="258" r:id="rId4"/>
+    <p:sldId id="259" r:id="rId5"/>
+    <p:sldId id="260" r:id="rId6"/>
+    <p:sldId id="261" r:id="rId7"/>
+    <p:sldId id="262" r:id="rId8"/>
+    <p:sldId id="263" r:id="rId9"/>
+    <p:sldId id="264" r:id="rId10"/>
   </p:sldIdLst>
   <p:sldSz cx="12192000" cy="6858000"/>
   <p:notesSz cx="6858000" cy="9144000"/>
@@ -106,6 +112,11 @@
       </a:defRPr>
     </a:lvl9pPr>
   </p:defaultTextStyle>
+  <p:extLst>
+    <p:ext uri="{EFAFB233-063F-42B5-8137-9DF3F51BA10A}">
+      <p15:sldGuideLst xmlns:p15="http://schemas.microsoft.com/office/powerpoint/2012/main"/>
+    </p:ext>
+  </p:extLst>
 </p:presentation>
 </file>
 
@@ -256,7 +267,7 @@
           <a:p>
             <a:fld id="{A23CED58-2AEF-422A-BE86-0CBC138A03D3}" type="datetimeFigureOut">
               <a:rPr lang="ko-KR" altLang="en-US" smtClean="0"/>
-              <a:t>2024-09-03</a:t>
+              <a:t>2024-09-04</a:t>
             </a:fld>
             <a:endParaRPr lang="ko-KR" altLang="en-US"/>
           </a:p>
@@ -454,7 +465,7 @@
           <a:p>
             <a:fld id="{A23CED58-2AEF-422A-BE86-0CBC138A03D3}" type="datetimeFigureOut">
               <a:rPr lang="ko-KR" altLang="en-US" smtClean="0"/>
-              <a:t>2024-09-03</a:t>
+              <a:t>2024-09-04</a:t>
             </a:fld>
             <a:endParaRPr lang="ko-KR" altLang="en-US"/>
           </a:p>
@@ -662,7 +673,7 @@
           <a:p>
             <a:fld id="{A23CED58-2AEF-422A-BE86-0CBC138A03D3}" type="datetimeFigureOut">
               <a:rPr lang="ko-KR" altLang="en-US" smtClean="0"/>
-              <a:t>2024-09-03</a:t>
+              <a:t>2024-09-04</a:t>
             </a:fld>
             <a:endParaRPr lang="ko-KR" altLang="en-US"/>
           </a:p>
@@ -860,7 +871,7 @@
           <a:p>
             <a:fld id="{A23CED58-2AEF-422A-BE86-0CBC138A03D3}" type="datetimeFigureOut">
               <a:rPr lang="ko-KR" altLang="en-US" smtClean="0"/>
-              <a:t>2024-09-03</a:t>
+              <a:t>2024-09-04</a:t>
             </a:fld>
             <a:endParaRPr lang="ko-KR" altLang="en-US"/>
           </a:p>
@@ -1135,7 +1146,7 @@
           <a:p>
             <a:fld id="{A23CED58-2AEF-422A-BE86-0CBC138A03D3}" type="datetimeFigureOut">
               <a:rPr lang="ko-KR" altLang="en-US" smtClean="0"/>
-              <a:t>2024-09-03</a:t>
+              <a:t>2024-09-04</a:t>
             </a:fld>
             <a:endParaRPr lang="ko-KR" altLang="en-US"/>
           </a:p>
@@ -1400,7 +1411,7 @@
           <a:p>
             <a:fld id="{A23CED58-2AEF-422A-BE86-0CBC138A03D3}" type="datetimeFigureOut">
               <a:rPr lang="ko-KR" altLang="en-US" smtClean="0"/>
-              <a:t>2024-09-03</a:t>
+              <a:t>2024-09-04</a:t>
             </a:fld>
             <a:endParaRPr lang="ko-KR" altLang="en-US"/>
           </a:p>
@@ -1812,7 +1823,7 @@
           <a:p>
             <a:fld id="{A23CED58-2AEF-422A-BE86-0CBC138A03D3}" type="datetimeFigureOut">
               <a:rPr lang="ko-KR" altLang="en-US" smtClean="0"/>
-              <a:t>2024-09-03</a:t>
+              <a:t>2024-09-04</a:t>
             </a:fld>
             <a:endParaRPr lang="ko-KR" altLang="en-US"/>
           </a:p>
@@ -1953,7 +1964,7 @@
           <a:p>
             <a:fld id="{A23CED58-2AEF-422A-BE86-0CBC138A03D3}" type="datetimeFigureOut">
               <a:rPr lang="ko-KR" altLang="en-US" smtClean="0"/>
-              <a:t>2024-09-03</a:t>
+              <a:t>2024-09-04</a:t>
             </a:fld>
             <a:endParaRPr lang="ko-KR" altLang="en-US"/>
           </a:p>
@@ -2066,7 +2077,7 @@
           <a:p>
             <a:fld id="{A23CED58-2AEF-422A-BE86-0CBC138A03D3}" type="datetimeFigureOut">
               <a:rPr lang="ko-KR" altLang="en-US" smtClean="0"/>
-              <a:t>2024-09-03</a:t>
+              <a:t>2024-09-04</a:t>
             </a:fld>
             <a:endParaRPr lang="ko-KR" altLang="en-US"/>
           </a:p>
@@ -2377,7 +2388,7 @@
           <a:p>
             <a:fld id="{A23CED58-2AEF-422A-BE86-0CBC138A03D3}" type="datetimeFigureOut">
               <a:rPr lang="ko-KR" altLang="en-US" smtClean="0"/>
-              <a:t>2024-09-03</a:t>
+              <a:t>2024-09-04</a:t>
             </a:fld>
             <a:endParaRPr lang="ko-KR" altLang="en-US"/>
           </a:p>
@@ -2665,7 +2676,7 @@
           <a:p>
             <a:fld id="{A23CED58-2AEF-422A-BE86-0CBC138A03D3}" type="datetimeFigureOut">
               <a:rPr lang="ko-KR" altLang="en-US" smtClean="0"/>
-              <a:t>2024-09-03</a:t>
+              <a:t>2024-09-04</a:t>
             </a:fld>
             <a:endParaRPr lang="ko-KR" altLang="en-US"/>
           </a:p>
@@ -2906,7 +2917,7 @@
           <a:p>
             <a:fld id="{A23CED58-2AEF-422A-BE86-0CBC138A03D3}" type="datetimeFigureOut">
               <a:rPr lang="ko-KR" altLang="en-US" smtClean="0"/>
-              <a:t>2024-09-03</a:t>
+              <a:t>2024-09-04</a:t>
             </a:fld>
             <a:endParaRPr lang="ko-KR" altLang="en-US"/>
           </a:p>
@@ -3432,40 +3443,42 @@
         </p:nvSpPr>
         <p:spPr/>
         <p:txBody>
-          <a:bodyPr/>
-          <a:lstStyle/>
-          <a:p>
-            <a:r>
-              <a:rPr lang="ko-KR" altLang="en-US" dirty="0"/>
-              <a:t>준비 과정</a:t>
-            </a:r>
-          </a:p>
-        </p:txBody>
-      </p:sp>
-      <p:sp>
-        <p:nvSpPr>
-          <p:cNvPr id="3" name="내용 개체 틀 2">
-            <a:extLst>
-              <a:ext uri="{FF2B5EF4-FFF2-40B4-BE49-F238E27FC236}">
-                <a16:creationId xmlns:a16="http://schemas.microsoft.com/office/drawing/2014/main" id="{36DE592C-4F4E-EA91-0024-6723D1B57186}"/>
-              </a:ext>
-            </a:extLst>
-          </p:cNvPr>
-          <p:cNvSpPr>
-            <a:spLocks noGrp="1"/>
-          </p:cNvSpPr>
-          <p:nvPr>
-            <p:ph idx="1"/>
-          </p:nvPr>
-        </p:nvSpPr>
-        <p:spPr/>
-        <p:txBody>
           <a:bodyPr>
             <a:normAutofit/>
           </a:bodyPr>
           <a:lstStyle/>
           <a:p>
             <a:r>
+              <a:rPr lang="ko-KR" altLang="en-US" sz="3000" dirty="0"/>
+              <a:t>준비 과정</a:t>
+            </a:r>
+          </a:p>
+        </p:txBody>
+      </p:sp>
+      <p:sp>
+        <p:nvSpPr>
+          <p:cNvPr id="3" name="내용 개체 틀 2">
+            <a:extLst>
+              <a:ext uri="{FF2B5EF4-FFF2-40B4-BE49-F238E27FC236}">
+                <a16:creationId xmlns:a16="http://schemas.microsoft.com/office/drawing/2014/main" id="{36DE592C-4F4E-EA91-0024-6723D1B57186}"/>
+              </a:ext>
+            </a:extLst>
+          </p:cNvPr>
+          <p:cNvSpPr>
+            <a:spLocks noGrp="1"/>
+          </p:cNvSpPr>
+          <p:nvPr>
+            <p:ph idx="1"/>
+          </p:nvPr>
+        </p:nvSpPr>
+        <p:spPr/>
+        <p:txBody>
+          <a:bodyPr>
+            <a:normAutofit/>
+          </a:bodyPr>
+          <a:lstStyle/>
+          <a:p>
+            <a:r>
               <a:rPr lang="ko-KR" altLang="en-US" sz="1500" dirty="0"/>
               <a:t>새 프로젝트 생성</a:t>
             </a:r>
@@ -3576,7 +3589,47 @@
             </a:r>
             <a:r>
               <a:rPr lang="en-US" altLang="ko-KR" sz="1500" dirty="0"/>
-              <a:t>)</a:t>
+              <a:t>) (</a:t>
+            </a:r>
+            <a:r>
+              <a:rPr lang="ko-KR" altLang="en-US" sz="1500" dirty="0"/>
+              <a:t>보통 </a:t>
+            </a:r>
+            <a:r>
+              <a:rPr lang="en-US" altLang="ko-KR" sz="1500" dirty="0"/>
+              <a:t>XSD</a:t>
+            </a:r>
+            <a:r>
+              <a:rPr lang="ko-KR" altLang="en-US" sz="1500" dirty="0"/>
+              <a:t>가 미리 정의 되어 있고</a:t>
+            </a:r>
+            <a:r>
+              <a:rPr lang="en-US" altLang="ko-KR" sz="1500" dirty="0"/>
+              <a:t>,</a:t>
+            </a:r>
+            <a:r>
+              <a:rPr lang="ko-KR" altLang="en-US" sz="1500" dirty="0"/>
+              <a:t> 이 </a:t>
+            </a:r>
+            <a:r>
+              <a:rPr lang="en-US" altLang="ko-KR" sz="1500" dirty="0"/>
+              <a:t>XSD</a:t>
+            </a:r>
+            <a:r>
+              <a:rPr lang="ko-KR" altLang="en-US" sz="1500" dirty="0"/>
+              <a:t>를 바탕으로 해당 </a:t>
+            </a:r>
+            <a:r>
+              <a:rPr lang="en-US" altLang="ko-KR" sz="1500" dirty="0"/>
+              <a:t>java</a:t>
+            </a:r>
+            <a:r>
+              <a:rPr lang="ko-KR" altLang="en-US" sz="1500" dirty="0"/>
+              <a:t> 클래스를 생성한다</a:t>
+            </a:r>
+            <a:r>
+              <a:rPr lang="en-US" altLang="ko-KR" sz="1500" dirty="0"/>
+              <a:t>.)</a:t>
             </a:r>
           </a:p>
           <a:p>
@@ -3632,40 +3685,42 @@
         </p:nvSpPr>
         <p:spPr/>
         <p:txBody>
-          <a:bodyPr/>
-          <a:lstStyle/>
-          <a:p>
-            <a:r>
-              <a:rPr lang="ko-KR" altLang="en-US" dirty="0"/>
-              <a:t>추상 팩토리 패턴</a:t>
-            </a:r>
-          </a:p>
-        </p:txBody>
-      </p:sp>
-      <p:sp>
-        <p:nvSpPr>
-          <p:cNvPr id="3" name="내용 개체 틀 2">
-            <a:extLst>
-              <a:ext uri="{FF2B5EF4-FFF2-40B4-BE49-F238E27FC236}">
-                <a16:creationId xmlns:a16="http://schemas.microsoft.com/office/drawing/2014/main" id="{7A6EF342-1DE9-8B5F-76D4-EFA5127576B7}"/>
-              </a:ext>
-            </a:extLst>
-          </p:cNvPr>
-          <p:cNvSpPr>
-            <a:spLocks noGrp="1"/>
-          </p:cNvSpPr>
-          <p:nvPr>
-            <p:ph idx="1"/>
-          </p:nvPr>
-        </p:nvSpPr>
-        <p:spPr/>
-        <p:txBody>
           <a:bodyPr>
             <a:normAutofit/>
           </a:bodyPr>
           <a:lstStyle/>
           <a:p>
             <a:r>
+              <a:rPr lang="ko-KR" altLang="en-US" sz="3000" dirty="0"/>
+              <a:t>추상 팩토리 패턴</a:t>
+            </a:r>
+          </a:p>
+        </p:txBody>
+      </p:sp>
+      <p:sp>
+        <p:nvSpPr>
+          <p:cNvPr id="3" name="내용 개체 틀 2">
+            <a:extLst>
+              <a:ext uri="{FF2B5EF4-FFF2-40B4-BE49-F238E27FC236}">
+                <a16:creationId xmlns:a16="http://schemas.microsoft.com/office/drawing/2014/main" id="{7A6EF342-1DE9-8B5F-76D4-EFA5127576B7}"/>
+              </a:ext>
+            </a:extLst>
+          </p:cNvPr>
+          <p:cNvSpPr>
+            <a:spLocks noGrp="1"/>
+          </p:cNvSpPr>
+          <p:nvPr>
+            <p:ph idx="1"/>
+          </p:nvPr>
+        </p:nvSpPr>
+        <p:spPr/>
+        <p:txBody>
+          <a:bodyPr>
+            <a:normAutofit/>
+          </a:bodyPr>
+          <a:lstStyle/>
+          <a:p>
+            <a:r>
               <a:rPr lang="en-US" altLang="ko-KR" sz="1500" dirty="0"/>
               <a:t>Dividend</a:t>
             </a:r>
@@ -3706,10 +3761,9 @@
               <a:t> 데 이유</a:t>
             </a:r>
             <a:r>
-              <a:rPr lang="en-US" altLang="ko-KR" sz="1500"/>
+              <a:rPr lang="en-US" altLang="ko-KR" sz="1500" dirty="0"/>
               <a:t>?)</a:t>
             </a:r>
-            <a:endParaRPr lang="en-US" altLang="ko-KR" sz="1500" dirty="0"/>
           </a:p>
           <a:p>
             <a:r>
@@ -3793,6 +3847,1363 @@
     <p:extLst>
       <p:ext uri="{BB962C8B-B14F-4D97-AF65-F5344CB8AC3E}">
         <p14:creationId xmlns:p14="http://schemas.microsoft.com/office/powerpoint/2010/main" val="3802589177"/>
+      </p:ext>
+    </p:extLst>
+  </p:cSld>
+  <p:clrMapOvr>
+    <a:masterClrMapping/>
+  </p:clrMapOvr>
+</p:sld>
+</file>
+
+<file path=ppt/slides/slide4.xml><?xml version="1.0" encoding="utf-8"?>
+<p:sld xmlns:a="http://schemas.openxmlformats.org/drawingml/2006/main" xmlns:r="http://schemas.openxmlformats.org/officeDocument/2006/relationships" xmlns:p="http://schemas.openxmlformats.org/presentationml/2006/main">
+  <p:cSld>
+    <p:spTree>
+      <p:nvGrpSpPr>
+        <p:cNvPr id="1" name=""/>
+        <p:cNvGrpSpPr/>
+        <p:nvPr/>
+      </p:nvGrpSpPr>
+      <p:grpSpPr>
+        <a:xfrm>
+          <a:off x="0" y="0"/>
+          <a:ext cx="0" cy="0"/>
+          <a:chOff x="0" y="0"/>
+          <a:chExt cx="0" cy="0"/>
+        </a:xfrm>
+      </p:grpSpPr>
+      <p:sp>
+        <p:nvSpPr>
+          <p:cNvPr id="2" name="제목 1">
+            <a:extLst>
+              <a:ext uri="{FF2B5EF4-FFF2-40B4-BE49-F238E27FC236}">
+                <a16:creationId xmlns:a16="http://schemas.microsoft.com/office/drawing/2014/main" id="{9ECF9E28-3913-A75A-F973-95CFBD481E45}"/>
+              </a:ext>
+            </a:extLst>
+          </p:cNvPr>
+          <p:cNvSpPr>
+            <a:spLocks noGrp="1"/>
+          </p:cNvSpPr>
+          <p:nvPr>
+            <p:ph type="title"/>
+          </p:nvPr>
+        </p:nvSpPr>
+        <p:spPr/>
+        <p:txBody>
+          <a:bodyPr>
+            <a:normAutofit/>
+          </a:bodyPr>
+          <a:lstStyle/>
+          <a:p>
+            <a:r>
+              <a:rPr lang="en-US" altLang="ko-KR" sz="3000" dirty="0" err="1"/>
+              <a:t>CommonUtil</a:t>
+            </a:r>
+            <a:r>
+              <a:rPr lang="en-US" altLang="ko-KR" sz="3000" dirty="0"/>
+              <a:t>(Util)</a:t>
+            </a:r>
+            <a:endParaRPr lang="ko-KR" altLang="en-US" sz="3000" dirty="0"/>
+          </a:p>
+        </p:txBody>
+      </p:sp>
+      <p:sp>
+        <p:nvSpPr>
+          <p:cNvPr id="3" name="내용 개체 틀 2">
+            <a:extLst>
+              <a:ext uri="{FF2B5EF4-FFF2-40B4-BE49-F238E27FC236}">
+                <a16:creationId xmlns:a16="http://schemas.microsoft.com/office/drawing/2014/main" id="{534F0C85-D70A-454E-3FC9-3A4763883C8C}"/>
+              </a:ext>
+            </a:extLst>
+          </p:cNvPr>
+          <p:cNvSpPr>
+            <a:spLocks noGrp="1"/>
+          </p:cNvSpPr>
+          <p:nvPr>
+            <p:ph idx="1"/>
+          </p:nvPr>
+        </p:nvSpPr>
+        <p:spPr/>
+        <p:txBody>
+          <a:bodyPr>
+            <a:normAutofit/>
+          </a:bodyPr>
+          <a:lstStyle/>
+          <a:p>
+            <a:r>
+              <a:rPr lang="en-US" altLang="ko-KR" sz="1500" dirty="0" err="1"/>
+              <a:t>CommonUtil</a:t>
+            </a:r>
+            <a:endParaRPr lang="en-US" altLang="ko-KR" sz="1500" dirty="0"/>
+          </a:p>
+          <a:p>
+            <a:pPr marL="0" indent="0">
+              <a:buNone/>
+            </a:pPr>
+            <a:r>
+              <a:rPr lang="en-US" altLang="ko-KR" sz="1500" dirty="0" err="1"/>
+              <a:t>generateOutputFileName</a:t>
+            </a:r>
+            <a:r>
+              <a:rPr lang="en-US" altLang="ko-KR" sz="1500" dirty="0"/>
+              <a:t>: </a:t>
+            </a:r>
+            <a:r>
+              <a:rPr lang="ko-KR" altLang="en-US" sz="1500" dirty="0"/>
+              <a:t>평가 결과값을 저장하는 파일명 생성</a:t>
+            </a:r>
+            <a:endParaRPr lang="en-US" altLang="ko-KR" sz="1500" dirty="0"/>
+          </a:p>
+          <a:p>
+            <a:pPr marL="0" indent="0">
+              <a:buNone/>
+            </a:pPr>
+            <a:r>
+              <a:rPr lang="en-US" altLang="ko-KR" sz="1500" dirty="0" err="1"/>
+              <a:t>needGreeks</a:t>
+            </a:r>
+            <a:r>
+              <a:rPr lang="en-US" altLang="ko-KR" sz="1500" dirty="0"/>
+              <a:t>:</a:t>
+            </a:r>
+            <a:r>
+              <a:rPr lang="ko-KR" altLang="en-US" sz="1500" dirty="0"/>
+              <a:t> </a:t>
+            </a:r>
+            <a:r>
+              <a:rPr lang="en-US" altLang="ko-KR" sz="1500" dirty="0" err="1"/>
+              <a:t>CalculationType</a:t>
+            </a:r>
+            <a:r>
+              <a:rPr lang="en-US" altLang="ko-KR" sz="1500" dirty="0"/>
+              <a:t>(Enum)</a:t>
+            </a:r>
+            <a:r>
+              <a:rPr lang="ko-KR" altLang="en-US" sz="1500" dirty="0"/>
+              <a:t>값에 따라서</a:t>
+            </a:r>
+            <a:r>
+              <a:rPr lang="en-US" altLang="ko-KR" sz="1500" dirty="0"/>
+              <a:t>, </a:t>
+            </a:r>
+            <a:r>
+              <a:rPr lang="en-US" altLang="ko-KR" sz="1500" dirty="0" err="1"/>
+              <a:t>boolean</a:t>
+            </a:r>
+            <a:r>
+              <a:rPr lang="ko-KR" altLang="en-US" sz="1500" dirty="0"/>
+              <a:t>값 반환</a:t>
+            </a:r>
+            <a:endParaRPr lang="en-US" altLang="ko-KR" sz="1500" dirty="0"/>
+          </a:p>
+          <a:p>
+            <a:pPr marL="0" indent="0">
+              <a:buNone/>
+            </a:pPr>
+            <a:r>
+              <a:rPr lang="en-US" altLang="ko-KR" sz="1500" dirty="0" err="1"/>
+              <a:t>generateKey</a:t>
+            </a:r>
+            <a:r>
+              <a:rPr lang="en-US" altLang="ko-KR" sz="1500" dirty="0"/>
+              <a:t>:</a:t>
+            </a:r>
+            <a:r>
+              <a:rPr lang="ko-KR" altLang="en-US" sz="1500" dirty="0"/>
+              <a:t> </a:t>
+            </a:r>
+            <a:r>
+              <a:rPr lang="en-US" altLang="ko-KR" sz="1500" dirty="0"/>
+              <a:t>input</a:t>
+            </a:r>
+            <a:r>
+              <a:rPr lang="ko-KR" altLang="en-US" sz="1500" dirty="0"/>
+              <a:t>값에 따라 해당하는 </a:t>
+            </a:r>
+            <a:r>
+              <a:rPr lang="en-US" altLang="ko-KR" sz="1500" dirty="0"/>
+              <a:t>key </a:t>
+            </a:r>
+            <a:r>
+              <a:rPr lang="ko-KR" altLang="en-US" sz="1500" dirty="0"/>
+              <a:t>생성해서 반환</a:t>
+            </a:r>
+            <a:endParaRPr lang="en-US" altLang="ko-KR" sz="1500" dirty="0"/>
+          </a:p>
+          <a:p>
+            <a:pPr marL="0" indent="0">
+              <a:buNone/>
+            </a:pPr>
+            <a:r>
+              <a:rPr lang="en-US" altLang="ko-KR" sz="1500" dirty="0"/>
+              <a:t>Stream(list</a:t>
+            </a:r>
+            <a:r>
+              <a:rPr lang="ko-KR" altLang="en-US" sz="1500" dirty="0"/>
+              <a:t>를 </a:t>
+            </a:r>
+            <a:r>
+              <a:rPr lang="en-US" altLang="ko-KR" sz="1500" dirty="0"/>
+              <a:t>stream</a:t>
+            </a:r>
+            <a:r>
+              <a:rPr lang="ko-KR" altLang="en-US" sz="1500" dirty="0"/>
+              <a:t>형태로 변환</a:t>
+            </a:r>
+            <a:r>
+              <a:rPr lang="en-US" altLang="ko-KR" sz="1500" dirty="0"/>
+              <a:t>)&gt;map(</a:t>
+            </a:r>
+            <a:r>
+              <a:rPr lang="ko-KR" altLang="en-US" sz="1500" dirty="0"/>
+              <a:t>해당 객체의 </a:t>
+            </a:r>
+            <a:r>
+              <a:rPr lang="en-US" altLang="ko-KR" sz="1500" dirty="0"/>
+              <a:t>value property Big Decimal type return)&gt;reduce(</a:t>
+            </a:r>
+            <a:r>
+              <a:rPr lang="ko-KR" altLang="en-US" sz="1500" dirty="0"/>
+              <a:t>조건에 </a:t>
+            </a:r>
+            <a:r>
+              <a:rPr lang="en-US" altLang="ko-KR" sz="1500" dirty="0"/>
+              <a:t>add</a:t>
+            </a:r>
+            <a:r>
+              <a:rPr lang="ko-KR" altLang="en-US" sz="1500" dirty="0"/>
+              <a:t>와 </a:t>
+            </a:r>
+            <a:r>
+              <a:rPr lang="en-US" altLang="ko-KR" sz="1500" dirty="0"/>
+              <a:t>0</a:t>
+            </a:r>
+            <a:r>
+              <a:rPr lang="ko-KR" altLang="en-US" sz="1500" dirty="0"/>
+              <a:t>를</a:t>
+            </a:r>
+            <a:r>
+              <a:rPr lang="en-US" altLang="ko-KR" sz="1500" dirty="0"/>
+              <a:t> </a:t>
+            </a:r>
+            <a:r>
+              <a:rPr lang="ko-KR" altLang="en-US" sz="1500" dirty="0"/>
+              <a:t>넣어서 해당 </a:t>
+            </a:r>
+            <a:r>
+              <a:rPr lang="en-US" altLang="ko-KR" sz="1500" dirty="0"/>
+              <a:t>stream</a:t>
+            </a:r>
+            <a:r>
+              <a:rPr lang="ko-KR" altLang="en-US" sz="1500" dirty="0"/>
+              <a:t>의 요소를 </a:t>
+            </a:r>
+            <a:r>
+              <a:rPr lang="en-US" altLang="ko-KR" sz="1500" dirty="0"/>
+              <a:t>0</a:t>
+            </a:r>
+            <a:r>
+              <a:rPr lang="ko-KR" altLang="en-US" sz="1500" dirty="0"/>
+              <a:t>부터 다 </a:t>
+            </a:r>
+            <a:r>
+              <a:rPr lang="ko-KR" altLang="en-US" sz="1500" dirty="0" err="1"/>
+              <a:t>더해줌</a:t>
+            </a:r>
+            <a:r>
+              <a:rPr lang="en-US" altLang="ko-KR" sz="1500" dirty="0"/>
+              <a:t>)</a:t>
+            </a:r>
+          </a:p>
+          <a:p>
+            <a:pPr marL="0" indent="0">
+              <a:buNone/>
+            </a:pPr>
+            <a:r>
+              <a:rPr lang="en-US" altLang="ko-KR" sz="1500" dirty="0"/>
+              <a:t>Stream &gt; filter(</a:t>
+            </a:r>
+            <a:r>
+              <a:rPr lang="ko-KR" altLang="en-US" sz="1500" dirty="0"/>
+              <a:t>괄호안에 </a:t>
+            </a:r>
+            <a:r>
+              <a:rPr lang="en-US" altLang="ko-KR" sz="1500" dirty="0"/>
+              <a:t>predicate</a:t>
+            </a:r>
+            <a:r>
+              <a:rPr lang="ko-KR" altLang="en-US" sz="1500" dirty="0"/>
+              <a:t>가 들어가서</a:t>
+            </a:r>
+            <a:r>
+              <a:rPr lang="en-US" altLang="ko-KR" sz="1500" dirty="0"/>
+              <a:t>, </a:t>
+            </a:r>
+            <a:r>
+              <a:rPr lang="ko-KR" altLang="en-US" sz="1500" dirty="0"/>
+              <a:t>조건에 해당하는 경우</a:t>
+            </a:r>
+            <a:r>
+              <a:rPr lang="en-US" altLang="ko-KR" sz="1500" dirty="0"/>
+              <a:t>(true)</a:t>
+            </a:r>
+            <a:r>
+              <a:rPr lang="ko-KR" altLang="en-US" sz="1500" dirty="0"/>
+              <a:t>의 </a:t>
+            </a:r>
+            <a:r>
+              <a:rPr lang="en-US" altLang="ko-KR" sz="1500" dirty="0"/>
+              <a:t>element</a:t>
+            </a:r>
+            <a:r>
+              <a:rPr lang="ko-KR" altLang="en-US" sz="1500" dirty="0"/>
+              <a:t>만 남기고</a:t>
+            </a:r>
+            <a:r>
+              <a:rPr lang="en-US" altLang="ko-KR" sz="1500" dirty="0"/>
+              <a:t>, </a:t>
+            </a:r>
+            <a:r>
+              <a:rPr lang="ko-KR" altLang="en-US" sz="1500" dirty="0"/>
+              <a:t>나머지 </a:t>
+            </a:r>
+            <a:r>
+              <a:rPr lang="en-US" altLang="ko-KR" sz="1500" dirty="0"/>
+              <a:t>element</a:t>
+            </a:r>
+            <a:r>
+              <a:rPr lang="ko-KR" altLang="en-US" sz="1500" dirty="0"/>
+              <a:t>는 제거</a:t>
+            </a:r>
+            <a:r>
+              <a:rPr lang="en-US" altLang="ko-KR" sz="1500" dirty="0"/>
+              <a:t>) &gt;</a:t>
+            </a:r>
+            <a:r>
+              <a:rPr lang="en-US" altLang="ko-KR" sz="1500" dirty="0" err="1"/>
+              <a:t>findFirst</a:t>
+            </a:r>
+            <a:r>
+              <a:rPr lang="en-US" altLang="ko-KR" sz="1500" dirty="0"/>
+              <a:t>(): Stream</a:t>
+            </a:r>
+            <a:r>
+              <a:rPr lang="ko-KR" altLang="en-US" sz="1500" dirty="0"/>
+              <a:t>의 첫번째 요소 반환 </a:t>
+            </a:r>
+            <a:r>
+              <a:rPr lang="en-US" altLang="ko-KR" sz="1500" dirty="0"/>
+              <a:t>&gt; </a:t>
+            </a:r>
+            <a:r>
+              <a:rPr lang="en-US" altLang="ko-KR" sz="1500" dirty="0" err="1"/>
+              <a:t>orElseThrow</a:t>
+            </a:r>
+            <a:r>
+              <a:rPr lang="en-US" altLang="ko-KR" sz="1500" dirty="0"/>
+              <a:t>()</a:t>
+            </a:r>
+            <a:r>
+              <a:rPr lang="ko-KR" altLang="en-US" sz="1500" dirty="0"/>
+              <a:t> 해당되는 요소가 없을 시</a:t>
+            </a:r>
+            <a:r>
+              <a:rPr lang="en-US" altLang="ko-KR" sz="1500" dirty="0"/>
+              <a:t>, Exception </a:t>
+            </a:r>
+            <a:r>
+              <a:rPr lang="ko-KR" altLang="en-US" sz="1500" dirty="0"/>
+              <a:t>발생</a:t>
+            </a:r>
+            <a:r>
+              <a:rPr lang="en-US" altLang="ko-KR" sz="1500" dirty="0"/>
+              <a:t>.</a:t>
+            </a:r>
+          </a:p>
+          <a:p>
+            <a:pPr marL="0" indent="0">
+              <a:buNone/>
+            </a:pPr>
+            <a:r>
+              <a:rPr lang="en-US" altLang="ko-KR" sz="1500" dirty="0" err="1"/>
+              <a:t>UnderLyingType</a:t>
+            </a:r>
+            <a:r>
+              <a:rPr lang="en-US" altLang="ko-KR" sz="1500" dirty="0"/>
+              <a:t> (Enum)</a:t>
+            </a:r>
+          </a:p>
+          <a:p>
+            <a:pPr marL="0" indent="0">
+              <a:buNone/>
+            </a:pPr>
+            <a:r>
+              <a:rPr lang="en-US" altLang="ko-KR" sz="1500" dirty="0"/>
+              <a:t>STOCK_INDEX (Enum constant)</a:t>
+            </a:r>
+          </a:p>
+          <a:p>
+            <a:pPr marL="0" indent="0">
+              <a:buNone/>
+            </a:pPr>
+            <a:r>
+              <a:rPr lang="en-US" altLang="ko-KR" sz="1500" dirty="0" err="1"/>
+              <a:t>StockIndex</a:t>
+            </a:r>
+            <a:r>
+              <a:rPr lang="en-US" altLang="ko-KR" sz="1500" dirty="0"/>
+              <a:t>(String value of Enum constant)</a:t>
+            </a:r>
+          </a:p>
+        </p:txBody>
+      </p:sp>
+    </p:spTree>
+    <p:extLst>
+      <p:ext uri="{BB962C8B-B14F-4D97-AF65-F5344CB8AC3E}">
+        <p14:creationId xmlns:p14="http://schemas.microsoft.com/office/powerpoint/2010/main" val="1289471368"/>
+      </p:ext>
+    </p:extLst>
+  </p:cSld>
+  <p:clrMapOvr>
+    <a:masterClrMapping/>
+  </p:clrMapOvr>
+</p:sld>
+</file>
+
+<file path=ppt/slides/slide5.xml><?xml version="1.0" encoding="utf-8"?>
+<p:sld xmlns:a="http://schemas.openxmlformats.org/drawingml/2006/main" xmlns:r="http://schemas.openxmlformats.org/officeDocument/2006/relationships" xmlns:p="http://schemas.openxmlformats.org/presentationml/2006/main">
+  <p:cSld>
+    <p:spTree>
+      <p:nvGrpSpPr>
+        <p:cNvPr id="1" name=""/>
+        <p:cNvGrpSpPr/>
+        <p:nvPr/>
+      </p:nvGrpSpPr>
+      <p:grpSpPr>
+        <a:xfrm>
+          <a:off x="0" y="0"/>
+          <a:ext cx="0" cy="0"/>
+          <a:chOff x="0" y="0"/>
+          <a:chExt cx="0" cy="0"/>
+        </a:xfrm>
+      </p:grpSpPr>
+      <p:sp>
+        <p:nvSpPr>
+          <p:cNvPr id="2" name="제목 1">
+            <a:extLst>
+              <a:ext uri="{FF2B5EF4-FFF2-40B4-BE49-F238E27FC236}">
+                <a16:creationId xmlns:a16="http://schemas.microsoft.com/office/drawing/2014/main" id="{B7D6102D-EC93-955D-5AF3-3E9B073EB8AE}"/>
+              </a:ext>
+            </a:extLst>
+          </p:cNvPr>
+          <p:cNvSpPr>
+            <a:spLocks noGrp="1"/>
+          </p:cNvSpPr>
+          <p:nvPr>
+            <p:ph type="title"/>
+          </p:nvPr>
+        </p:nvSpPr>
+        <p:spPr/>
+        <p:txBody>
+          <a:bodyPr>
+            <a:normAutofit/>
+          </a:bodyPr>
+          <a:lstStyle/>
+          <a:p>
+            <a:r>
+              <a:rPr lang="en-US" altLang="ko-KR" sz="3000" dirty="0" err="1"/>
+              <a:t>DataSetUtil</a:t>
+            </a:r>
+            <a:r>
+              <a:rPr lang="en-US" altLang="ko-KR" sz="3000" dirty="0"/>
+              <a:t>(Util)</a:t>
+            </a:r>
+            <a:endParaRPr lang="ko-KR" altLang="en-US" sz="3000" dirty="0"/>
+          </a:p>
+        </p:txBody>
+      </p:sp>
+      <p:sp>
+        <p:nvSpPr>
+          <p:cNvPr id="3" name="내용 개체 틀 2">
+            <a:extLst>
+              <a:ext uri="{FF2B5EF4-FFF2-40B4-BE49-F238E27FC236}">
+                <a16:creationId xmlns:a16="http://schemas.microsoft.com/office/drawing/2014/main" id="{1CD28A30-E21D-0544-E36B-04262AAAACF0}"/>
+              </a:ext>
+            </a:extLst>
+          </p:cNvPr>
+          <p:cNvSpPr>
+            <a:spLocks noGrp="1"/>
+          </p:cNvSpPr>
+          <p:nvPr>
+            <p:ph idx="1"/>
+          </p:nvPr>
+        </p:nvSpPr>
+        <p:spPr/>
+        <p:txBody>
+          <a:bodyPr>
+            <a:normAutofit/>
+          </a:bodyPr>
+          <a:lstStyle/>
+          <a:p>
+            <a:r>
+              <a:rPr lang="en-US" altLang="ko-KR" sz="1500" dirty="0" err="1"/>
+              <a:t>compareTo</a:t>
+            </a:r>
+            <a:r>
+              <a:rPr lang="ko-KR" altLang="en-US" sz="1500" dirty="0"/>
+              <a:t>는 </a:t>
+            </a:r>
+            <a:r>
+              <a:rPr lang="en-US" altLang="ko-KR" sz="1500" dirty="0"/>
+              <a:t>-1, 0, 1</a:t>
+            </a:r>
+            <a:r>
+              <a:rPr lang="ko-KR" altLang="en-US" sz="1500" dirty="0"/>
+              <a:t>을 반환한다</a:t>
+            </a:r>
+            <a:r>
+              <a:rPr lang="en-US" altLang="ko-KR" sz="1500" dirty="0"/>
+              <a:t>. (</a:t>
+            </a:r>
+            <a:r>
+              <a:rPr lang="ko-KR" altLang="en-US" sz="1500" dirty="0"/>
+              <a:t>비교하는 대상과 </a:t>
+            </a:r>
+            <a:r>
+              <a:rPr lang="en-US" altLang="ko-KR" sz="1500" dirty="0"/>
+              <a:t>parameter</a:t>
+            </a:r>
+            <a:r>
+              <a:rPr lang="ko-KR" altLang="en-US" sz="1500" dirty="0"/>
+              <a:t>의 값 크기 비교</a:t>
+            </a:r>
+            <a:r>
+              <a:rPr lang="en-US" altLang="ko-KR" sz="1500" dirty="0"/>
+              <a:t>)</a:t>
+            </a:r>
+          </a:p>
+          <a:p>
+            <a:r>
+              <a:rPr lang="en-US" altLang="ko-KR" sz="1500" dirty="0" err="1"/>
+              <a:t>yieldCurve</a:t>
+            </a:r>
+            <a:endParaRPr lang="en-US" altLang="ko-KR" sz="1500" dirty="0"/>
+          </a:p>
+          <a:p>
+            <a:r>
+              <a:rPr lang="en-US" altLang="ko-KR" sz="1500" dirty="0"/>
+              <a:t>Price</a:t>
+            </a:r>
+          </a:p>
+          <a:p>
+            <a:endParaRPr lang="en-US" altLang="ko-KR" sz="1500" dirty="0"/>
+          </a:p>
+          <a:p>
+            <a:pPr marL="0" indent="0">
+              <a:buNone/>
+            </a:pPr>
+            <a:endParaRPr lang="en-US" altLang="ko-KR" sz="1500" dirty="0"/>
+          </a:p>
+          <a:p>
+            <a:pPr marL="0" indent="0">
+              <a:buNone/>
+            </a:pPr>
+            <a:r>
+              <a:rPr lang="en-US" altLang="ko-KR" sz="1500" dirty="0"/>
+              <a:t>List&lt;Double&gt;</a:t>
+            </a:r>
+            <a:r>
+              <a:rPr lang="ko-KR" altLang="en-US" sz="1500" dirty="0"/>
+              <a:t>인 </a:t>
+            </a:r>
+            <a:r>
+              <a:rPr lang="en-US" altLang="ko-KR" sz="1500" dirty="0"/>
+              <a:t>prices</a:t>
+            </a:r>
+            <a:r>
+              <a:rPr lang="ko-KR" altLang="en-US" sz="1500" dirty="0"/>
+              <a:t>를 </a:t>
+            </a:r>
+            <a:r>
+              <a:rPr lang="en-US" altLang="ko-KR" sz="1500" dirty="0"/>
+              <a:t>stream</a:t>
+            </a:r>
+            <a:r>
+              <a:rPr lang="ko-KR" altLang="en-US" sz="1500" dirty="0"/>
+              <a:t>으로 변경</a:t>
+            </a:r>
+            <a:r>
+              <a:rPr lang="en-US" altLang="ko-KR" sz="1500" dirty="0"/>
+              <a:t>. </a:t>
+            </a:r>
+            <a:r>
+              <a:rPr lang="en-US" altLang="ko-KR" sz="1500" dirty="0" err="1"/>
+              <a:t>mapToDouble</a:t>
+            </a:r>
+            <a:r>
+              <a:rPr lang="ko-KR" altLang="en-US" sz="1500" dirty="0"/>
+              <a:t>을 이용해서 </a:t>
+            </a:r>
+            <a:r>
+              <a:rPr lang="en-US" altLang="ko-KR" sz="1500" dirty="0"/>
+              <a:t>Double wrapper type</a:t>
+            </a:r>
+            <a:r>
+              <a:rPr lang="ko-KR" altLang="en-US" sz="1500" dirty="0"/>
+              <a:t>을 </a:t>
+            </a:r>
+            <a:r>
+              <a:rPr lang="en-US" altLang="ko-KR" sz="1500" dirty="0"/>
+              <a:t>double primitive type</a:t>
+            </a:r>
+            <a:r>
+              <a:rPr lang="ko-KR" altLang="en-US" sz="1500" dirty="0"/>
+              <a:t>으로 바꾼다</a:t>
+            </a:r>
+            <a:r>
+              <a:rPr lang="en-US" altLang="ko-KR" sz="1500" dirty="0"/>
+              <a:t>. </a:t>
+            </a:r>
+            <a:r>
+              <a:rPr lang="ko-KR" altLang="en-US" sz="1500" dirty="0"/>
+              <a:t>다음 </a:t>
+            </a:r>
+            <a:r>
+              <a:rPr lang="en-US" altLang="ko-KR" sz="1500" dirty="0" err="1"/>
+              <a:t>toArray</a:t>
+            </a:r>
+            <a:r>
+              <a:rPr lang="ko-KR" altLang="en-US" sz="1500" dirty="0"/>
+              <a:t>를 호출해 </a:t>
+            </a:r>
+            <a:r>
+              <a:rPr lang="en-US" altLang="ko-KR" sz="1500" dirty="0"/>
+              <a:t>double [] (array)</a:t>
+            </a:r>
+            <a:r>
+              <a:rPr lang="ko-KR" altLang="en-US" sz="1500" dirty="0"/>
+              <a:t>로 바꾼다</a:t>
+            </a:r>
+            <a:r>
+              <a:rPr lang="en-US" altLang="ko-KR" sz="1500"/>
+              <a:t>.</a:t>
+            </a:r>
+            <a:endParaRPr lang="en-US" altLang="ko-KR" sz="1500" dirty="0"/>
+          </a:p>
+          <a:p>
+            <a:endParaRPr lang="ko-KR" altLang="en-US" sz="1500" dirty="0"/>
+          </a:p>
+        </p:txBody>
+      </p:sp>
+      <p:pic>
+        <p:nvPicPr>
+          <p:cNvPr id="5" name="그림 4">
+            <a:extLst>
+              <a:ext uri="{FF2B5EF4-FFF2-40B4-BE49-F238E27FC236}">
+                <a16:creationId xmlns:a16="http://schemas.microsoft.com/office/drawing/2014/main" id="{1632F07E-E88F-FE6E-E56C-D6DB7522A506}"/>
+              </a:ext>
+            </a:extLst>
+          </p:cNvPr>
+          <p:cNvPicPr>
+            <a:picLocks noChangeAspect="1"/>
+          </p:cNvPicPr>
+          <p:nvPr/>
+        </p:nvPicPr>
+        <p:blipFill>
+          <a:blip r:embed="rId2"/>
+          <a:stretch>
+            <a:fillRect/>
+          </a:stretch>
+        </p:blipFill>
+        <p:spPr>
+          <a:xfrm>
+            <a:off x="838200" y="2916674"/>
+            <a:ext cx="6972300" cy="409575"/>
+          </a:xfrm>
+          <a:prstGeom prst="rect">
+            <a:avLst/>
+          </a:prstGeom>
+        </p:spPr>
+      </p:pic>
+    </p:spTree>
+    <p:extLst>
+      <p:ext uri="{BB962C8B-B14F-4D97-AF65-F5344CB8AC3E}">
+        <p14:creationId xmlns:p14="http://schemas.microsoft.com/office/powerpoint/2010/main" val="1972438564"/>
+      </p:ext>
+    </p:extLst>
+  </p:cSld>
+  <p:clrMapOvr>
+    <a:masterClrMapping/>
+  </p:clrMapOvr>
+</p:sld>
+</file>
+
+<file path=ppt/slides/slide6.xml><?xml version="1.0" encoding="utf-8"?>
+<p:sld xmlns:a="http://schemas.openxmlformats.org/drawingml/2006/main" xmlns:r="http://schemas.openxmlformats.org/officeDocument/2006/relationships" xmlns:p="http://schemas.openxmlformats.org/presentationml/2006/main">
+  <p:cSld>
+    <p:spTree>
+      <p:nvGrpSpPr>
+        <p:cNvPr id="1" name=""/>
+        <p:cNvGrpSpPr/>
+        <p:nvPr/>
+      </p:nvGrpSpPr>
+      <p:grpSpPr>
+        <a:xfrm>
+          <a:off x="0" y="0"/>
+          <a:ext cx="0" cy="0"/>
+          <a:chOff x="0" y="0"/>
+          <a:chExt cx="0" cy="0"/>
+        </a:xfrm>
+      </p:grpSpPr>
+      <p:sp>
+        <p:nvSpPr>
+          <p:cNvPr id="2" name="제목 1">
+            <a:extLst>
+              <a:ext uri="{FF2B5EF4-FFF2-40B4-BE49-F238E27FC236}">
+                <a16:creationId xmlns:a16="http://schemas.microsoft.com/office/drawing/2014/main" id="{C77CE1BC-0D52-7969-39CE-31357A258949}"/>
+              </a:ext>
+            </a:extLst>
+          </p:cNvPr>
+          <p:cNvSpPr>
+            <a:spLocks noGrp="1"/>
+          </p:cNvSpPr>
+          <p:nvPr>
+            <p:ph type="title"/>
+          </p:nvPr>
+        </p:nvSpPr>
+        <p:spPr/>
+        <p:txBody>
+          <a:bodyPr>
+            <a:normAutofit/>
+          </a:bodyPr>
+          <a:lstStyle/>
+          <a:p>
+            <a:r>
+              <a:rPr lang="en-US" altLang="ko-KR" sz="3000" dirty="0" err="1"/>
+              <a:t>InputFileReader</a:t>
+            </a:r>
+            <a:r>
+              <a:rPr lang="en-US" altLang="ko-KR" sz="3000" dirty="0"/>
+              <a:t>(util)</a:t>
+            </a:r>
+            <a:endParaRPr lang="ko-KR" altLang="en-US" sz="3000" dirty="0"/>
+          </a:p>
+        </p:txBody>
+      </p:sp>
+      <p:sp>
+        <p:nvSpPr>
+          <p:cNvPr id="3" name="내용 개체 틀 2">
+            <a:extLst>
+              <a:ext uri="{FF2B5EF4-FFF2-40B4-BE49-F238E27FC236}">
+                <a16:creationId xmlns:a16="http://schemas.microsoft.com/office/drawing/2014/main" id="{8DAA5F34-3377-E313-E26F-CA64E466CC07}"/>
+              </a:ext>
+            </a:extLst>
+          </p:cNvPr>
+          <p:cNvSpPr>
+            <a:spLocks noGrp="1"/>
+          </p:cNvSpPr>
+          <p:nvPr>
+            <p:ph idx="1"/>
+          </p:nvPr>
+        </p:nvSpPr>
+        <p:spPr/>
+        <p:txBody>
+          <a:bodyPr>
+            <a:normAutofit/>
+          </a:bodyPr>
+          <a:lstStyle/>
+          <a:p>
+            <a:r>
+              <a:rPr lang="en-US" altLang="ko-KR" sz="1500" dirty="0"/>
+              <a:t>Property: </a:t>
+            </a:r>
+            <a:r>
+              <a:rPr lang="en-US" altLang="ko-KR" sz="1500" dirty="0" err="1"/>
+              <a:t>rootDir</a:t>
+            </a:r>
+            <a:r>
+              <a:rPr lang="en-US" altLang="ko-KR" sz="1500" dirty="0"/>
+              <a:t> (String);</a:t>
+            </a:r>
+          </a:p>
+          <a:p>
+            <a:r>
+              <a:rPr lang="en-US" altLang="ko-KR" sz="1500" dirty="0"/>
+              <a:t>Setter:</a:t>
+            </a:r>
+            <a:r>
+              <a:rPr lang="ko-KR" altLang="en-US" sz="1500" dirty="0"/>
+              <a:t> </a:t>
+            </a:r>
+            <a:r>
+              <a:rPr lang="en-US" altLang="ko-KR" sz="1500" dirty="0" err="1"/>
+              <a:t>rootDir</a:t>
+            </a:r>
+            <a:endParaRPr lang="en-US" altLang="ko-KR" sz="1500" dirty="0"/>
+          </a:p>
+          <a:p>
+            <a:r>
+              <a:rPr lang="en-US" altLang="ko-KR" sz="1500" dirty="0"/>
+              <a:t>Method </a:t>
+            </a:r>
+            <a:r>
+              <a:rPr lang="en-US" altLang="ko-KR" sz="1500" dirty="0" err="1"/>
+              <a:t>readInputXml</a:t>
+            </a:r>
+            <a:endParaRPr lang="en-US" altLang="ko-KR" sz="1500" dirty="0"/>
+          </a:p>
+          <a:p>
+            <a:pPr marL="0" indent="0">
+              <a:buNone/>
+            </a:pPr>
+            <a:r>
+              <a:rPr lang="en-US" altLang="ko-KR" sz="1500" dirty="0"/>
+              <a:t>Param: </a:t>
+            </a:r>
+            <a:r>
+              <a:rPr lang="en-US" altLang="ko-KR" sz="1500" dirty="0" err="1"/>
+              <a:t>inputFileName</a:t>
+            </a:r>
+            <a:r>
+              <a:rPr lang="en-US" altLang="ko-KR" sz="1500" dirty="0"/>
+              <a:t>(String)</a:t>
+            </a:r>
+          </a:p>
+          <a:p>
+            <a:pPr marL="0" indent="0">
+              <a:buNone/>
+            </a:pPr>
+            <a:r>
+              <a:rPr lang="en-US" altLang="ko-KR" sz="1500" dirty="0"/>
+              <a:t>Return: String</a:t>
+            </a:r>
+          </a:p>
+          <a:p>
+            <a:pPr marL="0" indent="0">
+              <a:buNone/>
+            </a:pPr>
+            <a:r>
+              <a:rPr lang="en-US" altLang="ko-KR" sz="1500" dirty="0" err="1"/>
+              <a:t>inputFile</a:t>
+            </a:r>
+            <a:r>
+              <a:rPr lang="ko-KR" altLang="en-US" sz="1500" dirty="0"/>
+              <a:t>의 내용을 </a:t>
+            </a:r>
+            <a:r>
+              <a:rPr lang="ko-KR" altLang="en-US" sz="1500" dirty="0" err="1"/>
+              <a:t>한줄</a:t>
+            </a:r>
+            <a:r>
+              <a:rPr lang="ko-KR" altLang="en-US" sz="1500" dirty="0"/>
+              <a:t> </a:t>
+            </a:r>
+            <a:r>
+              <a:rPr lang="ko-KR" altLang="en-US" sz="1500" dirty="0" err="1"/>
+              <a:t>한줄</a:t>
+            </a:r>
+            <a:r>
+              <a:rPr lang="ko-KR" altLang="en-US" sz="1500" dirty="0"/>
+              <a:t> 읽어서</a:t>
+            </a:r>
+            <a:r>
+              <a:rPr lang="en-US" altLang="ko-KR" sz="1500" dirty="0"/>
+              <a:t>, </a:t>
+            </a:r>
+            <a:r>
+              <a:rPr lang="ko-KR" altLang="en-US" sz="1500" dirty="0" err="1"/>
+              <a:t>한줄</a:t>
+            </a:r>
+            <a:r>
+              <a:rPr lang="ko-KR" altLang="en-US" sz="1500" dirty="0"/>
+              <a:t> </a:t>
+            </a:r>
+            <a:r>
+              <a:rPr lang="ko-KR" altLang="en-US" sz="1500" dirty="0" err="1"/>
+              <a:t>한줄</a:t>
+            </a:r>
+            <a:r>
+              <a:rPr lang="ko-KR" altLang="en-US" sz="1500" dirty="0"/>
+              <a:t> 분리된 </a:t>
+            </a:r>
+            <a:r>
+              <a:rPr lang="en-US" altLang="ko-KR" sz="1500" dirty="0"/>
+              <a:t>String</a:t>
+            </a:r>
+            <a:r>
+              <a:rPr lang="ko-KR" altLang="en-US" sz="1500" dirty="0"/>
+              <a:t>으로 반환한다</a:t>
+            </a:r>
+            <a:r>
+              <a:rPr lang="en-US" altLang="ko-KR" sz="1500" dirty="0"/>
+              <a:t>.</a:t>
+            </a:r>
+            <a:endParaRPr lang="ko-KR" altLang="en-US" sz="1500" dirty="0"/>
+          </a:p>
+        </p:txBody>
+      </p:sp>
+    </p:spTree>
+    <p:extLst>
+      <p:ext uri="{BB962C8B-B14F-4D97-AF65-F5344CB8AC3E}">
+        <p14:creationId xmlns:p14="http://schemas.microsoft.com/office/powerpoint/2010/main" val="3899642307"/>
+      </p:ext>
+    </p:extLst>
+  </p:cSld>
+  <p:clrMapOvr>
+    <a:masterClrMapping/>
+  </p:clrMapOvr>
+</p:sld>
+</file>
+
+<file path=ppt/slides/slide7.xml><?xml version="1.0" encoding="utf-8"?>
+<p:sld xmlns:a="http://schemas.openxmlformats.org/drawingml/2006/main" xmlns:r="http://schemas.openxmlformats.org/officeDocument/2006/relationships" xmlns:p="http://schemas.openxmlformats.org/presentationml/2006/main">
+  <p:cSld>
+    <p:spTree>
+      <p:nvGrpSpPr>
+        <p:cNvPr id="1" name=""/>
+        <p:cNvGrpSpPr/>
+        <p:nvPr/>
+      </p:nvGrpSpPr>
+      <p:grpSpPr>
+        <a:xfrm>
+          <a:off x="0" y="0"/>
+          <a:ext cx="0" cy="0"/>
+          <a:chOff x="0" y="0"/>
+          <a:chExt cx="0" cy="0"/>
+        </a:xfrm>
+      </p:grpSpPr>
+      <p:sp>
+        <p:nvSpPr>
+          <p:cNvPr id="2" name="제목 1">
+            <a:extLst>
+              <a:ext uri="{FF2B5EF4-FFF2-40B4-BE49-F238E27FC236}">
+                <a16:creationId xmlns:a16="http://schemas.microsoft.com/office/drawing/2014/main" id="{C95F2C8A-CB3C-DF58-3AD3-06548E533F39}"/>
+              </a:ext>
+            </a:extLst>
+          </p:cNvPr>
+          <p:cNvSpPr>
+            <a:spLocks noGrp="1"/>
+          </p:cNvSpPr>
+          <p:nvPr>
+            <p:ph type="title"/>
+          </p:nvPr>
+        </p:nvSpPr>
+        <p:spPr/>
+        <p:txBody>
+          <a:bodyPr>
+            <a:normAutofit/>
+          </a:bodyPr>
+          <a:lstStyle/>
+          <a:p>
+            <a:r>
+              <a:rPr lang="en-US" altLang="ko-KR" sz="3000" dirty="0" err="1"/>
+              <a:t>OutputFileWriter</a:t>
+            </a:r>
+            <a:r>
+              <a:rPr lang="en-US" altLang="ko-KR" sz="3000" dirty="0"/>
+              <a:t>(util)</a:t>
+            </a:r>
+            <a:endParaRPr lang="ko-KR" altLang="en-US" sz="3000" dirty="0"/>
+          </a:p>
+        </p:txBody>
+      </p:sp>
+      <p:sp>
+        <p:nvSpPr>
+          <p:cNvPr id="3" name="내용 개체 틀 2">
+            <a:extLst>
+              <a:ext uri="{FF2B5EF4-FFF2-40B4-BE49-F238E27FC236}">
+                <a16:creationId xmlns:a16="http://schemas.microsoft.com/office/drawing/2014/main" id="{91A39B4F-C53A-956B-82FA-B68D78A634C7}"/>
+              </a:ext>
+            </a:extLst>
+          </p:cNvPr>
+          <p:cNvSpPr>
+            <a:spLocks noGrp="1"/>
+          </p:cNvSpPr>
+          <p:nvPr>
+            <p:ph idx="1"/>
+          </p:nvPr>
+        </p:nvSpPr>
+        <p:spPr/>
+        <p:txBody>
+          <a:bodyPr>
+            <a:normAutofit/>
+          </a:bodyPr>
+          <a:lstStyle/>
+          <a:p>
+            <a:r>
+              <a:rPr lang="en-US" altLang="ko-KR" sz="1500" dirty="0"/>
+              <a:t>Property: </a:t>
+            </a:r>
+            <a:r>
+              <a:rPr lang="en-US" altLang="ko-KR" sz="1500" dirty="0" err="1"/>
+              <a:t>rootDir</a:t>
+            </a:r>
+            <a:r>
+              <a:rPr lang="en-US" altLang="ko-KR" sz="1500" dirty="0"/>
+              <a:t>(String)</a:t>
+            </a:r>
+          </a:p>
+          <a:p>
+            <a:r>
+              <a:rPr lang="en-US" altLang="ko-KR" sz="1500" dirty="0"/>
+              <a:t>Setter</a:t>
+            </a:r>
+          </a:p>
+          <a:p>
+            <a:r>
+              <a:rPr lang="en-US" altLang="ko-KR" sz="1500" dirty="0"/>
+              <a:t>Method: </a:t>
+            </a:r>
+            <a:r>
+              <a:rPr lang="en-US" altLang="ko-KR" sz="1500" dirty="0" err="1"/>
+              <a:t>writeOutputFile</a:t>
+            </a:r>
+            <a:endParaRPr lang="en-US" altLang="ko-KR" sz="1500" dirty="0"/>
+          </a:p>
+          <a:p>
+            <a:pPr marL="0" indent="0">
+              <a:buNone/>
+            </a:pPr>
+            <a:r>
+              <a:rPr lang="en-US" altLang="ko-KR" sz="1500" dirty="0"/>
+              <a:t>Param: </a:t>
+            </a:r>
+            <a:r>
+              <a:rPr lang="en-US" altLang="ko-KR" sz="1500" dirty="0" err="1"/>
+              <a:t>fileName</a:t>
+            </a:r>
+            <a:r>
+              <a:rPr lang="en-US" altLang="ko-KR" sz="1500" dirty="0"/>
+              <a:t>, output</a:t>
+            </a:r>
+          </a:p>
+          <a:p>
+            <a:pPr marL="0" indent="0">
+              <a:buNone/>
+            </a:pPr>
+            <a:r>
+              <a:rPr lang="en-US" altLang="ko-KR" sz="1500" dirty="0"/>
+              <a:t>Return: void</a:t>
+            </a:r>
+          </a:p>
+          <a:p>
+            <a:pPr marL="0" indent="0">
+              <a:buNone/>
+            </a:pPr>
+            <a:endParaRPr lang="en-US" altLang="ko-KR" sz="1500" dirty="0"/>
+          </a:p>
+        </p:txBody>
+      </p:sp>
+    </p:spTree>
+    <p:extLst>
+      <p:ext uri="{BB962C8B-B14F-4D97-AF65-F5344CB8AC3E}">
+        <p14:creationId xmlns:p14="http://schemas.microsoft.com/office/powerpoint/2010/main" val="2426211500"/>
+      </p:ext>
+    </p:extLst>
+  </p:cSld>
+  <p:clrMapOvr>
+    <a:masterClrMapping/>
+  </p:clrMapOvr>
+</p:sld>
+</file>
+
+<file path=ppt/slides/slide8.xml><?xml version="1.0" encoding="utf-8"?>
+<p:sld xmlns:a="http://schemas.openxmlformats.org/drawingml/2006/main" xmlns:r="http://schemas.openxmlformats.org/officeDocument/2006/relationships" xmlns:p="http://schemas.openxmlformats.org/presentationml/2006/main">
+  <p:cSld>
+    <p:spTree>
+      <p:nvGrpSpPr>
+        <p:cNvPr id="1" name=""/>
+        <p:cNvGrpSpPr/>
+        <p:nvPr/>
+      </p:nvGrpSpPr>
+      <p:grpSpPr>
+        <a:xfrm>
+          <a:off x="0" y="0"/>
+          <a:ext cx="0" cy="0"/>
+          <a:chOff x="0" y="0"/>
+          <a:chExt cx="0" cy="0"/>
+        </a:xfrm>
+      </p:grpSpPr>
+      <p:sp>
+        <p:nvSpPr>
+          <p:cNvPr id="2" name="제목 1">
+            <a:extLst>
+              <a:ext uri="{FF2B5EF4-FFF2-40B4-BE49-F238E27FC236}">
+                <a16:creationId xmlns:a16="http://schemas.microsoft.com/office/drawing/2014/main" id="{8E188620-67AE-FE17-585C-7A357204D7CA}"/>
+              </a:ext>
+            </a:extLst>
+          </p:cNvPr>
+          <p:cNvSpPr>
+            <a:spLocks noGrp="1"/>
+          </p:cNvSpPr>
+          <p:nvPr>
+            <p:ph type="title"/>
+          </p:nvPr>
+        </p:nvSpPr>
+        <p:spPr/>
+        <p:txBody>
+          <a:bodyPr>
+            <a:normAutofit/>
+          </a:bodyPr>
+          <a:lstStyle/>
+          <a:p>
+            <a:r>
+              <a:rPr lang="en-US" altLang="ko-KR" sz="3000" dirty="0" err="1"/>
+              <a:t>XmlUtil</a:t>
+            </a:r>
+            <a:r>
+              <a:rPr lang="en-US" altLang="ko-KR" sz="3000" dirty="0"/>
+              <a:t>(Util)</a:t>
+            </a:r>
+            <a:endParaRPr lang="ko-KR" altLang="en-US" sz="3000" dirty="0"/>
+          </a:p>
+        </p:txBody>
+      </p:sp>
+      <p:sp>
+        <p:nvSpPr>
+          <p:cNvPr id="3" name="내용 개체 틀 2">
+            <a:extLst>
+              <a:ext uri="{FF2B5EF4-FFF2-40B4-BE49-F238E27FC236}">
+                <a16:creationId xmlns:a16="http://schemas.microsoft.com/office/drawing/2014/main" id="{B4A8ACBC-092A-DFE7-4235-5728CA4B2F1D}"/>
+              </a:ext>
+            </a:extLst>
+          </p:cNvPr>
+          <p:cNvSpPr>
+            <a:spLocks noGrp="1"/>
+          </p:cNvSpPr>
+          <p:nvPr>
+            <p:ph idx="1"/>
+          </p:nvPr>
+        </p:nvSpPr>
+        <p:spPr/>
+        <p:txBody>
+          <a:bodyPr>
+            <a:normAutofit/>
+          </a:bodyPr>
+          <a:lstStyle/>
+          <a:p>
+            <a:r>
+              <a:rPr lang="en-US" altLang="ko-KR" sz="1500" dirty="0" err="1"/>
+              <a:t>Unmarshal</a:t>
+            </a:r>
+            <a:r>
+              <a:rPr lang="en-US" altLang="ko-KR" sz="1500" dirty="0"/>
+              <a:t>: xml String &gt; </a:t>
+            </a:r>
+            <a:r>
+              <a:rPr lang="en-US" altLang="ko-KR" sz="1500" dirty="0" err="1"/>
+              <a:t>CalculationInput</a:t>
+            </a:r>
+            <a:r>
+              <a:rPr lang="en-US" altLang="ko-KR" sz="1500" dirty="0"/>
+              <a:t> </a:t>
+            </a:r>
+            <a:r>
+              <a:rPr lang="ko-KR" altLang="en-US" sz="1500" dirty="0"/>
+              <a:t>객체로 변환</a:t>
+            </a:r>
+            <a:endParaRPr lang="en-US" altLang="ko-KR" sz="1500" dirty="0"/>
+          </a:p>
+          <a:p>
+            <a:r>
+              <a:rPr lang="en-US" altLang="ko-KR" sz="1500" dirty="0"/>
+              <a:t>Marshal: </a:t>
+            </a:r>
+            <a:r>
+              <a:rPr lang="en-US" altLang="ko-KR" sz="1500" dirty="0" err="1"/>
+              <a:t>CalculationOutput</a:t>
+            </a:r>
+            <a:r>
+              <a:rPr lang="en-US" altLang="ko-KR" sz="1500" dirty="0"/>
+              <a:t> </a:t>
+            </a:r>
+            <a:r>
+              <a:rPr lang="ko-KR" altLang="en-US" sz="1500" dirty="0"/>
+              <a:t>객체 </a:t>
+            </a:r>
+            <a:r>
+              <a:rPr lang="en-US" altLang="ko-KR" sz="1500" dirty="0"/>
+              <a:t>&gt; xml String</a:t>
+            </a:r>
+            <a:r>
+              <a:rPr lang="ko-KR" altLang="en-US" sz="1500" dirty="0"/>
+              <a:t>으로 변환</a:t>
+            </a:r>
+          </a:p>
+        </p:txBody>
+      </p:sp>
+    </p:spTree>
+    <p:extLst>
+      <p:ext uri="{BB962C8B-B14F-4D97-AF65-F5344CB8AC3E}">
+        <p14:creationId xmlns:p14="http://schemas.microsoft.com/office/powerpoint/2010/main" val="3490411030"/>
+      </p:ext>
+    </p:extLst>
+  </p:cSld>
+  <p:clrMapOvr>
+    <a:masterClrMapping/>
+  </p:clrMapOvr>
+</p:sld>
+</file>
+
+<file path=ppt/slides/slide9.xml><?xml version="1.0" encoding="utf-8"?>
+<p:sld xmlns:a="http://schemas.openxmlformats.org/drawingml/2006/main" xmlns:r="http://schemas.openxmlformats.org/officeDocument/2006/relationships" xmlns:p="http://schemas.openxmlformats.org/presentationml/2006/main">
+  <p:cSld>
+    <p:spTree>
+      <p:nvGrpSpPr>
+        <p:cNvPr id="1" name=""/>
+        <p:cNvGrpSpPr/>
+        <p:nvPr/>
+      </p:nvGrpSpPr>
+      <p:grpSpPr>
+        <a:xfrm>
+          <a:off x="0" y="0"/>
+          <a:ext cx="0" cy="0"/>
+          <a:chOff x="0" y="0"/>
+          <a:chExt cx="0" cy="0"/>
+        </a:xfrm>
+      </p:grpSpPr>
+      <p:sp>
+        <p:nvSpPr>
+          <p:cNvPr id="2" name="제목 1">
+            <a:extLst>
+              <a:ext uri="{FF2B5EF4-FFF2-40B4-BE49-F238E27FC236}">
+                <a16:creationId xmlns:a16="http://schemas.microsoft.com/office/drawing/2014/main" id="{64C66E31-D752-FF76-3850-B5B266E75FB8}"/>
+              </a:ext>
+            </a:extLst>
+          </p:cNvPr>
+          <p:cNvSpPr>
+            <a:spLocks noGrp="1"/>
+          </p:cNvSpPr>
+          <p:nvPr>
+            <p:ph type="title"/>
+          </p:nvPr>
+        </p:nvSpPr>
+        <p:spPr/>
+        <p:txBody>
+          <a:bodyPr>
+            <a:normAutofit/>
+          </a:bodyPr>
+          <a:lstStyle/>
+          <a:p>
+            <a:r>
+              <a:rPr lang="en-US" altLang="ko-KR" sz="3000" dirty="0"/>
+              <a:t>Calculator</a:t>
+            </a:r>
+            <a:r>
+              <a:rPr lang="ko-KR" altLang="en-US" sz="3000" dirty="0"/>
+              <a:t> 클래스</a:t>
+            </a:r>
+          </a:p>
+        </p:txBody>
+      </p:sp>
+      <p:sp>
+        <p:nvSpPr>
+          <p:cNvPr id="3" name="내용 개체 틀 2">
+            <a:extLst>
+              <a:ext uri="{FF2B5EF4-FFF2-40B4-BE49-F238E27FC236}">
+                <a16:creationId xmlns:a16="http://schemas.microsoft.com/office/drawing/2014/main" id="{45466457-5988-4896-0EEF-D1B8B24F377C}"/>
+              </a:ext>
+            </a:extLst>
+          </p:cNvPr>
+          <p:cNvSpPr>
+            <a:spLocks noGrp="1"/>
+          </p:cNvSpPr>
+          <p:nvPr>
+            <p:ph idx="1"/>
+          </p:nvPr>
+        </p:nvSpPr>
+        <p:spPr/>
+        <p:txBody>
+          <a:bodyPr>
+            <a:normAutofit/>
+          </a:bodyPr>
+          <a:lstStyle/>
+          <a:p>
+            <a:r>
+              <a:rPr lang="en-US" altLang="ko-KR" sz="1500" dirty="0"/>
+              <a:t>Calculate </a:t>
+            </a:r>
+            <a:r>
+              <a:rPr lang="ko-KR" altLang="en-US" sz="1500" dirty="0"/>
+              <a:t>메소드</a:t>
+            </a:r>
+            <a:endParaRPr lang="en-US" altLang="ko-KR" sz="1500" dirty="0"/>
+          </a:p>
+          <a:p>
+            <a:pPr marL="0" indent="0">
+              <a:buNone/>
+            </a:pPr>
+            <a:r>
+              <a:rPr lang="en-US" altLang="ko-KR" sz="1500" dirty="0"/>
+              <a:t>Param: </a:t>
+            </a:r>
+            <a:r>
+              <a:rPr lang="en-US" altLang="ko-KR" sz="1500" dirty="0" err="1"/>
+              <a:t>xmlPath</a:t>
+            </a:r>
+            <a:r>
+              <a:rPr lang="en-US" altLang="ko-KR" sz="1500" dirty="0"/>
+              <a:t> (xml data </a:t>
+            </a:r>
+            <a:r>
+              <a:rPr lang="ko-KR" altLang="en-US" sz="1500" dirty="0"/>
+              <a:t>받고</a:t>
+            </a:r>
+            <a:r>
+              <a:rPr lang="en-US" altLang="ko-KR" sz="1500" dirty="0"/>
+              <a:t>)</a:t>
+            </a:r>
+          </a:p>
+          <a:p>
+            <a:pPr marL="0" indent="0">
+              <a:buNone/>
+            </a:pPr>
+            <a:r>
+              <a:rPr lang="en-US" altLang="ko-KR" sz="1500" dirty="0"/>
+              <a:t>Return: void</a:t>
+            </a:r>
+          </a:p>
+          <a:p>
+            <a:pPr marL="0" indent="0">
+              <a:buNone/>
+            </a:pPr>
+            <a:r>
+              <a:rPr lang="en-US" altLang="ko-KR" sz="1500" dirty="0"/>
+              <a:t>Xml</a:t>
+            </a:r>
+            <a:r>
+              <a:rPr lang="ko-KR" altLang="en-US" sz="1500" dirty="0"/>
+              <a:t>형태의 </a:t>
+            </a:r>
+            <a:r>
+              <a:rPr lang="en-US" altLang="ko-KR" sz="1500" dirty="0"/>
+              <a:t>output</a:t>
+            </a:r>
+            <a:r>
+              <a:rPr lang="ko-KR" altLang="en-US" sz="1500" dirty="0"/>
+              <a:t>을 </a:t>
+            </a:r>
+            <a:r>
+              <a:rPr lang="en-US" altLang="ko-KR" sz="1500" dirty="0"/>
+              <a:t>xml input data</a:t>
+            </a:r>
+            <a:r>
+              <a:rPr lang="ko-KR" altLang="en-US" sz="1500" dirty="0"/>
+              <a:t>와 같은 위치에 생성해줌</a:t>
+            </a:r>
+            <a:r>
+              <a:rPr lang="en-US" altLang="ko-KR" sz="1500"/>
+              <a:t>.</a:t>
+            </a:r>
+            <a:endParaRPr lang="ko-KR" altLang="en-US" sz="1500" dirty="0"/>
+          </a:p>
+        </p:txBody>
+      </p:sp>
+    </p:spTree>
+    <p:extLst>
+      <p:ext uri="{BB962C8B-B14F-4D97-AF65-F5344CB8AC3E}">
+        <p14:creationId xmlns:p14="http://schemas.microsoft.com/office/powerpoint/2010/main" val="2222338400"/>
       </p:ext>
     </p:extLst>
   </p:cSld>

</xml_diff>

<commit_message>
ppt 클론코딩 thread update
</commit_message>
<xml_diff>
--- a/QuantPricer 클론 코딩_240903.pptx
+++ b/QuantPricer 클론 코딩_240903.pptx
@@ -7,13 +7,20 @@
   <p:sldIdLst>
     <p:sldId id="256" r:id="rId2"/>
     <p:sldId id="257" r:id="rId3"/>
-    <p:sldId id="258" r:id="rId4"/>
-    <p:sldId id="259" r:id="rId5"/>
-    <p:sldId id="260" r:id="rId6"/>
-    <p:sldId id="261" r:id="rId7"/>
-    <p:sldId id="262" r:id="rId8"/>
-    <p:sldId id="263" r:id="rId9"/>
-    <p:sldId id="264" r:id="rId10"/>
+    <p:sldId id="267" r:id="rId4"/>
+    <p:sldId id="258" r:id="rId5"/>
+    <p:sldId id="259" r:id="rId6"/>
+    <p:sldId id="260" r:id="rId7"/>
+    <p:sldId id="261" r:id="rId8"/>
+    <p:sldId id="262" r:id="rId9"/>
+    <p:sldId id="263" r:id="rId10"/>
+    <p:sldId id="264" r:id="rId11"/>
+    <p:sldId id="265" r:id="rId12"/>
+    <p:sldId id="266" r:id="rId13"/>
+    <p:sldId id="268" r:id="rId14"/>
+    <p:sldId id="269" r:id="rId15"/>
+    <p:sldId id="270" r:id="rId16"/>
+    <p:sldId id="271" r:id="rId17"/>
   </p:sldIdLst>
   <p:sldSz cx="12192000" cy="6858000"/>
   <p:notesSz cx="6858000" cy="9144000"/>
@@ -267,7 +274,7 @@
           <a:p>
             <a:fld id="{A23CED58-2AEF-422A-BE86-0CBC138A03D3}" type="datetimeFigureOut">
               <a:rPr lang="ko-KR" altLang="en-US" smtClean="0"/>
-              <a:t>2024-09-04</a:t>
+              <a:t>2024-09-05</a:t>
             </a:fld>
             <a:endParaRPr lang="ko-KR" altLang="en-US"/>
           </a:p>
@@ -465,7 +472,7 @@
           <a:p>
             <a:fld id="{A23CED58-2AEF-422A-BE86-0CBC138A03D3}" type="datetimeFigureOut">
               <a:rPr lang="ko-KR" altLang="en-US" smtClean="0"/>
-              <a:t>2024-09-04</a:t>
+              <a:t>2024-09-05</a:t>
             </a:fld>
             <a:endParaRPr lang="ko-KR" altLang="en-US"/>
           </a:p>
@@ -673,7 +680,7 @@
           <a:p>
             <a:fld id="{A23CED58-2AEF-422A-BE86-0CBC138A03D3}" type="datetimeFigureOut">
               <a:rPr lang="ko-KR" altLang="en-US" smtClean="0"/>
-              <a:t>2024-09-04</a:t>
+              <a:t>2024-09-05</a:t>
             </a:fld>
             <a:endParaRPr lang="ko-KR" altLang="en-US"/>
           </a:p>
@@ -871,7 +878,7 @@
           <a:p>
             <a:fld id="{A23CED58-2AEF-422A-BE86-0CBC138A03D3}" type="datetimeFigureOut">
               <a:rPr lang="ko-KR" altLang="en-US" smtClean="0"/>
-              <a:t>2024-09-04</a:t>
+              <a:t>2024-09-05</a:t>
             </a:fld>
             <a:endParaRPr lang="ko-KR" altLang="en-US"/>
           </a:p>
@@ -1146,7 +1153,7 @@
           <a:p>
             <a:fld id="{A23CED58-2AEF-422A-BE86-0CBC138A03D3}" type="datetimeFigureOut">
               <a:rPr lang="ko-KR" altLang="en-US" smtClean="0"/>
-              <a:t>2024-09-04</a:t>
+              <a:t>2024-09-05</a:t>
             </a:fld>
             <a:endParaRPr lang="ko-KR" altLang="en-US"/>
           </a:p>
@@ -1411,7 +1418,7 @@
           <a:p>
             <a:fld id="{A23CED58-2AEF-422A-BE86-0CBC138A03D3}" type="datetimeFigureOut">
               <a:rPr lang="ko-KR" altLang="en-US" smtClean="0"/>
-              <a:t>2024-09-04</a:t>
+              <a:t>2024-09-05</a:t>
             </a:fld>
             <a:endParaRPr lang="ko-KR" altLang="en-US"/>
           </a:p>
@@ -1823,7 +1830,7 @@
           <a:p>
             <a:fld id="{A23CED58-2AEF-422A-BE86-0CBC138A03D3}" type="datetimeFigureOut">
               <a:rPr lang="ko-KR" altLang="en-US" smtClean="0"/>
-              <a:t>2024-09-04</a:t>
+              <a:t>2024-09-05</a:t>
             </a:fld>
             <a:endParaRPr lang="ko-KR" altLang="en-US"/>
           </a:p>
@@ -1964,7 +1971,7 @@
           <a:p>
             <a:fld id="{A23CED58-2AEF-422A-BE86-0CBC138A03D3}" type="datetimeFigureOut">
               <a:rPr lang="ko-KR" altLang="en-US" smtClean="0"/>
-              <a:t>2024-09-04</a:t>
+              <a:t>2024-09-05</a:t>
             </a:fld>
             <a:endParaRPr lang="ko-KR" altLang="en-US"/>
           </a:p>
@@ -2077,7 +2084,7 @@
           <a:p>
             <a:fld id="{A23CED58-2AEF-422A-BE86-0CBC138A03D3}" type="datetimeFigureOut">
               <a:rPr lang="ko-KR" altLang="en-US" smtClean="0"/>
-              <a:t>2024-09-04</a:t>
+              <a:t>2024-09-05</a:t>
             </a:fld>
             <a:endParaRPr lang="ko-KR" altLang="en-US"/>
           </a:p>
@@ -2388,7 +2395,7 @@
           <a:p>
             <a:fld id="{A23CED58-2AEF-422A-BE86-0CBC138A03D3}" type="datetimeFigureOut">
               <a:rPr lang="ko-KR" altLang="en-US" smtClean="0"/>
-              <a:t>2024-09-04</a:t>
+              <a:t>2024-09-05</a:t>
             </a:fld>
             <a:endParaRPr lang="ko-KR" altLang="en-US"/>
           </a:p>
@@ -2676,7 +2683,7 @@
           <a:p>
             <a:fld id="{A23CED58-2AEF-422A-BE86-0CBC138A03D3}" type="datetimeFigureOut">
               <a:rPr lang="ko-KR" altLang="en-US" smtClean="0"/>
-              <a:t>2024-09-04</a:t>
+              <a:t>2024-09-05</a:t>
             </a:fld>
             <a:endParaRPr lang="ko-KR" altLang="en-US"/>
           </a:p>
@@ -2917,7 +2924,7 @@
           <a:p>
             <a:fld id="{A23CED58-2AEF-422A-BE86-0CBC138A03D3}" type="datetimeFigureOut">
               <a:rPr lang="ko-KR" altLang="en-US" smtClean="0"/>
-              <a:t>2024-09-04</a:t>
+              <a:t>2024-09-05</a:t>
             </a:fld>
             <a:endParaRPr lang="ko-KR" altLang="en-US"/>
           </a:p>
@@ -3408,6 +3415,2013 @@
 </p:sld>
 </file>
 
+<file path=ppt/slides/slide10.xml><?xml version="1.0" encoding="utf-8"?>
+<p:sld xmlns:a="http://schemas.openxmlformats.org/drawingml/2006/main" xmlns:r="http://schemas.openxmlformats.org/officeDocument/2006/relationships" xmlns:p="http://schemas.openxmlformats.org/presentationml/2006/main">
+  <p:cSld>
+    <p:spTree>
+      <p:nvGrpSpPr>
+        <p:cNvPr id="1" name=""/>
+        <p:cNvGrpSpPr/>
+        <p:nvPr/>
+      </p:nvGrpSpPr>
+      <p:grpSpPr>
+        <a:xfrm>
+          <a:off x="0" y="0"/>
+          <a:ext cx="0" cy="0"/>
+          <a:chOff x="0" y="0"/>
+          <a:chExt cx="0" cy="0"/>
+        </a:xfrm>
+      </p:grpSpPr>
+      <p:sp>
+        <p:nvSpPr>
+          <p:cNvPr id="2" name="제목 1">
+            <a:extLst>
+              <a:ext uri="{FF2B5EF4-FFF2-40B4-BE49-F238E27FC236}">
+                <a16:creationId xmlns:a16="http://schemas.microsoft.com/office/drawing/2014/main" id="{64C66E31-D752-FF76-3850-B5B266E75FB8}"/>
+              </a:ext>
+            </a:extLst>
+          </p:cNvPr>
+          <p:cNvSpPr>
+            <a:spLocks noGrp="1"/>
+          </p:cNvSpPr>
+          <p:nvPr>
+            <p:ph type="title"/>
+          </p:nvPr>
+        </p:nvSpPr>
+        <p:spPr/>
+        <p:txBody>
+          <a:bodyPr>
+            <a:normAutofit/>
+          </a:bodyPr>
+          <a:lstStyle/>
+          <a:p>
+            <a:r>
+              <a:rPr lang="en-US" altLang="ko-KR" sz="3000" dirty="0"/>
+              <a:t>Calculator</a:t>
+            </a:r>
+            <a:r>
+              <a:rPr lang="ko-KR" altLang="en-US" sz="3000" dirty="0"/>
+              <a:t> 클래스</a:t>
+            </a:r>
+          </a:p>
+        </p:txBody>
+      </p:sp>
+      <p:sp>
+        <p:nvSpPr>
+          <p:cNvPr id="3" name="내용 개체 틀 2">
+            <a:extLst>
+              <a:ext uri="{FF2B5EF4-FFF2-40B4-BE49-F238E27FC236}">
+                <a16:creationId xmlns:a16="http://schemas.microsoft.com/office/drawing/2014/main" id="{45466457-5988-4896-0EEF-D1B8B24F377C}"/>
+              </a:ext>
+            </a:extLst>
+          </p:cNvPr>
+          <p:cNvSpPr>
+            <a:spLocks noGrp="1"/>
+          </p:cNvSpPr>
+          <p:nvPr>
+            <p:ph idx="1"/>
+          </p:nvPr>
+        </p:nvSpPr>
+        <p:spPr/>
+        <p:txBody>
+          <a:bodyPr>
+            <a:normAutofit/>
+          </a:bodyPr>
+          <a:lstStyle/>
+          <a:p>
+            <a:r>
+              <a:rPr lang="en-US" altLang="ko-KR" sz="1500" dirty="0"/>
+              <a:t>Calculate </a:t>
+            </a:r>
+            <a:r>
+              <a:rPr lang="ko-KR" altLang="en-US" sz="1500" dirty="0"/>
+              <a:t>메소드</a:t>
+            </a:r>
+            <a:endParaRPr lang="en-US" altLang="ko-KR" sz="1500" dirty="0"/>
+          </a:p>
+          <a:p>
+            <a:pPr marL="0" indent="0">
+              <a:buNone/>
+            </a:pPr>
+            <a:r>
+              <a:rPr lang="en-US" altLang="ko-KR" sz="1500" dirty="0"/>
+              <a:t>Param: </a:t>
+            </a:r>
+            <a:r>
+              <a:rPr lang="en-US" altLang="ko-KR" sz="1500" dirty="0" err="1"/>
+              <a:t>xmlPath</a:t>
+            </a:r>
+            <a:r>
+              <a:rPr lang="en-US" altLang="ko-KR" sz="1500" dirty="0"/>
+              <a:t> (xml data </a:t>
+            </a:r>
+            <a:r>
+              <a:rPr lang="ko-KR" altLang="en-US" sz="1500" dirty="0"/>
+              <a:t>받고</a:t>
+            </a:r>
+            <a:r>
+              <a:rPr lang="en-US" altLang="ko-KR" sz="1500" dirty="0"/>
+              <a:t>)</a:t>
+            </a:r>
+          </a:p>
+          <a:p>
+            <a:pPr marL="0" indent="0">
+              <a:buNone/>
+            </a:pPr>
+            <a:r>
+              <a:rPr lang="en-US" altLang="ko-KR" sz="1500" dirty="0"/>
+              <a:t>Return: void</a:t>
+            </a:r>
+          </a:p>
+          <a:p>
+            <a:pPr marL="0" indent="0">
+              <a:buNone/>
+            </a:pPr>
+            <a:r>
+              <a:rPr lang="en-US" altLang="ko-KR" sz="1500" dirty="0"/>
+              <a:t>Xml</a:t>
+            </a:r>
+            <a:r>
+              <a:rPr lang="ko-KR" altLang="en-US" sz="1500" dirty="0"/>
+              <a:t>형태의 </a:t>
+            </a:r>
+            <a:r>
+              <a:rPr lang="en-US" altLang="ko-KR" sz="1500" dirty="0"/>
+              <a:t>output</a:t>
+            </a:r>
+            <a:r>
+              <a:rPr lang="ko-KR" altLang="en-US" sz="1500" dirty="0"/>
+              <a:t>을 </a:t>
+            </a:r>
+            <a:r>
+              <a:rPr lang="en-US" altLang="ko-KR" sz="1500" dirty="0"/>
+              <a:t>xml input data</a:t>
+            </a:r>
+            <a:r>
+              <a:rPr lang="ko-KR" altLang="en-US" sz="1500" dirty="0"/>
+              <a:t>와 같은 위치에 생성해줌</a:t>
+            </a:r>
+            <a:r>
+              <a:rPr lang="en-US" altLang="ko-KR" sz="1500"/>
+              <a:t>.</a:t>
+            </a:r>
+            <a:endParaRPr lang="ko-KR" altLang="en-US" sz="1500" dirty="0"/>
+          </a:p>
+        </p:txBody>
+      </p:sp>
+    </p:spTree>
+    <p:extLst>
+      <p:ext uri="{BB962C8B-B14F-4D97-AF65-F5344CB8AC3E}">
+        <p14:creationId xmlns:p14="http://schemas.microsoft.com/office/powerpoint/2010/main" val="2222338400"/>
+      </p:ext>
+    </p:extLst>
+  </p:cSld>
+  <p:clrMapOvr>
+    <a:masterClrMapping/>
+  </p:clrMapOvr>
+</p:sld>
+</file>
+
+<file path=ppt/slides/slide11.xml><?xml version="1.0" encoding="utf-8"?>
+<p:sld xmlns:a="http://schemas.openxmlformats.org/drawingml/2006/main" xmlns:r="http://schemas.openxmlformats.org/officeDocument/2006/relationships" xmlns:p="http://schemas.openxmlformats.org/presentationml/2006/main">
+  <p:cSld>
+    <p:spTree>
+      <p:nvGrpSpPr>
+        <p:cNvPr id="1" name=""/>
+        <p:cNvGrpSpPr/>
+        <p:nvPr/>
+      </p:nvGrpSpPr>
+      <p:grpSpPr>
+        <a:xfrm>
+          <a:off x="0" y="0"/>
+          <a:ext cx="0" cy="0"/>
+          <a:chOff x="0" y="0"/>
+          <a:chExt cx="0" cy="0"/>
+        </a:xfrm>
+      </p:grpSpPr>
+      <p:sp>
+        <p:nvSpPr>
+          <p:cNvPr id="2" name="제목 1">
+            <a:extLst>
+              <a:ext uri="{FF2B5EF4-FFF2-40B4-BE49-F238E27FC236}">
+                <a16:creationId xmlns:a16="http://schemas.microsoft.com/office/drawing/2014/main" id="{1F337476-8DBB-BF91-3049-BB92DC15F2C2}"/>
+              </a:ext>
+            </a:extLst>
+          </p:cNvPr>
+          <p:cNvSpPr>
+            <a:spLocks noGrp="1"/>
+          </p:cNvSpPr>
+          <p:nvPr>
+            <p:ph type="title"/>
+          </p:nvPr>
+        </p:nvSpPr>
+        <p:spPr/>
+        <p:txBody>
+          <a:bodyPr>
+            <a:normAutofit/>
+          </a:bodyPr>
+          <a:lstStyle/>
+          <a:p>
+            <a:r>
+              <a:rPr lang="en-US" altLang="ko-KR" sz="3000" dirty="0" err="1"/>
+              <a:t>GreeksUtil</a:t>
+            </a:r>
+            <a:r>
+              <a:rPr lang="en-US" altLang="ko-KR" sz="3000" dirty="0"/>
+              <a:t>(Util)</a:t>
+            </a:r>
+            <a:endParaRPr lang="ko-KR" altLang="en-US" sz="3000" dirty="0"/>
+          </a:p>
+        </p:txBody>
+      </p:sp>
+      <p:sp>
+        <p:nvSpPr>
+          <p:cNvPr id="3" name="내용 개체 틀 2">
+            <a:extLst>
+              <a:ext uri="{FF2B5EF4-FFF2-40B4-BE49-F238E27FC236}">
+                <a16:creationId xmlns:a16="http://schemas.microsoft.com/office/drawing/2014/main" id="{242AB1D1-8322-42AF-60C2-2963D6DFF95E}"/>
+              </a:ext>
+            </a:extLst>
+          </p:cNvPr>
+          <p:cNvSpPr>
+            <a:spLocks noGrp="1"/>
+          </p:cNvSpPr>
+          <p:nvPr>
+            <p:ph idx="1"/>
+          </p:nvPr>
+        </p:nvSpPr>
+        <p:spPr/>
+        <p:txBody>
+          <a:bodyPr>
+            <a:normAutofit/>
+          </a:bodyPr>
+          <a:lstStyle/>
+          <a:p>
+            <a:r>
+              <a:rPr lang="en-US" altLang="ko-KR" sz="1500" dirty="0"/>
+              <a:t>PV01 (yield</a:t>
+            </a:r>
+            <a:r>
+              <a:rPr lang="ko-KR" altLang="en-US" sz="1500" dirty="0"/>
+              <a:t>가 </a:t>
+            </a:r>
+            <a:r>
+              <a:rPr lang="en-US" altLang="ko-KR" sz="1500" dirty="0"/>
+              <a:t>one basis point </a:t>
+            </a:r>
+            <a:r>
+              <a:rPr lang="ko-KR" altLang="en-US" sz="1500" dirty="0"/>
+              <a:t>변화할 때</a:t>
+            </a:r>
+            <a:r>
+              <a:rPr lang="en-US" altLang="ko-KR" sz="1500" dirty="0"/>
+              <a:t>, financial instrument</a:t>
+            </a:r>
+            <a:r>
+              <a:rPr lang="ko-KR" altLang="en-US" sz="1500" dirty="0"/>
+              <a:t>의 가격 변화</a:t>
+            </a:r>
+            <a:r>
+              <a:rPr lang="en-US" altLang="ko-KR" sz="1500" dirty="0"/>
+              <a:t>)</a:t>
+            </a:r>
+          </a:p>
+          <a:p>
+            <a:r>
+              <a:rPr lang="ko-KR" altLang="en-US" sz="1500" dirty="0"/>
+              <a:t>순서</a:t>
+            </a:r>
+            <a:endParaRPr lang="en-US" altLang="ko-KR" sz="1500" dirty="0"/>
+          </a:p>
+          <a:p>
+            <a:pPr marL="0" indent="0">
+              <a:buNone/>
+            </a:pPr>
+            <a:r>
+              <a:rPr lang="en-US" altLang="ko-KR" sz="1500" dirty="0"/>
+              <a:t>Output</a:t>
+            </a:r>
+            <a:r>
+              <a:rPr lang="ko-KR" altLang="en-US" sz="1500" dirty="0"/>
+              <a:t> 객체가 </a:t>
+            </a:r>
+            <a:r>
+              <a:rPr lang="en-US" altLang="ko-KR" sz="1500" dirty="0" err="1"/>
+              <a:t>calculateGreeks</a:t>
+            </a:r>
+            <a:r>
+              <a:rPr lang="ko-KR" altLang="en-US" sz="1500" dirty="0"/>
+              <a:t>의 </a:t>
+            </a:r>
+            <a:r>
+              <a:rPr lang="en-US" altLang="ko-KR" sz="1500" dirty="0"/>
+              <a:t>parameter</a:t>
+            </a:r>
+            <a:r>
+              <a:rPr lang="ko-KR" altLang="en-US" sz="1500" dirty="0"/>
+              <a:t>로 들어온다</a:t>
+            </a:r>
+            <a:r>
+              <a:rPr lang="en-US" altLang="ko-KR" sz="1500" dirty="0"/>
+              <a:t>.</a:t>
+            </a:r>
+          </a:p>
+          <a:p>
+            <a:pPr marL="0" indent="0">
+              <a:buNone/>
+            </a:pPr>
+            <a:r>
+              <a:rPr lang="en-US" altLang="ko-KR" sz="1500" dirty="0" err="1"/>
+              <a:t>calculateGreeks</a:t>
+            </a:r>
+            <a:r>
+              <a:rPr lang="ko-KR" altLang="en-US" sz="1500" dirty="0"/>
+              <a:t>에서 사용되는 </a:t>
+            </a:r>
+            <a:r>
+              <a:rPr lang="en-US" altLang="ko-KR" sz="1500" dirty="0"/>
+              <a:t>parameter: </a:t>
+            </a:r>
+            <a:r>
+              <a:rPr lang="en-US" altLang="ko-KR" sz="1500" dirty="0" err="1"/>
+              <a:t>baseInput</a:t>
+            </a:r>
+            <a:r>
+              <a:rPr lang="en-US" altLang="ko-KR" sz="1500" dirty="0"/>
+              <a:t>, </a:t>
+            </a:r>
+            <a:r>
+              <a:rPr lang="en-US" altLang="ko-KR" sz="1500" dirty="0" err="1"/>
+              <a:t>underlyings</a:t>
+            </a:r>
+            <a:r>
+              <a:rPr lang="en-US" altLang="ko-KR" sz="1500" dirty="0"/>
+              <a:t>, curves</a:t>
+            </a:r>
+          </a:p>
+          <a:p>
+            <a:pPr marL="0" indent="0">
+              <a:buNone/>
+            </a:pPr>
+            <a:r>
+              <a:rPr lang="en-US" altLang="ko-KR" sz="1500" dirty="0" err="1"/>
+              <a:t>calculateOutputs</a:t>
+            </a:r>
+            <a:r>
+              <a:rPr lang="ko-KR" altLang="en-US" sz="1500" dirty="0"/>
+              <a:t>로 부터 나온 </a:t>
+            </a:r>
+            <a:r>
+              <a:rPr lang="en-US" altLang="ko-KR" sz="1500" dirty="0"/>
+              <a:t>outputs(</a:t>
+            </a:r>
+            <a:r>
+              <a:rPr lang="en-US" altLang="ko-KR" sz="1500" dirty="0" err="1"/>
+              <a:t>ConcurrentHashMap</a:t>
+            </a:r>
+            <a:r>
+              <a:rPr lang="en-US" altLang="ko-KR" sz="1500" dirty="0"/>
+              <a:t>&lt;String, </a:t>
+            </a:r>
+            <a:r>
+              <a:rPr lang="en-US" altLang="ko-KR" sz="1500" dirty="0" err="1"/>
+              <a:t>BigDecimal</a:t>
+            </a:r>
+            <a:r>
+              <a:rPr lang="en-US" altLang="ko-KR" sz="1500" dirty="0"/>
+              <a:t>&gt;)</a:t>
+            </a:r>
+            <a:r>
+              <a:rPr lang="ko-KR" altLang="en-US" sz="1500" dirty="0"/>
+              <a:t>은 </a:t>
+            </a:r>
+            <a:r>
+              <a:rPr lang="en-US" altLang="ko-KR" sz="1500" dirty="0"/>
+              <a:t>Greeks</a:t>
+            </a:r>
+            <a:r>
+              <a:rPr lang="ko-KR" altLang="en-US" sz="1500" dirty="0"/>
+              <a:t>를 계산하는데 사용되어진다</a:t>
+            </a:r>
+            <a:r>
+              <a:rPr lang="en-US" altLang="ko-KR" sz="1500" dirty="0"/>
+              <a:t>.</a:t>
+            </a:r>
+          </a:p>
+          <a:p>
+            <a:pPr marL="0" indent="0">
+              <a:buNone/>
+            </a:pPr>
+            <a:r>
+              <a:rPr lang="ko-KR" altLang="en-US" sz="1500" dirty="0"/>
+              <a:t>계산된 민감도가 </a:t>
+            </a:r>
+            <a:r>
+              <a:rPr lang="en-US" altLang="ko-KR" sz="1500" dirty="0" err="1"/>
+              <a:t>GreekOutput</a:t>
+            </a:r>
+            <a:r>
+              <a:rPr lang="ko-KR" altLang="en-US" sz="1500" dirty="0"/>
+              <a:t>객체로서 </a:t>
+            </a:r>
+            <a:r>
+              <a:rPr lang="en-US" altLang="ko-KR" sz="1500" dirty="0" err="1"/>
+              <a:t>CalculationOutput</a:t>
+            </a:r>
+            <a:r>
+              <a:rPr lang="ko-KR" altLang="en-US" sz="1500" dirty="0"/>
+              <a:t>에 추가된다</a:t>
+            </a:r>
+            <a:r>
+              <a:rPr lang="en-US" altLang="ko-KR" sz="1500" dirty="0"/>
+              <a:t>.</a:t>
+            </a:r>
+          </a:p>
+          <a:p>
+            <a:pPr marL="0" indent="0">
+              <a:buNone/>
+            </a:pPr>
+            <a:endParaRPr lang="ko-KR" altLang="en-US" sz="1500" dirty="0"/>
+          </a:p>
+        </p:txBody>
+      </p:sp>
+    </p:spTree>
+    <p:extLst>
+      <p:ext uri="{BB962C8B-B14F-4D97-AF65-F5344CB8AC3E}">
+        <p14:creationId xmlns:p14="http://schemas.microsoft.com/office/powerpoint/2010/main" val="722283008"/>
+      </p:ext>
+    </p:extLst>
+  </p:cSld>
+  <p:clrMapOvr>
+    <a:masterClrMapping/>
+  </p:clrMapOvr>
+</p:sld>
+</file>
+
+<file path=ppt/slides/slide12.xml><?xml version="1.0" encoding="utf-8"?>
+<p:sld xmlns:a="http://schemas.openxmlformats.org/drawingml/2006/main" xmlns:r="http://schemas.openxmlformats.org/officeDocument/2006/relationships" xmlns:p="http://schemas.openxmlformats.org/presentationml/2006/main">
+  <p:cSld>
+    <p:spTree>
+      <p:nvGrpSpPr>
+        <p:cNvPr id="1" name=""/>
+        <p:cNvGrpSpPr/>
+        <p:nvPr/>
+      </p:nvGrpSpPr>
+      <p:grpSpPr>
+        <a:xfrm>
+          <a:off x="0" y="0"/>
+          <a:ext cx="0" cy="0"/>
+          <a:chOff x="0" y="0"/>
+          <a:chExt cx="0" cy="0"/>
+        </a:xfrm>
+      </p:grpSpPr>
+      <p:sp>
+        <p:nvSpPr>
+          <p:cNvPr id="2" name="제목 1">
+            <a:extLst>
+              <a:ext uri="{FF2B5EF4-FFF2-40B4-BE49-F238E27FC236}">
+                <a16:creationId xmlns:a16="http://schemas.microsoft.com/office/drawing/2014/main" id="{A61B824F-30CC-BC49-8A64-EC44F578D78B}"/>
+              </a:ext>
+            </a:extLst>
+          </p:cNvPr>
+          <p:cNvSpPr>
+            <a:spLocks noGrp="1"/>
+          </p:cNvSpPr>
+          <p:nvPr>
+            <p:ph type="title"/>
+          </p:nvPr>
+        </p:nvSpPr>
+        <p:spPr/>
+        <p:txBody>
+          <a:bodyPr>
+            <a:normAutofit/>
+          </a:bodyPr>
+          <a:lstStyle/>
+          <a:p>
+            <a:r>
+              <a:rPr lang="en-US" altLang="ko-KR" sz="3000" dirty="0" err="1"/>
+              <a:t>GreeksUtil</a:t>
+            </a:r>
+            <a:r>
+              <a:rPr lang="en-US" altLang="ko-KR" sz="3000" dirty="0"/>
+              <a:t>(Util)</a:t>
+            </a:r>
+            <a:endParaRPr lang="ko-KR" altLang="en-US" sz="3000" dirty="0"/>
+          </a:p>
+        </p:txBody>
+      </p:sp>
+      <p:sp>
+        <p:nvSpPr>
+          <p:cNvPr id="3" name="내용 개체 틀 2">
+            <a:extLst>
+              <a:ext uri="{FF2B5EF4-FFF2-40B4-BE49-F238E27FC236}">
+                <a16:creationId xmlns:a16="http://schemas.microsoft.com/office/drawing/2014/main" id="{55851D72-CDE5-4402-D86C-BAE2BC2F944F}"/>
+              </a:ext>
+            </a:extLst>
+          </p:cNvPr>
+          <p:cNvSpPr>
+            <a:spLocks noGrp="1"/>
+          </p:cNvSpPr>
+          <p:nvPr>
+            <p:ph idx="1"/>
+          </p:nvPr>
+        </p:nvSpPr>
+        <p:spPr/>
+        <p:txBody>
+          <a:bodyPr>
+            <a:normAutofit/>
+          </a:bodyPr>
+          <a:lstStyle/>
+          <a:p>
+            <a:r>
+              <a:rPr lang="en-US" altLang="ko-KR" sz="1500" dirty="0"/>
+              <a:t>Input </a:t>
+            </a:r>
+            <a:r>
+              <a:rPr lang="ko-KR" altLang="en-US" sz="1500" dirty="0"/>
+              <a:t>생성</a:t>
+            </a:r>
+            <a:r>
+              <a:rPr lang="en-US" altLang="ko-KR" sz="1500" dirty="0"/>
+              <a:t> (</a:t>
+            </a:r>
+            <a:r>
+              <a:rPr lang="en-US" altLang="ko-KR" sz="1500" dirty="0" err="1"/>
+              <a:t>generateInputs</a:t>
+            </a:r>
+            <a:r>
+              <a:rPr lang="en-US" altLang="ko-KR" sz="1500" dirty="0"/>
+              <a:t> method)</a:t>
+            </a:r>
+          </a:p>
+          <a:p>
+            <a:pPr marL="0" indent="0">
+              <a:buNone/>
+            </a:pPr>
+            <a:r>
+              <a:rPr lang="en-US" altLang="ko-KR" sz="1500" dirty="0"/>
+              <a:t>Greek </a:t>
+            </a:r>
+            <a:r>
+              <a:rPr lang="ko-KR" altLang="en-US" sz="1500" dirty="0"/>
+              <a:t>계산을</a:t>
+            </a:r>
+            <a:r>
+              <a:rPr lang="en-US" altLang="ko-KR" sz="1500" dirty="0"/>
+              <a:t> </a:t>
+            </a:r>
+            <a:r>
+              <a:rPr lang="ko-KR" altLang="en-US" sz="1500" dirty="0"/>
+              <a:t>위해 일련의 </a:t>
+            </a:r>
+            <a:r>
+              <a:rPr lang="en-US" altLang="ko-KR" sz="1500" dirty="0"/>
+              <a:t>perturbed input</a:t>
+            </a:r>
+            <a:r>
+              <a:rPr lang="ko-KR" altLang="en-US" sz="1500" dirty="0"/>
+              <a:t>을 만들어준다</a:t>
+            </a:r>
+            <a:r>
+              <a:rPr lang="en-US" altLang="ko-KR" sz="1500" dirty="0"/>
+              <a:t>.</a:t>
+            </a:r>
+          </a:p>
+          <a:p>
+            <a:r>
+              <a:rPr lang="en-US" altLang="ko-KR" sz="1500" dirty="0"/>
+              <a:t>Output </a:t>
+            </a:r>
+            <a:r>
+              <a:rPr lang="ko-KR" altLang="en-US" sz="1500" dirty="0"/>
+              <a:t>계산</a:t>
+            </a:r>
+            <a:endParaRPr lang="en-US" altLang="ko-KR" sz="1500" dirty="0"/>
+          </a:p>
+          <a:p>
+            <a:pPr marL="0" indent="0">
+              <a:buNone/>
+            </a:pPr>
+            <a:r>
+              <a:rPr lang="ko-KR" altLang="en-US" sz="1500" dirty="0"/>
+              <a:t>각 </a:t>
+            </a:r>
+            <a:r>
+              <a:rPr lang="en-US" altLang="ko-KR" sz="1500" dirty="0"/>
+              <a:t>perturbed input</a:t>
+            </a:r>
+            <a:r>
+              <a:rPr lang="ko-KR" altLang="en-US" sz="1500" dirty="0"/>
+              <a:t>에 해당하는 </a:t>
+            </a:r>
+            <a:r>
+              <a:rPr lang="en-US" altLang="ko-KR" sz="1500" dirty="0"/>
+              <a:t>output</a:t>
+            </a:r>
+            <a:r>
+              <a:rPr lang="ko-KR" altLang="en-US" sz="1500" dirty="0"/>
+              <a:t>을 계산한다</a:t>
+            </a:r>
+            <a:r>
+              <a:rPr lang="en-US" altLang="ko-KR" sz="1500" dirty="0"/>
+              <a:t>.</a:t>
+            </a:r>
+          </a:p>
+          <a:p>
+            <a:pPr marL="0" indent="0">
+              <a:buNone/>
+            </a:pPr>
+            <a:r>
+              <a:rPr lang="en-US" altLang="ko-KR" sz="1500" dirty="0"/>
+              <a:t>Output</a:t>
+            </a:r>
+            <a:r>
+              <a:rPr lang="ko-KR" altLang="en-US" sz="1500" dirty="0"/>
+              <a:t>을 병렬로 계산하기 위해</a:t>
+            </a:r>
+            <a:r>
+              <a:rPr lang="en-US" altLang="ko-KR" sz="1500" dirty="0"/>
+              <a:t>, multi-thread</a:t>
+            </a:r>
+            <a:r>
+              <a:rPr lang="ko-KR" altLang="en-US" sz="1500" dirty="0"/>
+              <a:t>를 사용한다</a:t>
+            </a:r>
+            <a:r>
+              <a:rPr lang="en-US" altLang="ko-KR" sz="1500" dirty="0"/>
+              <a:t>.</a:t>
+            </a:r>
+          </a:p>
+          <a:p>
+            <a:r>
+              <a:rPr lang="en-US" altLang="ko-KR" sz="1500" dirty="0"/>
+              <a:t>Output</a:t>
+            </a:r>
+            <a:r>
+              <a:rPr lang="ko-KR" altLang="en-US" sz="1500" dirty="0"/>
+              <a:t>을 얻어낸 뒤에</a:t>
+            </a:r>
+            <a:r>
+              <a:rPr lang="en-US" altLang="ko-KR" sz="1500" dirty="0"/>
+              <a:t>, </a:t>
+            </a:r>
+            <a:r>
+              <a:rPr lang="ko-KR" altLang="en-US" sz="1500" dirty="0"/>
+              <a:t>각 민감도 타입에 대한 해당하는 방법으로 실제 </a:t>
+            </a:r>
+            <a:r>
+              <a:rPr lang="en-US" altLang="ko-KR" sz="1500" dirty="0"/>
+              <a:t>Greek</a:t>
+            </a:r>
+            <a:r>
+              <a:rPr lang="ko-KR" altLang="en-US" sz="1500" dirty="0"/>
+              <a:t>을 계산한다</a:t>
+            </a:r>
+            <a:r>
+              <a:rPr lang="en-US" altLang="ko-KR" sz="1500" dirty="0"/>
+              <a:t>.</a:t>
+            </a:r>
+          </a:p>
+          <a:p>
+            <a:r>
+              <a:rPr lang="en-US" altLang="ko-KR" sz="1500" dirty="0"/>
+              <a:t>PV01:</a:t>
+            </a:r>
+            <a:r>
+              <a:rPr lang="ko-KR" altLang="en-US" sz="1500" dirty="0"/>
+              <a:t> </a:t>
+            </a:r>
+            <a:r>
+              <a:rPr lang="en-US" altLang="ko-KR" sz="1500" dirty="0"/>
+              <a:t>input</a:t>
+            </a:r>
+            <a:r>
+              <a:rPr lang="ko-KR" altLang="en-US" sz="1500" dirty="0"/>
+              <a:t> </a:t>
+            </a:r>
+            <a:r>
+              <a:rPr lang="en-US" altLang="ko-KR" sz="1500" dirty="0"/>
+              <a:t>(perturbed</a:t>
+            </a:r>
+            <a:r>
+              <a:rPr lang="ko-KR" altLang="en-US" sz="1500" dirty="0"/>
+              <a:t> </a:t>
+            </a:r>
+            <a:r>
+              <a:rPr lang="en-US" altLang="ko-KR" sz="1500" dirty="0"/>
+              <a:t>yield curves), output (</a:t>
+            </a:r>
+            <a:r>
+              <a:rPr lang="ko-KR" altLang="en-US" sz="1500" dirty="0"/>
+              <a:t>해당되는 파생상품 가격</a:t>
+            </a:r>
+            <a:r>
+              <a:rPr lang="en-US" altLang="ko-KR" sz="1500" dirty="0"/>
+              <a:t>), </a:t>
+            </a:r>
+            <a:r>
+              <a:rPr lang="ko-KR" altLang="en-US" sz="1500" dirty="0"/>
+              <a:t>가격 차이를 바탕으로 </a:t>
+            </a:r>
+            <a:r>
+              <a:rPr lang="en-US" altLang="ko-KR" sz="1500" dirty="0"/>
+              <a:t>PV01 </a:t>
+            </a:r>
+            <a:r>
+              <a:rPr lang="ko-KR" altLang="en-US" sz="1500" dirty="0"/>
+              <a:t>계산</a:t>
+            </a:r>
+            <a:endParaRPr lang="en-US" altLang="ko-KR" sz="1500" dirty="0"/>
+          </a:p>
+          <a:p>
+            <a:r>
+              <a:rPr lang="en-US" altLang="ko-KR" sz="1500" dirty="0"/>
+              <a:t>Modified duration: input (perturbed yield curves), output(</a:t>
+            </a:r>
+            <a:r>
+              <a:rPr lang="ko-KR" altLang="en-US" sz="1500" dirty="0"/>
+              <a:t>해당하는 파생상품 가격</a:t>
+            </a:r>
+            <a:r>
+              <a:rPr lang="en-US" altLang="ko-KR" sz="1500" dirty="0"/>
+              <a:t>), </a:t>
+            </a:r>
+            <a:r>
+              <a:rPr lang="ko-KR" altLang="en-US" sz="1500" dirty="0"/>
+              <a:t>가격 차이를 바탕으로 </a:t>
+            </a:r>
+            <a:r>
+              <a:rPr lang="en-US" altLang="ko-KR" sz="1500" dirty="0"/>
+              <a:t>Modified Duration </a:t>
+            </a:r>
+            <a:r>
+              <a:rPr lang="ko-KR" altLang="en-US" sz="1500" dirty="0"/>
+              <a:t>계산</a:t>
+            </a:r>
+            <a:endParaRPr lang="en-US" altLang="ko-KR" sz="1500" dirty="0"/>
+          </a:p>
+          <a:p>
+            <a:r>
+              <a:rPr lang="en-US" altLang="ko-KR" sz="1500" dirty="0"/>
+              <a:t>DELTA: input (perturbed underlying asset prices), output (</a:t>
+            </a:r>
+            <a:r>
+              <a:rPr lang="ko-KR" altLang="en-US" sz="1500" dirty="0"/>
+              <a:t>해당하는 파생상품 가격</a:t>
+            </a:r>
+            <a:r>
+              <a:rPr lang="en-US" altLang="ko-KR" sz="1500" dirty="0"/>
+              <a:t>), </a:t>
+            </a:r>
+            <a:r>
+              <a:rPr lang="ko-KR" altLang="en-US" sz="1500" dirty="0"/>
+              <a:t>가격 차이를 바탕으로 </a:t>
+            </a:r>
+            <a:r>
+              <a:rPr lang="en-US" altLang="ko-KR" sz="1500" dirty="0"/>
+              <a:t>Delta</a:t>
+            </a:r>
+            <a:r>
+              <a:rPr lang="ko-KR" altLang="en-US" sz="1500" dirty="0"/>
+              <a:t>값 계산</a:t>
+            </a:r>
+            <a:endParaRPr lang="en-US" altLang="ko-KR" sz="1500" dirty="0"/>
+          </a:p>
+          <a:p>
+            <a:pPr marL="0" indent="0">
+              <a:buNone/>
+            </a:pPr>
+            <a:r>
+              <a:rPr lang="ko-KR" altLang="en-US" sz="1500" dirty="0"/>
+              <a:t>각 </a:t>
+            </a:r>
+            <a:r>
+              <a:rPr lang="en-US" altLang="ko-KR" sz="1500" dirty="0"/>
+              <a:t>sensitivity</a:t>
+            </a:r>
+            <a:r>
+              <a:rPr lang="ko-KR" altLang="en-US" sz="1500" dirty="0"/>
+              <a:t>는 같은 흐름을 따라 얻어진다</a:t>
+            </a:r>
+            <a:r>
+              <a:rPr lang="en-US" altLang="ko-KR" sz="1500" dirty="0"/>
+              <a:t>.</a:t>
+            </a:r>
+          </a:p>
+          <a:p>
+            <a:pPr marL="0" indent="0">
+              <a:buNone/>
+            </a:pPr>
+            <a:r>
+              <a:rPr lang="en-US" altLang="ko-KR" sz="1500" dirty="0"/>
+              <a:t>Input perturb &gt; output </a:t>
+            </a:r>
+            <a:r>
+              <a:rPr lang="ko-KR" altLang="en-US" sz="1500" dirty="0"/>
+              <a:t>계산 </a:t>
+            </a:r>
+            <a:r>
+              <a:rPr lang="en-US" altLang="ko-KR" sz="1500" dirty="0"/>
+              <a:t>&gt; </a:t>
+            </a:r>
+            <a:r>
+              <a:rPr lang="en-US" altLang="ko-KR" sz="1500" dirty="0" err="1"/>
+              <a:t>greeks</a:t>
+            </a:r>
+            <a:r>
+              <a:rPr lang="en-US" altLang="ko-KR" sz="1500" dirty="0"/>
+              <a:t> </a:t>
+            </a:r>
+            <a:r>
+              <a:rPr lang="ko-KR" altLang="en-US" sz="1500" dirty="0"/>
+              <a:t>계산</a:t>
+            </a:r>
+            <a:endParaRPr lang="en-US" altLang="ko-KR" sz="1500" dirty="0"/>
+          </a:p>
+        </p:txBody>
+      </p:sp>
+    </p:spTree>
+    <p:extLst>
+      <p:ext uri="{BB962C8B-B14F-4D97-AF65-F5344CB8AC3E}">
+        <p14:creationId xmlns:p14="http://schemas.microsoft.com/office/powerpoint/2010/main" val="3211844928"/>
+      </p:ext>
+    </p:extLst>
+  </p:cSld>
+  <p:clrMapOvr>
+    <a:masterClrMapping/>
+  </p:clrMapOvr>
+</p:sld>
+</file>
+
+<file path=ppt/slides/slide13.xml><?xml version="1.0" encoding="utf-8"?>
+<p:sld xmlns:a="http://schemas.openxmlformats.org/drawingml/2006/main" xmlns:r="http://schemas.openxmlformats.org/officeDocument/2006/relationships" xmlns:p="http://schemas.openxmlformats.org/presentationml/2006/main">
+  <p:cSld>
+    <p:spTree>
+      <p:nvGrpSpPr>
+        <p:cNvPr id="1" name=""/>
+        <p:cNvGrpSpPr/>
+        <p:nvPr/>
+      </p:nvGrpSpPr>
+      <p:grpSpPr>
+        <a:xfrm>
+          <a:off x="0" y="0"/>
+          <a:ext cx="0" cy="0"/>
+          <a:chOff x="0" y="0"/>
+          <a:chExt cx="0" cy="0"/>
+        </a:xfrm>
+      </p:grpSpPr>
+      <p:sp>
+        <p:nvSpPr>
+          <p:cNvPr id="2" name="제목 1">
+            <a:extLst>
+              <a:ext uri="{FF2B5EF4-FFF2-40B4-BE49-F238E27FC236}">
+                <a16:creationId xmlns:a16="http://schemas.microsoft.com/office/drawing/2014/main" id="{7525B0D0-426A-7DFF-4AD8-C7101E5B786B}"/>
+              </a:ext>
+            </a:extLst>
+          </p:cNvPr>
+          <p:cNvSpPr>
+            <a:spLocks noGrp="1"/>
+          </p:cNvSpPr>
+          <p:nvPr>
+            <p:ph type="title"/>
+          </p:nvPr>
+        </p:nvSpPr>
+        <p:spPr/>
+        <p:txBody>
+          <a:bodyPr>
+            <a:normAutofit/>
+          </a:bodyPr>
+          <a:lstStyle/>
+          <a:p>
+            <a:r>
+              <a:rPr lang="en-US" altLang="ko-KR" sz="3000" dirty="0" err="1"/>
+              <a:t>calculateOutputs</a:t>
+            </a:r>
+            <a:endParaRPr lang="ko-KR" altLang="en-US" sz="3000" dirty="0"/>
+          </a:p>
+        </p:txBody>
+      </p:sp>
+      <p:sp>
+        <p:nvSpPr>
+          <p:cNvPr id="3" name="내용 개체 틀 2">
+            <a:extLst>
+              <a:ext uri="{FF2B5EF4-FFF2-40B4-BE49-F238E27FC236}">
+                <a16:creationId xmlns:a16="http://schemas.microsoft.com/office/drawing/2014/main" id="{1A8B6A47-54B8-1D85-68E6-E0FCA3FE7578}"/>
+              </a:ext>
+            </a:extLst>
+          </p:cNvPr>
+          <p:cNvSpPr>
+            <a:spLocks noGrp="1"/>
+          </p:cNvSpPr>
+          <p:nvPr>
+            <p:ph idx="1"/>
+          </p:nvPr>
+        </p:nvSpPr>
+        <p:spPr>
+          <a:xfrm>
+            <a:off x="4371976" y="1825625"/>
+            <a:ext cx="6981824" cy="4351338"/>
+          </a:xfrm>
+        </p:spPr>
+        <p:txBody>
+          <a:bodyPr>
+            <a:normAutofit/>
+          </a:bodyPr>
+          <a:lstStyle/>
+          <a:p>
+            <a:r>
+              <a:rPr lang="en-US" altLang="ko-KR" sz="1500" dirty="0"/>
+              <a:t>Inputs</a:t>
+            </a:r>
+            <a:r>
+              <a:rPr lang="ko-KR" altLang="en-US" sz="1500" dirty="0"/>
+              <a:t> </a:t>
+            </a:r>
+            <a:r>
+              <a:rPr lang="en-US" altLang="ko-KR" sz="1500" dirty="0"/>
+              <a:t>parameter</a:t>
+            </a:r>
+            <a:r>
+              <a:rPr lang="ko-KR" altLang="en-US" sz="1500" dirty="0"/>
+              <a:t>의 각 </a:t>
+            </a:r>
+            <a:r>
+              <a:rPr lang="en-US" altLang="ko-KR" sz="1500" dirty="0"/>
+              <a:t>element</a:t>
+            </a:r>
+            <a:r>
+              <a:rPr lang="ko-KR" altLang="en-US" sz="1500" dirty="0"/>
+              <a:t>의 </a:t>
+            </a:r>
+            <a:r>
+              <a:rPr lang="en-US" altLang="ko-KR" sz="1500" dirty="0"/>
+              <a:t>key value</a:t>
+            </a:r>
+            <a:r>
+              <a:rPr lang="ko-KR" altLang="en-US" sz="1500" dirty="0"/>
+              <a:t>를 </a:t>
+            </a:r>
+            <a:r>
+              <a:rPr lang="en-US" altLang="ko-KR" sz="1500" dirty="0" err="1"/>
+              <a:t>greekInput</a:t>
+            </a:r>
+            <a:r>
+              <a:rPr lang="en-US" altLang="ko-KR" sz="1500" dirty="0"/>
+              <a:t> </a:t>
+            </a:r>
+            <a:r>
+              <a:rPr lang="ko-KR" altLang="en-US" sz="1500" dirty="0"/>
+              <a:t>객체의 </a:t>
+            </a:r>
+            <a:r>
+              <a:rPr lang="en-US" altLang="ko-KR" sz="1500" dirty="0"/>
+              <a:t>property</a:t>
+            </a:r>
+            <a:r>
+              <a:rPr lang="ko-KR" altLang="en-US" sz="1500" dirty="0"/>
+              <a:t>에 할당한 후</a:t>
+            </a:r>
+            <a:r>
+              <a:rPr lang="en-US" altLang="ko-KR" sz="1500" dirty="0"/>
+              <a:t>, </a:t>
+            </a:r>
+            <a:r>
+              <a:rPr lang="en-US" altLang="ko-KR" sz="1500" dirty="0" err="1"/>
+              <a:t>greekInput</a:t>
+            </a:r>
+            <a:r>
+              <a:rPr lang="en-US" altLang="ko-KR" sz="1500" dirty="0"/>
+              <a:t> </a:t>
+            </a:r>
+            <a:r>
+              <a:rPr lang="ko-KR" altLang="en-US" sz="1500" dirty="0"/>
+              <a:t>객체를 </a:t>
+            </a:r>
+            <a:r>
+              <a:rPr lang="en-US" altLang="ko-KR" sz="1500" dirty="0" err="1"/>
+              <a:t>greekInputs</a:t>
+            </a:r>
+            <a:r>
+              <a:rPr lang="en-US" altLang="ko-KR" sz="1500" dirty="0"/>
+              <a:t> (List&lt;</a:t>
+            </a:r>
+            <a:r>
+              <a:rPr lang="en-US" altLang="ko-KR" sz="1500" dirty="0" err="1"/>
+              <a:t>GreekInput</a:t>
+            </a:r>
+            <a:r>
+              <a:rPr lang="en-US" altLang="ko-KR" sz="1500" dirty="0"/>
+              <a:t>&gt;)</a:t>
+            </a:r>
+            <a:r>
+              <a:rPr lang="ko-KR" altLang="en-US" sz="1500" dirty="0"/>
+              <a:t>에 넣는다</a:t>
+            </a:r>
+            <a:r>
+              <a:rPr lang="en-US" altLang="ko-KR" sz="1500" dirty="0"/>
+              <a:t>.</a:t>
+            </a:r>
+          </a:p>
+          <a:p>
+            <a:endParaRPr lang="en-US" altLang="ko-KR" sz="1500" dirty="0"/>
+          </a:p>
+          <a:p>
+            <a:r>
+              <a:rPr lang="en-US" altLang="ko-KR" sz="1500" dirty="0"/>
+              <a:t>Multi thread</a:t>
+            </a:r>
+            <a:r>
+              <a:rPr lang="ko-KR" altLang="en-US" sz="1500" dirty="0"/>
+              <a:t>를 사용할 시</a:t>
+            </a:r>
+            <a:r>
+              <a:rPr lang="en-US" altLang="ko-KR" sz="1500" dirty="0"/>
+              <a:t>, thread-safe</a:t>
+            </a:r>
+            <a:r>
+              <a:rPr lang="ko-KR" altLang="en-US" sz="1500" dirty="0"/>
+              <a:t> </a:t>
+            </a:r>
+            <a:r>
+              <a:rPr lang="en-US" altLang="ko-KR" sz="1500" dirty="0"/>
+              <a:t>list</a:t>
+            </a:r>
+            <a:r>
+              <a:rPr lang="ko-KR" altLang="en-US" sz="1500" dirty="0"/>
+              <a:t>를 만든다</a:t>
+            </a:r>
+            <a:r>
+              <a:rPr lang="en-US" altLang="ko-KR" sz="1500" dirty="0"/>
+              <a:t>.</a:t>
+            </a:r>
+          </a:p>
+          <a:p>
+            <a:endParaRPr lang="en-US" altLang="ko-KR" sz="1500" dirty="0"/>
+          </a:p>
+          <a:p>
+            <a:endParaRPr lang="en-US" altLang="ko-KR" sz="1500" dirty="0"/>
+          </a:p>
+          <a:p>
+            <a:endParaRPr lang="ko-KR" altLang="en-US" sz="1500" dirty="0"/>
+          </a:p>
+        </p:txBody>
+      </p:sp>
+      <p:pic>
+        <p:nvPicPr>
+          <p:cNvPr id="5" name="그림 4">
+            <a:extLst>
+              <a:ext uri="{FF2B5EF4-FFF2-40B4-BE49-F238E27FC236}">
+                <a16:creationId xmlns:a16="http://schemas.microsoft.com/office/drawing/2014/main" id="{E24841F3-0E21-9F60-8954-C9EDC789C1B0}"/>
+              </a:ext>
+            </a:extLst>
+          </p:cNvPr>
+          <p:cNvPicPr>
+            <a:picLocks noChangeAspect="1"/>
+          </p:cNvPicPr>
+          <p:nvPr/>
+        </p:nvPicPr>
+        <p:blipFill>
+          <a:blip r:embed="rId2"/>
+          <a:stretch>
+            <a:fillRect/>
+          </a:stretch>
+        </p:blipFill>
+        <p:spPr>
+          <a:xfrm>
+            <a:off x="439721" y="1690688"/>
+            <a:ext cx="3217879" cy="1675288"/>
+          </a:xfrm>
+          <a:prstGeom prst="rect">
+            <a:avLst/>
+          </a:prstGeom>
+        </p:spPr>
+      </p:pic>
+      <p:pic>
+        <p:nvPicPr>
+          <p:cNvPr id="7" name="그림 6">
+            <a:extLst>
+              <a:ext uri="{FF2B5EF4-FFF2-40B4-BE49-F238E27FC236}">
+                <a16:creationId xmlns:a16="http://schemas.microsoft.com/office/drawing/2014/main" id="{47B45274-3AEC-52DE-B79C-75EA6AAF88D4}"/>
+              </a:ext>
+            </a:extLst>
+          </p:cNvPr>
+          <p:cNvPicPr>
+            <a:picLocks noChangeAspect="1"/>
+          </p:cNvPicPr>
+          <p:nvPr/>
+        </p:nvPicPr>
+        <p:blipFill>
+          <a:blip r:embed="rId3"/>
+          <a:stretch>
+            <a:fillRect/>
+          </a:stretch>
+        </p:blipFill>
+        <p:spPr>
+          <a:xfrm>
+            <a:off x="4371976" y="2366407"/>
+            <a:ext cx="5953125" cy="323850"/>
+          </a:xfrm>
+          <a:prstGeom prst="rect">
+            <a:avLst/>
+          </a:prstGeom>
+        </p:spPr>
+      </p:pic>
+    </p:spTree>
+    <p:extLst>
+      <p:ext uri="{BB962C8B-B14F-4D97-AF65-F5344CB8AC3E}">
+        <p14:creationId xmlns:p14="http://schemas.microsoft.com/office/powerpoint/2010/main" val="2604731856"/>
+      </p:ext>
+    </p:extLst>
+  </p:cSld>
+  <p:clrMapOvr>
+    <a:masterClrMapping/>
+  </p:clrMapOvr>
+</p:sld>
+</file>
+
+<file path=ppt/slides/slide14.xml><?xml version="1.0" encoding="utf-8"?>
+<p:sld xmlns:a="http://schemas.openxmlformats.org/drawingml/2006/main" xmlns:r="http://schemas.openxmlformats.org/officeDocument/2006/relationships" xmlns:p="http://schemas.openxmlformats.org/presentationml/2006/main">
+  <p:cSld>
+    <p:spTree>
+      <p:nvGrpSpPr>
+        <p:cNvPr id="1" name=""/>
+        <p:cNvGrpSpPr/>
+        <p:nvPr/>
+      </p:nvGrpSpPr>
+      <p:grpSpPr>
+        <a:xfrm>
+          <a:off x="0" y="0"/>
+          <a:ext cx="0" cy="0"/>
+          <a:chOff x="0" y="0"/>
+          <a:chExt cx="0" cy="0"/>
+        </a:xfrm>
+      </p:grpSpPr>
+      <p:sp>
+        <p:nvSpPr>
+          <p:cNvPr id="2" name="제목 1">
+            <a:extLst>
+              <a:ext uri="{FF2B5EF4-FFF2-40B4-BE49-F238E27FC236}">
+                <a16:creationId xmlns:a16="http://schemas.microsoft.com/office/drawing/2014/main" id="{2D68163F-ABFA-C398-7C28-566B245D4B17}"/>
+              </a:ext>
+            </a:extLst>
+          </p:cNvPr>
+          <p:cNvSpPr>
+            <a:spLocks noGrp="1"/>
+          </p:cNvSpPr>
+          <p:nvPr>
+            <p:ph type="title"/>
+          </p:nvPr>
+        </p:nvSpPr>
+        <p:spPr/>
+        <p:txBody>
+          <a:bodyPr>
+            <a:normAutofit/>
+          </a:bodyPr>
+          <a:lstStyle/>
+          <a:p>
+            <a:r>
+              <a:rPr lang="en-US" altLang="ko-KR" sz="3000" dirty="0" err="1"/>
+              <a:t>calculateOutputs</a:t>
+            </a:r>
+            <a:endParaRPr lang="ko-KR" altLang="en-US" sz="3000" dirty="0"/>
+          </a:p>
+        </p:txBody>
+      </p:sp>
+      <p:sp>
+        <p:nvSpPr>
+          <p:cNvPr id="3" name="내용 개체 틀 2">
+            <a:extLst>
+              <a:ext uri="{FF2B5EF4-FFF2-40B4-BE49-F238E27FC236}">
+                <a16:creationId xmlns:a16="http://schemas.microsoft.com/office/drawing/2014/main" id="{B918CD3F-C6F2-B9A3-5078-D259CE311CE1}"/>
+              </a:ext>
+            </a:extLst>
+          </p:cNvPr>
+          <p:cNvSpPr>
+            <a:spLocks noGrp="1"/>
+          </p:cNvSpPr>
+          <p:nvPr>
+            <p:ph idx="1"/>
+          </p:nvPr>
+        </p:nvSpPr>
+        <p:spPr>
+          <a:xfrm>
+            <a:off x="5410200" y="1825625"/>
+            <a:ext cx="5943599" cy="4351338"/>
+          </a:xfrm>
+        </p:spPr>
+        <p:txBody>
+          <a:bodyPr>
+            <a:normAutofit/>
+          </a:bodyPr>
+          <a:lstStyle/>
+          <a:p>
+            <a:r>
+              <a:rPr lang="en-US" altLang="ko-KR" sz="1500" dirty="0"/>
+              <a:t>Run() method</a:t>
+            </a:r>
+            <a:r>
+              <a:rPr lang="ko-KR" altLang="en-US" sz="1500" dirty="0"/>
+              <a:t>안에 있는 코드가 </a:t>
+            </a:r>
+            <a:r>
+              <a:rPr lang="en-US" altLang="ko-KR" sz="1500" dirty="0"/>
+              <a:t>input</a:t>
+            </a:r>
+            <a:r>
+              <a:rPr lang="ko-KR" altLang="en-US" sz="1500" dirty="0"/>
+              <a:t>에 대한 계산을 수행한다</a:t>
+            </a:r>
+            <a:r>
+              <a:rPr lang="en-US" altLang="ko-KR" sz="1500" dirty="0"/>
+              <a:t>.</a:t>
+            </a:r>
+          </a:p>
+          <a:p>
+            <a:pPr marL="0" indent="0">
+              <a:buNone/>
+            </a:pPr>
+            <a:r>
+              <a:rPr lang="en-US" altLang="ko-KR" sz="1500" dirty="0"/>
+              <a:t>(</a:t>
+            </a:r>
+            <a:r>
+              <a:rPr lang="ko-KR" altLang="en-US" sz="1500" dirty="0"/>
+              <a:t>병렬로 수행되어질 계산을 </a:t>
+            </a:r>
+            <a:r>
+              <a:rPr lang="en-US" altLang="ko-KR" sz="1500" dirty="0"/>
+              <a:t>run method</a:t>
+            </a:r>
+            <a:r>
+              <a:rPr lang="ko-KR" altLang="en-US" sz="1500" dirty="0"/>
+              <a:t>안에 정의한다</a:t>
+            </a:r>
+            <a:r>
+              <a:rPr lang="en-US" altLang="ko-KR" sz="1500" dirty="0"/>
+              <a:t>.)</a:t>
+            </a:r>
+          </a:p>
+          <a:p>
+            <a:r>
+              <a:rPr lang="en-US" altLang="ko-KR" sz="1500" dirty="0"/>
+              <a:t>Runnable interface</a:t>
+            </a:r>
+            <a:r>
+              <a:rPr lang="ko-KR" altLang="en-US" sz="1500" dirty="0"/>
+              <a:t>를 구현하는 </a:t>
+            </a:r>
+            <a:r>
+              <a:rPr lang="en-US" altLang="ko-KR" sz="1500" dirty="0"/>
+              <a:t>class</a:t>
+            </a:r>
+            <a:r>
+              <a:rPr lang="ko-KR" altLang="en-US" sz="1500" dirty="0"/>
+              <a:t>를 사용하는 새로운 </a:t>
+            </a:r>
+            <a:r>
+              <a:rPr lang="en-US" altLang="ko-KR" sz="1500" dirty="0"/>
+              <a:t>thread</a:t>
+            </a:r>
+            <a:r>
+              <a:rPr lang="ko-KR" altLang="en-US" sz="1500" dirty="0"/>
+              <a:t>를 만든다</a:t>
+            </a:r>
+            <a:r>
+              <a:rPr lang="en-US" altLang="ko-KR" sz="1500" dirty="0"/>
+              <a:t>. Runnable interface</a:t>
+            </a:r>
+            <a:r>
+              <a:rPr lang="ko-KR" altLang="en-US" sz="1500" dirty="0"/>
+              <a:t>는 </a:t>
+            </a:r>
+            <a:r>
+              <a:rPr lang="en-US" altLang="ko-KR" sz="1500" dirty="0"/>
+              <a:t>run() </a:t>
+            </a:r>
+            <a:r>
+              <a:rPr lang="ko-KR" altLang="en-US" sz="1500" dirty="0"/>
+              <a:t>메소드 하나만 가진다</a:t>
+            </a:r>
+            <a:r>
+              <a:rPr lang="en-US" altLang="ko-KR" sz="1500" dirty="0"/>
+              <a:t>. </a:t>
+            </a:r>
+          </a:p>
+          <a:p>
+            <a:pPr marL="0" indent="0">
+              <a:buNone/>
+            </a:pPr>
+            <a:endParaRPr lang="en-US" altLang="ko-KR" sz="1500" dirty="0"/>
+          </a:p>
+          <a:p>
+            <a:pPr marL="0" indent="0">
+              <a:buNone/>
+            </a:pPr>
+            <a:endParaRPr lang="en-US" altLang="ko-KR" sz="1500" dirty="0"/>
+          </a:p>
+          <a:p>
+            <a:r>
+              <a:rPr lang="ko-KR" altLang="en-US" sz="1500" dirty="0"/>
+              <a:t>새롭게 만들어진 </a:t>
+            </a:r>
+            <a:r>
+              <a:rPr lang="en-US" altLang="ko-KR" sz="1500" dirty="0"/>
+              <a:t>thread</a:t>
+            </a:r>
+            <a:r>
+              <a:rPr lang="ko-KR" altLang="en-US" sz="1500" dirty="0"/>
+              <a:t>를 실행한다</a:t>
+            </a:r>
+            <a:r>
+              <a:rPr lang="en-US" altLang="ko-KR" sz="1500" dirty="0"/>
+              <a:t>. </a:t>
+            </a:r>
+            <a:r>
+              <a:rPr lang="ko-KR" altLang="en-US" sz="1500" dirty="0"/>
+              <a:t>그리고 실행된 </a:t>
+            </a:r>
+            <a:r>
+              <a:rPr lang="en-US" altLang="ko-KR" sz="1500" dirty="0"/>
+              <a:t>thread</a:t>
+            </a:r>
+            <a:r>
+              <a:rPr lang="ko-KR" altLang="en-US" sz="1500" dirty="0"/>
+              <a:t>를 </a:t>
+            </a:r>
+            <a:r>
+              <a:rPr lang="en-US" altLang="ko-KR" sz="1500" dirty="0" err="1"/>
+              <a:t>usedThread</a:t>
+            </a:r>
+            <a:r>
+              <a:rPr lang="en-US" altLang="ko-KR" sz="1500" dirty="0"/>
+              <a:t> List</a:t>
+            </a:r>
+            <a:r>
+              <a:rPr lang="ko-KR" altLang="en-US" sz="1500" dirty="0"/>
+              <a:t>에 추가한다</a:t>
+            </a:r>
+            <a:r>
+              <a:rPr lang="en-US" altLang="ko-KR" sz="1500" dirty="0"/>
+              <a:t>. Start </a:t>
+            </a:r>
+            <a:r>
+              <a:rPr lang="ko-KR" altLang="en-US" sz="1500" dirty="0"/>
+              <a:t>메소드는 </a:t>
+            </a:r>
+            <a:r>
+              <a:rPr lang="en-US" altLang="ko-KR" sz="1500" dirty="0"/>
+              <a:t>main thread</a:t>
+            </a:r>
+            <a:r>
+              <a:rPr lang="ko-KR" altLang="en-US" sz="1500" dirty="0"/>
+              <a:t>를 막지 않는다</a:t>
+            </a:r>
+            <a:r>
+              <a:rPr lang="en-US" altLang="ko-KR" sz="1500" dirty="0"/>
+              <a:t>. Main thread</a:t>
+            </a:r>
+            <a:r>
+              <a:rPr lang="ko-KR" altLang="en-US" sz="1500" dirty="0"/>
+              <a:t>는 계속해서 </a:t>
+            </a:r>
+            <a:r>
+              <a:rPr lang="en-US" altLang="ko-KR" sz="1500" dirty="0"/>
+              <a:t>lambda</a:t>
+            </a:r>
+            <a:r>
+              <a:rPr lang="ko-KR" altLang="en-US" sz="1500" dirty="0"/>
+              <a:t> </a:t>
+            </a:r>
+            <a:r>
+              <a:rPr lang="en-US" altLang="ko-KR" sz="1500" dirty="0"/>
+              <a:t>for</a:t>
+            </a:r>
+            <a:r>
+              <a:rPr lang="ko-KR" altLang="en-US" sz="1500" dirty="0"/>
+              <a:t> </a:t>
+            </a:r>
+            <a:r>
+              <a:rPr lang="en-US" altLang="ko-KR" sz="1500" dirty="0"/>
+              <a:t>each</a:t>
+            </a:r>
+            <a:r>
+              <a:rPr lang="ko-KR" altLang="en-US" sz="1500" dirty="0"/>
+              <a:t> </a:t>
+            </a:r>
+            <a:r>
+              <a:rPr lang="en-US" altLang="ko-KR" sz="1500" dirty="0"/>
+              <a:t>loop</a:t>
+            </a:r>
+            <a:r>
+              <a:rPr lang="ko-KR" altLang="en-US" sz="1500" dirty="0"/>
+              <a:t>를 실행시킨다</a:t>
+            </a:r>
+            <a:r>
+              <a:rPr lang="en-US" altLang="ko-KR" sz="1500" dirty="0"/>
+              <a:t>.</a:t>
+            </a:r>
+          </a:p>
+          <a:p>
+            <a:r>
+              <a:rPr lang="en-US" altLang="ko-KR" sz="1500" dirty="0"/>
+              <a:t>Main thread</a:t>
+            </a:r>
+            <a:r>
+              <a:rPr lang="ko-KR" altLang="en-US" sz="1500" dirty="0"/>
+              <a:t>는 병렬처리를 실행한 후</a:t>
+            </a:r>
+            <a:r>
+              <a:rPr lang="en-US" altLang="ko-KR" sz="1500" dirty="0"/>
+              <a:t>, while</a:t>
+            </a:r>
+            <a:r>
+              <a:rPr lang="ko-KR" altLang="en-US" sz="1500" dirty="0"/>
+              <a:t>문으로 들어간다</a:t>
+            </a:r>
+            <a:r>
+              <a:rPr lang="en-US" altLang="ko-KR" sz="1500" dirty="0"/>
+              <a:t>. </a:t>
+            </a:r>
+            <a:r>
+              <a:rPr lang="ko-KR" altLang="en-US" sz="1500" dirty="0"/>
+              <a:t>생성된 </a:t>
+            </a:r>
+            <a:r>
+              <a:rPr lang="en-US" altLang="ko-KR" sz="1500" dirty="0"/>
+              <a:t>thread</a:t>
+            </a:r>
+            <a:r>
+              <a:rPr lang="ko-KR" altLang="en-US" sz="1500" dirty="0"/>
+              <a:t>들은 </a:t>
+            </a:r>
+            <a:r>
+              <a:rPr lang="en-US" altLang="ko-KR" sz="1500" dirty="0"/>
+              <a:t>run</a:t>
+            </a:r>
+            <a:r>
+              <a:rPr lang="ko-KR" altLang="en-US" sz="1500" dirty="0"/>
+              <a:t>메소드 안의 코드를 각자 </a:t>
+            </a:r>
+            <a:r>
+              <a:rPr lang="en-US" altLang="ko-KR" sz="1500" dirty="0"/>
+              <a:t>input</a:t>
+            </a:r>
+            <a:r>
+              <a:rPr lang="ko-KR" altLang="en-US" sz="1500" dirty="0"/>
+              <a:t>에 맞춰서 수행한다</a:t>
+            </a:r>
+            <a:r>
+              <a:rPr lang="en-US" altLang="ko-KR" sz="1500" dirty="0"/>
+              <a:t>. </a:t>
+            </a:r>
+            <a:endParaRPr lang="ko-KR" altLang="en-US" sz="1500" dirty="0"/>
+          </a:p>
+        </p:txBody>
+      </p:sp>
+      <p:pic>
+        <p:nvPicPr>
+          <p:cNvPr id="9" name="그림 8">
+            <a:extLst>
+              <a:ext uri="{FF2B5EF4-FFF2-40B4-BE49-F238E27FC236}">
+                <a16:creationId xmlns:a16="http://schemas.microsoft.com/office/drawing/2014/main" id="{B2FC4246-8BFA-9F16-FBE0-A397E71EA27C}"/>
+              </a:ext>
+            </a:extLst>
+          </p:cNvPr>
+          <p:cNvPicPr>
+            <a:picLocks noChangeAspect="1"/>
+          </p:cNvPicPr>
+          <p:nvPr/>
+        </p:nvPicPr>
+        <p:blipFill>
+          <a:blip r:embed="rId2"/>
+          <a:stretch>
+            <a:fillRect/>
+          </a:stretch>
+        </p:blipFill>
+        <p:spPr>
+          <a:xfrm>
+            <a:off x="291849" y="1825625"/>
+            <a:ext cx="4765928" cy="4510088"/>
+          </a:xfrm>
+          <a:prstGeom prst="rect">
+            <a:avLst/>
+          </a:prstGeom>
+        </p:spPr>
+      </p:pic>
+      <p:pic>
+        <p:nvPicPr>
+          <p:cNvPr id="5" name="그림 4">
+            <a:extLst>
+              <a:ext uri="{FF2B5EF4-FFF2-40B4-BE49-F238E27FC236}">
+                <a16:creationId xmlns:a16="http://schemas.microsoft.com/office/drawing/2014/main" id="{8A0A1FAC-E7B1-DEF3-6CA7-714E9AF4732D}"/>
+              </a:ext>
+            </a:extLst>
+          </p:cNvPr>
+          <p:cNvPicPr>
+            <a:picLocks noChangeAspect="1"/>
+          </p:cNvPicPr>
+          <p:nvPr/>
+        </p:nvPicPr>
+        <p:blipFill>
+          <a:blip r:embed="rId3"/>
+          <a:stretch>
+            <a:fillRect/>
+          </a:stretch>
+        </p:blipFill>
+        <p:spPr>
+          <a:xfrm>
+            <a:off x="5410200" y="3038475"/>
+            <a:ext cx="1924050" cy="390525"/>
+          </a:xfrm>
+          <a:prstGeom prst="rect">
+            <a:avLst/>
+          </a:prstGeom>
+        </p:spPr>
+      </p:pic>
+    </p:spTree>
+    <p:extLst>
+      <p:ext uri="{BB962C8B-B14F-4D97-AF65-F5344CB8AC3E}">
+        <p14:creationId xmlns:p14="http://schemas.microsoft.com/office/powerpoint/2010/main" val="2316426376"/>
+      </p:ext>
+    </p:extLst>
+  </p:cSld>
+  <p:clrMapOvr>
+    <a:masterClrMapping/>
+  </p:clrMapOvr>
+</p:sld>
+</file>
+
+<file path=ppt/slides/slide15.xml><?xml version="1.0" encoding="utf-8"?>
+<p:sld xmlns:a="http://schemas.openxmlformats.org/drawingml/2006/main" xmlns:r="http://schemas.openxmlformats.org/officeDocument/2006/relationships" xmlns:p="http://schemas.openxmlformats.org/presentationml/2006/main">
+  <p:cSld>
+    <p:spTree>
+      <p:nvGrpSpPr>
+        <p:cNvPr id="1" name=""/>
+        <p:cNvGrpSpPr/>
+        <p:nvPr/>
+      </p:nvGrpSpPr>
+      <p:grpSpPr>
+        <a:xfrm>
+          <a:off x="0" y="0"/>
+          <a:ext cx="0" cy="0"/>
+          <a:chOff x="0" y="0"/>
+          <a:chExt cx="0" cy="0"/>
+        </a:xfrm>
+      </p:grpSpPr>
+      <p:sp>
+        <p:nvSpPr>
+          <p:cNvPr id="2" name="제목 1">
+            <a:extLst>
+              <a:ext uri="{FF2B5EF4-FFF2-40B4-BE49-F238E27FC236}">
+                <a16:creationId xmlns:a16="http://schemas.microsoft.com/office/drawing/2014/main" id="{B19DE093-2458-930F-CCDD-5AB4FD1756BB}"/>
+              </a:ext>
+            </a:extLst>
+          </p:cNvPr>
+          <p:cNvSpPr>
+            <a:spLocks noGrp="1"/>
+          </p:cNvSpPr>
+          <p:nvPr>
+            <p:ph type="title"/>
+          </p:nvPr>
+        </p:nvSpPr>
+        <p:spPr/>
+        <p:txBody>
+          <a:bodyPr/>
+          <a:lstStyle/>
+          <a:p>
+            <a:endParaRPr lang="ko-KR" altLang="en-US"/>
+          </a:p>
+        </p:txBody>
+      </p:sp>
+      <p:sp>
+        <p:nvSpPr>
+          <p:cNvPr id="3" name="내용 개체 틀 2">
+            <a:extLst>
+              <a:ext uri="{FF2B5EF4-FFF2-40B4-BE49-F238E27FC236}">
+                <a16:creationId xmlns:a16="http://schemas.microsoft.com/office/drawing/2014/main" id="{72DD8585-2335-6665-FA6A-F029202A2E2B}"/>
+              </a:ext>
+            </a:extLst>
+          </p:cNvPr>
+          <p:cNvSpPr>
+            <a:spLocks noGrp="1"/>
+          </p:cNvSpPr>
+          <p:nvPr>
+            <p:ph idx="1"/>
+          </p:nvPr>
+        </p:nvSpPr>
+        <p:spPr>
+          <a:xfrm>
+            <a:off x="381000" y="3811587"/>
+            <a:ext cx="10972800" cy="2365375"/>
+          </a:xfrm>
+        </p:spPr>
+        <p:txBody>
+          <a:bodyPr>
+            <a:normAutofit/>
+          </a:bodyPr>
+          <a:lstStyle/>
+          <a:p>
+            <a:r>
+              <a:rPr lang="en-US" altLang="ko-KR" sz="1500" dirty="0"/>
+              <a:t>Main thread</a:t>
+            </a:r>
+            <a:r>
+              <a:rPr lang="ko-KR" altLang="en-US" sz="1500" dirty="0"/>
+              <a:t>가 각 </a:t>
+            </a:r>
+            <a:r>
+              <a:rPr lang="en-US" altLang="ko-KR" sz="1500" dirty="0"/>
+              <a:t>thread</a:t>
+            </a:r>
+            <a:r>
+              <a:rPr lang="ko-KR" altLang="en-US" sz="1500" dirty="0"/>
+              <a:t>의 상태를 확인하고</a:t>
+            </a:r>
+            <a:r>
+              <a:rPr lang="en-US" altLang="ko-KR" sz="1500" dirty="0"/>
+              <a:t>, loop</a:t>
+            </a:r>
+            <a:r>
+              <a:rPr lang="ko-KR" altLang="en-US" sz="1500" dirty="0"/>
+              <a:t>는 모든 </a:t>
+            </a:r>
+            <a:r>
+              <a:rPr lang="en-US" altLang="ko-KR" sz="1500" dirty="0"/>
+              <a:t>thread</a:t>
+            </a:r>
+            <a:r>
+              <a:rPr lang="ko-KR" altLang="en-US" sz="1500" dirty="0"/>
+              <a:t>가 </a:t>
+            </a:r>
+            <a:r>
+              <a:rPr lang="en-US" altLang="ko-KR" sz="1500" dirty="0"/>
+              <a:t>TERMINATED </a:t>
+            </a:r>
+            <a:r>
+              <a:rPr lang="ko-KR" altLang="en-US" sz="1500" dirty="0"/>
+              <a:t>상태에 도달 해야지 </a:t>
+            </a:r>
+            <a:r>
+              <a:rPr lang="en-US" altLang="ko-KR" sz="1500" dirty="0"/>
+              <a:t>break</a:t>
+            </a:r>
+            <a:r>
+              <a:rPr lang="ko-KR" altLang="en-US" sz="1500" dirty="0"/>
+              <a:t>한다</a:t>
+            </a:r>
+            <a:r>
+              <a:rPr lang="en-US" altLang="ko-KR" sz="1500" dirty="0"/>
+              <a:t>.</a:t>
+            </a:r>
+          </a:p>
+          <a:p>
+            <a:r>
+              <a:rPr lang="en-US" altLang="ko-KR" sz="1500" dirty="0" err="1"/>
+              <a:t>orElse</a:t>
+            </a:r>
+            <a:r>
+              <a:rPr lang="en-US" altLang="ko-KR" sz="1500" dirty="0"/>
+              <a:t>(null) : </a:t>
+            </a:r>
+            <a:r>
+              <a:rPr lang="ko-KR" altLang="en-US" sz="1500" dirty="0"/>
+              <a:t>끝나지 않은 </a:t>
+            </a:r>
+            <a:r>
+              <a:rPr lang="en-US" altLang="ko-KR" sz="1500" dirty="0"/>
+              <a:t>thread</a:t>
+            </a:r>
+            <a:r>
+              <a:rPr lang="ko-KR" altLang="en-US" sz="1500" dirty="0"/>
+              <a:t>가 없을 때</a:t>
+            </a:r>
+            <a:r>
+              <a:rPr lang="en-US" altLang="ko-KR" sz="1500" dirty="0"/>
+              <a:t>, null</a:t>
+            </a:r>
+            <a:r>
+              <a:rPr lang="ko-KR" altLang="en-US" sz="1500" dirty="0"/>
+              <a:t>을 반환한다</a:t>
+            </a:r>
+            <a:r>
+              <a:rPr lang="en-US" altLang="ko-KR" sz="1500" dirty="0"/>
+              <a:t>.</a:t>
+            </a:r>
+          </a:p>
+          <a:p>
+            <a:r>
+              <a:rPr lang="en-US" altLang="ko-KR" sz="1500" dirty="0"/>
+              <a:t>Main thread</a:t>
+            </a:r>
+            <a:r>
+              <a:rPr lang="ko-KR" altLang="en-US" sz="1500" dirty="0"/>
+              <a:t>를 </a:t>
+            </a:r>
+            <a:r>
+              <a:rPr lang="en-US" altLang="ko-KR" sz="1500" dirty="0"/>
+              <a:t>10 millisecond </a:t>
+            </a:r>
+            <a:r>
+              <a:rPr lang="ko-KR" altLang="en-US" sz="1500" dirty="0"/>
+              <a:t>동안 쉬게 함으로써</a:t>
+            </a:r>
+            <a:r>
+              <a:rPr lang="en-US" altLang="ko-KR" sz="1500" dirty="0"/>
+              <a:t>, busy waiting</a:t>
+            </a:r>
+            <a:r>
+              <a:rPr lang="ko-KR" altLang="en-US" sz="1500" dirty="0"/>
+              <a:t>을 막는다</a:t>
+            </a:r>
+            <a:r>
+              <a:rPr lang="en-US" altLang="ko-KR" sz="1500" dirty="0"/>
+              <a:t>.</a:t>
+            </a:r>
+            <a:endParaRPr lang="ko-KR" altLang="en-US" sz="1500" dirty="0"/>
+          </a:p>
+        </p:txBody>
+      </p:sp>
+      <p:pic>
+        <p:nvPicPr>
+          <p:cNvPr id="5" name="그림 4">
+            <a:extLst>
+              <a:ext uri="{FF2B5EF4-FFF2-40B4-BE49-F238E27FC236}">
+                <a16:creationId xmlns:a16="http://schemas.microsoft.com/office/drawing/2014/main" id="{E091DC87-E924-B1D8-BA1B-17A7F72F48C2}"/>
+              </a:ext>
+            </a:extLst>
+          </p:cNvPr>
+          <p:cNvPicPr>
+            <a:picLocks noChangeAspect="1"/>
+          </p:cNvPicPr>
+          <p:nvPr/>
+        </p:nvPicPr>
+        <p:blipFill>
+          <a:blip r:embed="rId2"/>
+          <a:stretch>
+            <a:fillRect/>
+          </a:stretch>
+        </p:blipFill>
+        <p:spPr>
+          <a:xfrm>
+            <a:off x="288745" y="1825625"/>
+            <a:ext cx="6810021" cy="1851025"/>
+          </a:xfrm>
+          <a:prstGeom prst="rect">
+            <a:avLst/>
+          </a:prstGeom>
+        </p:spPr>
+      </p:pic>
+    </p:spTree>
+    <p:extLst>
+      <p:ext uri="{BB962C8B-B14F-4D97-AF65-F5344CB8AC3E}">
+        <p14:creationId xmlns:p14="http://schemas.microsoft.com/office/powerpoint/2010/main" val="3210394440"/>
+      </p:ext>
+    </p:extLst>
+  </p:cSld>
+  <p:clrMapOvr>
+    <a:masterClrMapping/>
+  </p:clrMapOvr>
+</p:sld>
+</file>
+
+<file path=ppt/slides/slide16.xml><?xml version="1.0" encoding="utf-8"?>
+<p:sld xmlns:a="http://schemas.openxmlformats.org/drawingml/2006/main" xmlns:r="http://schemas.openxmlformats.org/officeDocument/2006/relationships" xmlns:p="http://schemas.openxmlformats.org/presentationml/2006/main">
+  <p:cSld>
+    <p:spTree>
+      <p:nvGrpSpPr>
+        <p:cNvPr id="1" name=""/>
+        <p:cNvGrpSpPr/>
+        <p:nvPr/>
+      </p:nvGrpSpPr>
+      <p:grpSpPr>
+        <a:xfrm>
+          <a:off x="0" y="0"/>
+          <a:ext cx="0" cy="0"/>
+          <a:chOff x="0" y="0"/>
+          <a:chExt cx="0" cy="0"/>
+        </a:xfrm>
+      </p:grpSpPr>
+      <p:sp>
+        <p:nvSpPr>
+          <p:cNvPr id="2" name="제목 1">
+            <a:extLst>
+              <a:ext uri="{FF2B5EF4-FFF2-40B4-BE49-F238E27FC236}">
+                <a16:creationId xmlns:a16="http://schemas.microsoft.com/office/drawing/2014/main" id="{D28419F3-7794-E95C-2050-9A7B3FE47EEF}"/>
+              </a:ext>
+            </a:extLst>
+          </p:cNvPr>
+          <p:cNvSpPr>
+            <a:spLocks noGrp="1"/>
+          </p:cNvSpPr>
+          <p:nvPr>
+            <p:ph type="title"/>
+          </p:nvPr>
+        </p:nvSpPr>
+        <p:spPr/>
+        <p:txBody>
+          <a:bodyPr/>
+          <a:lstStyle/>
+          <a:p>
+            <a:endParaRPr lang="ko-KR" altLang="en-US"/>
+          </a:p>
+        </p:txBody>
+      </p:sp>
+      <p:sp>
+        <p:nvSpPr>
+          <p:cNvPr id="3" name="내용 개체 틀 2">
+            <a:extLst>
+              <a:ext uri="{FF2B5EF4-FFF2-40B4-BE49-F238E27FC236}">
+                <a16:creationId xmlns:a16="http://schemas.microsoft.com/office/drawing/2014/main" id="{DF8253D4-F4C3-691F-2B91-DBF93AC8AEEE}"/>
+              </a:ext>
+            </a:extLst>
+          </p:cNvPr>
+          <p:cNvSpPr>
+            <a:spLocks noGrp="1"/>
+          </p:cNvSpPr>
+          <p:nvPr>
+            <p:ph idx="1"/>
+          </p:nvPr>
+        </p:nvSpPr>
+        <p:spPr/>
+        <p:txBody>
+          <a:bodyPr>
+            <a:normAutofit/>
+          </a:bodyPr>
+          <a:lstStyle/>
+          <a:p>
+            <a:r>
+              <a:rPr lang="ko-KR" altLang="en-US" sz="1500" dirty="0"/>
+              <a:t>병렬 처리 개선 방안</a:t>
+            </a:r>
+            <a:r>
+              <a:rPr lang="en-US" altLang="ko-KR" sz="1500" dirty="0"/>
+              <a:t>1</a:t>
+            </a:r>
+          </a:p>
+          <a:p>
+            <a:pPr marL="0" indent="0">
+              <a:buNone/>
+            </a:pPr>
+            <a:r>
+              <a:rPr lang="ko-KR" altLang="en-US" sz="1500" dirty="0"/>
+              <a:t>각 계산 마다 </a:t>
+            </a:r>
+            <a:r>
+              <a:rPr lang="en-US" altLang="ko-KR" sz="1500" dirty="0"/>
+              <a:t>thread</a:t>
+            </a:r>
+            <a:r>
+              <a:rPr lang="ko-KR" altLang="en-US" sz="1500" dirty="0"/>
+              <a:t>를 생성하는 것 대신에 </a:t>
+            </a:r>
+            <a:r>
+              <a:rPr lang="en-US" altLang="ko-KR" sz="1500" dirty="0"/>
+              <a:t>thread pool</a:t>
+            </a:r>
+            <a:r>
+              <a:rPr lang="ko-KR" altLang="en-US" sz="1500" dirty="0"/>
+              <a:t>을 사용한다</a:t>
+            </a:r>
+            <a:r>
+              <a:rPr lang="en-US" altLang="ko-KR" sz="1500" dirty="0"/>
+              <a:t>.</a:t>
+            </a:r>
+          </a:p>
+          <a:p>
+            <a:r>
+              <a:rPr lang="ko-KR" altLang="en-US" sz="1500" dirty="0"/>
+              <a:t>장점</a:t>
+            </a:r>
+            <a:endParaRPr lang="en-US" altLang="ko-KR" sz="1500" dirty="0"/>
+          </a:p>
+          <a:p>
+            <a:pPr marL="342900" indent="-342900">
+              <a:buFont typeface="+mj-lt"/>
+              <a:buAutoNum type="arabicPeriod"/>
+            </a:pPr>
+            <a:r>
+              <a:rPr lang="en-US" altLang="ko-KR" sz="1500" dirty="0"/>
+              <a:t>Thread pool</a:t>
+            </a:r>
+            <a:r>
+              <a:rPr lang="ko-KR" altLang="en-US" sz="1500" dirty="0"/>
+              <a:t>은 </a:t>
+            </a:r>
+            <a:r>
+              <a:rPr lang="en-US" altLang="ko-KR" sz="1500" dirty="0"/>
+              <a:t>Thread</a:t>
+            </a:r>
+            <a:r>
+              <a:rPr lang="ko-KR" altLang="en-US" sz="1500" dirty="0"/>
+              <a:t>를 재사용한다</a:t>
+            </a:r>
+            <a:r>
+              <a:rPr lang="en-US" altLang="ko-KR" sz="1500" dirty="0"/>
+              <a:t>.</a:t>
+            </a:r>
+          </a:p>
+          <a:p>
+            <a:pPr marL="342900" indent="-342900">
+              <a:buFont typeface="+mj-lt"/>
+              <a:buAutoNum type="arabicPeriod"/>
+            </a:pPr>
+            <a:r>
+              <a:rPr lang="ko-KR" altLang="en-US" sz="1500" dirty="0"/>
+              <a:t>동시에 작동하는 </a:t>
+            </a:r>
+            <a:r>
+              <a:rPr lang="en-US" altLang="ko-KR" sz="1500" dirty="0"/>
+              <a:t>thread</a:t>
+            </a:r>
+            <a:r>
+              <a:rPr lang="ko-KR" altLang="en-US" sz="1500" dirty="0"/>
+              <a:t>의 양을 제한함으로써</a:t>
+            </a:r>
+            <a:r>
+              <a:rPr lang="en-US" altLang="ko-KR" sz="1500" dirty="0"/>
+              <a:t>, </a:t>
+            </a:r>
+            <a:r>
+              <a:rPr lang="ko-KR" altLang="en-US" sz="1500" dirty="0"/>
+              <a:t>자원 고갈을 막는다</a:t>
+            </a:r>
+            <a:r>
+              <a:rPr lang="en-US" altLang="ko-KR" sz="1500" dirty="0"/>
+              <a:t>.</a:t>
+            </a:r>
+          </a:p>
+          <a:p>
+            <a:pPr marL="342900" indent="-342900">
+              <a:buFont typeface="+mj-lt"/>
+              <a:buAutoNum type="arabicPeriod"/>
+            </a:pPr>
+            <a:r>
+              <a:rPr lang="en-US" altLang="ko-KR" sz="1500" dirty="0"/>
+              <a:t>Thread </a:t>
+            </a:r>
+            <a:r>
+              <a:rPr lang="ko-KR" altLang="en-US" sz="1500" dirty="0"/>
+              <a:t>만드는 시간을 줄임으로 써</a:t>
+            </a:r>
+            <a:r>
+              <a:rPr lang="en-US" altLang="ko-KR" sz="1500" dirty="0"/>
+              <a:t>, </a:t>
+            </a:r>
+            <a:r>
+              <a:rPr lang="ko-KR" altLang="en-US" sz="1500" dirty="0"/>
+              <a:t>작업 수행 성능이 좋아진다</a:t>
+            </a:r>
+            <a:r>
+              <a:rPr lang="en-US" altLang="ko-KR" sz="1500" dirty="0"/>
+              <a:t>.</a:t>
+            </a:r>
+          </a:p>
+          <a:p>
+            <a:pPr marL="342900" indent="-342900">
+              <a:buFont typeface="+mj-lt"/>
+              <a:buAutoNum type="arabicPeriod"/>
+            </a:pPr>
+            <a:r>
+              <a:rPr lang="ko-KR" altLang="en-US" sz="1500" dirty="0"/>
+              <a:t>새로운 </a:t>
+            </a:r>
+            <a:r>
+              <a:rPr lang="en-US" altLang="ko-KR" sz="1500" dirty="0"/>
+              <a:t>Thread</a:t>
+            </a:r>
+            <a:r>
+              <a:rPr lang="ko-KR" altLang="en-US" sz="1500" dirty="0"/>
+              <a:t>를 만들고</a:t>
+            </a:r>
+            <a:r>
+              <a:rPr lang="en-US" altLang="ko-KR" sz="1500" dirty="0"/>
+              <a:t>, </a:t>
+            </a:r>
+            <a:r>
+              <a:rPr lang="ko-KR" altLang="en-US" sz="1500" dirty="0"/>
+              <a:t>없애는 것은 비용이 많이 든다</a:t>
+            </a:r>
+            <a:r>
+              <a:rPr lang="en-US" altLang="ko-KR" sz="1500" dirty="0"/>
+              <a:t>.</a:t>
+            </a:r>
+            <a:endParaRPr lang="ko-KR" altLang="en-US" sz="1500" dirty="0"/>
+          </a:p>
+        </p:txBody>
+      </p:sp>
+    </p:spTree>
+    <p:extLst>
+      <p:ext uri="{BB962C8B-B14F-4D97-AF65-F5344CB8AC3E}">
+        <p14:creationId xmlns:p14="http://schemas.microsoft.com/office/powerpoint/2010/main" val="2435716147"/>
+      </p:ext>
+    </p:extLst>
+  </p:cSld>
+  <p:clrMapOvr>
+    <a:masterClrMapping/>
+  </p:clrMapOvr>
+</p:sld>
+</file>
+
 <file path=ppt/slides/slide2.xml><?xml version="1.0" encoding="utf-8"?>
 <p:sld xmlns:a="http://schemas.openxmlformats.org/drawingml/2006/main" xmlns:r="http://schemas.openxmlformats.org/officeDocument/2006/relationships" xmlns:p="http://schemas.openxmlformats.org/presentationml/2006/main">
   <p:cSld>
@@ -3672,7 +5686,7 @@
           <p:cNvPr id="2" name="제목 1">
             <a:extLst>
               <a:ext uri="{FF2B5EF4-FFF2-40B4-BE49-F238E27FC236}">
-                <a16:creationId xmlns:a16="http://schemas.microsoft.com/office/drawing/2014/main" id="{8439FA86-5439-D260-CA08-C0E3B6F36900}"/>
+                <a16:creationId xmlns:a16="http://schemas.microsoft.com/office/drawing/2014/main" id="{DC3C63E8-FC40-E7A8-1103-12A6DDDDCF1C}"/>
               </a:ext>
             </a:extLst>
           </p:cNvPr>
@@ -3692,7 +5706,7 @@
           <a:p>
             <a:r>
               <a:rPr lang="ko-KR" altLang="en-US" sz="3000" dirty="0"/>
-              <a:t>추상 팩토리 패턴</a:t>
+              <a:t>전체 흐름</a:t>
             </a:r>
           </a:p>
         </p:txBody>
@@ -3702,7 +5716,7 @@
           <p:cNvPr id="3" name="내용 개체 틀 2">
             <a:extLst>
               <a:ext uri="{FF2B5EF4-FFF2-40B4-BE49-F238E27FC236}">
-                <a16:creationId xmlns:a16="http://schemas.microsoft.com/office/drawing/2014/main" id="{7A6EF342-1DE9-8B5F-76D4-EFA5127576B7}"/>
+                <a16:creationId xmlns:a16="http://schemas.microsoft.com/office/drawing/2014/main" id="{7BEB35CF-17D3-25AF-49A4-1F4314CF6C27}"/>
               </a:ext>
             </a:extLst>
           </p:cNvPr>
@@ -3722,57 +5736,306 @@
           <a:p>
             <a:r>
               <a:rPr lang="en-US" altLang="ko-KR" sz="1500" dirty="0"/>
-              <a:t>Dividend</a:t>
-            </a:r>
-            <a:r>
-              <a:rPr lang="ko-KR" altLang="en-US" sz="1500" dirty="0"/>
-              <a:t>을 계산에 사용할 지 여부를 결정하는 </a:t>
-            </a:r>
-            <a:r>
-              <a:rPr lang="en-US" altLang="ko-KR" sz="1500" dirty="0"/>
-              <a:t>USE_DIVIDEND (</a:t>
-            </a:r>
-            <a:r>
-              <a:rPr lang="ko-KR" altLang="en-US" sz="1500" dirty="0"/>
-              <a:t>이거 </a:t>
-            </a:r>
-            <a:r>
-              <a:rPr lang="en-US" altLang="ko-KR" sz="1500" dirty="0"/>
-              <a:t>final</a:t>
+              <a:t>Calculator</a:t>
+            </a:r>
+            <a:r>
+              <a:rPr lang="ko-KR" altLang="en-US" sz="1500" dirty="0"/>
+              <a:t>클래스의 </a:t>
+            </a:r>
+            <a:r>
+              <a:rPr lang="en-US" altLang="ko-KR" sz="1500" dirty="0"/>
+              <a:t>calculate </a:t>
+            </a:r>
+            <a:r>
+              <a:rPr lang="ko-KR" altLang="en-US" sz="1500" dirty="0"/>
+              <a:t>메서드 실행</a:t>
+            </a:r>
+            <a:endParaRPr lang="en-US" altLang="ko-KR" sz="1500" dirty="0"/>
+          </a:p>
+          <a:p>
+            <a:r>
+              <a:rPr lang="en-US" altLang="ko-KR" sz="1500" dirty="0"/>
+              <a:t>Calculate</a:t>
+            </a:r>
+            <a:r>
+              <a:rPr lang="ko-KR" altLang="en-US" sz="1500" dirty="0"/>
+              <a:t>메서드는 </a:t>
+            </a:r>
+            <a:r>
+              <a:rPr lang="en-US" altLang="ko-KR" sz="1500" dirty="0" err="1"/>
+              <a:t>calculateByPricer</a:t>
+            </a:r>
+            <a:r>
+              <a:rPr lang="en-US" altLang="ko-KR" sz="1500" dirty="0"/>
+              <a:t> </a:t>
+            </a:r>
+            <a:r>
+              <a:rPr lang="ko-KR" altLang="en-US" sz="1500" dirty="0"/>
+              <a:t>호출</a:t>
+            </a:r>
+            <a:endParaRPr lang="en-US" altLang="ko-KR" sz="1500" dirty="0"/>
+          </a:p>
+          <a:p>
+            <a:pPr marL="0" indent="0">
+              <a:buNone/>
+            </a:pPr>
+            <a:r>
+              <a:rPr lang="ko-KR" altLang="en-US" sz="1500" dirty="0"/>
+              <a:t>이 경우</a:t>
+            </a:r>
+            <a:r>
+              <a:rPr lang="en-US" altLang="ko-KR" sz="1500" dirty="0"/>
+              <a:t>, </a:t>
+            </a:r>
+            <a:r>
+              <a:rPr lang="en-US" altLang="ko-KR" sz="1500" dirty="0" err="1"/>
+              <a:t>StepDownPricingFactory</a:t>
+            </a:r>
+            <a:r>
+              <a:rPr lang="ko-KR" altLang="en-US" sz="1500" dirty="0"/>
+              <a:t>의 </a:t>
+            </a:r>
+            <a:r>
+              <a:rPr lang="en-US" altLang="ko-KR" sz="1500" dirty="0"/>
+              <a:t>calculate</a:t>
+            </a:r>
+            <a:r>
+              <a:rPr lang="ko-KR" altLang="en-US" sz="1500" dirty="0"/>
+              <a:t>호출</a:t>
+            </a:r>
+            <a:endParaRPr lang="en-US" altLang="ko-KR" sz="1500" dirty="0"/>
+          </a:p>
+          <a:p>
+            <a:pPr marL="0" indent="0">
+              <a:buNone/>
+            </a:pPr>
+            <a:r>
+              <a:rPr lang="ko-KR" altLang="en-US" sz="1500" dirty="0"/>
+              <a:t>가격 계산 후</a:t>
+            </a:r>
+            <a:r>
+              <a:rPr lang="en-US" altLang="ko-KR" sz="1500" dirty="0"/>
+              <a:t>, </a:t>
+            </a:r>
+            <a:r>
+              <a:rPr lang="en-US" altLang="ko-KR" sz="1500" dirty="0" err="1"/>
+              <a:t>greeks</a:t>
+            </a:r>
+            <a:r>
+              <a:rPr lang="ko-KR" altLang="en-US" sz="1500" dirty="0"/>
+              <a:t> 계산이 필요한지 확인 </a:t>
+            </a:r>
+            <a:r>
+              <a:rPr lang="en-US" altLang="ko-KR" sz="1500" dirty="0"/>
+              <a:t>(</a:t>
+            </a:r>
+            <a:r>
+              <a:rPr lang="en-US" altLang="ko-KR" sz="1500" dirty="0" err="1"/>
+              <a:t>greekFlag</a:t>
+            </a:r>
+            <a:r>
+              <a:rPr lang="en-US" altLang="ko-KR" sz="1500" dirty="0"/>
+              <a:t>)</a:t>
+            </a:r>
+          </a:p>
+          <a:p>
+            <a:pPr marL="0" indent="0">
+              <a:buNone/>
+            </a:pPr>
+            <a:r>
+              <a:rPr lang="en-US" altLang="ko-KR" sz="1500" dirty="0"/>
+              <a:t>Greeks</a:t>
+            </a:r>
+            <a:r>
+              <a:rPr lang="ko-KR" altLang="en-US" sz="1500" dirty="0"/>
+              <a:t>계산이 필요할 시</a:t>
+            </a:r>
+            <a:r>
+              <a:rPr lang="en-US" altLang="ko-KR" sz="1500" dirty="0"/>
+              <a:t>, </a:t>
+            </a:r>
+            <a:r>
+              <a:rPr lang="en-US" altLang="ko-KR" sz="1500" dirty="0" err="1"/>
+              <a:t>GreeksUtil.calculateGreeks</a:t>
+            </a:r>
+            <a:r>
+              <a:rPr lang="en-US" altLang="ko-KR" sz="1500" dirty="0"/>
+              <a:t>() </a:t>
+            </a:r>
+            <a:r>
+              <a:rPr lang="ko-KR" altLang="en-US" sz="1500" dirty="0"/>
+              <a:t>호출</a:t>
+            </a:r>
+            <a:endParaRPr lang="en-US" altLang="ko-KR" sz="1500" dirty="0"/>
+          </a:p>
+          <a:p>
+            <a:r>
+              <a:rPr lang="en-US" altLang="ko-KR" sz="1500" dirty="0" err="1"/>
+              <a:t>GreeksUtil.calculateGreeks</a:t>
+            </a:r>
+            <a:r>
+              <a:rPr lang="en-US" altLang="ko-KR" sz="1500" dirty="0"/>
+              <a:t>()</a:t>
+            </a:r>
+            <a:r>
+              <a:rPr lang="ko-KR" altLang="en-US" sz="1500" dirty="0"/>
+              <a:t>는 다음 호출</a:t>
+            </a:r>
+            <a:endParaRPr lang="en-US" altLang="ko-KR" sz="1500" dirty="0"/>
+          </a:p>
+          <a:p>
+            <a:pPr marL="0" indent="0">
+              <a:buNone/>
+            </a:pPr>
+            <a:r>
+              <a:rPr lang="en-US" altLang="ko-KR" sz="1500" dirty="0" err="1"/>
+              <a:t>generateInputs</a:t>
+            </a:r>
+            <a:r>
+              <a:rPr lang="en-US" altLang="ko-KR" sz="1500" dirty="0"/>
+              <a:t>()</a:t>
             </a:r>
             <a:r>
               <a:rPr lang="ko-KR" altLang="en-US" sz="1500" dirty="0"/>
               <a:t>로 </a:t>
             </a:r>
             <a:r>
-              <a:rPr lang="ko-KR" altLang="en-US" sz="1500" dirty="0" err="1"/>
-              <a:t>되서</a:t>
-            </a:r>
-            <a:r>
-              <a:rPr lang="ko-KR" altLang="en-US" sz="1500" dirty="0"/>
-              <a:t> 바뀔 수 없게 </a:t>
-            </a:r>
-            <a:r>
-              <a:rPr lang="ko-KR" altLang="en-US" sz="1500" dirty="0" err="1"/>
-              <a:t>되있는</a:t>
-            </a:r>
-            <a:r>
-              <a:rPr lang="ko-KR" altLang="en-US" sz="1500" dirty="0"/>
-              <a:t> 데 이유</a:t>
-            </a:r>
-            <a:r>
-              <a:rPr lang="en-US" altLang="ko-KR" sz="1500" dirty="0"/>
-              <a:t>?)</a:t>
-            </a:r>
-          </a:p>
-          <a:p>
-            <a:r>
-              <a:rPr lang="en-US" altLang="ko-KR" sz="1500" dirty="0"/>
-              <a:t>Calculate </a:t>
-            </a:r>
-            <a:r>
-              <a:rPr lang="ko-KR" altLang="en-US" sz="1500" dirty="0"/>
-              <a:t>메소드가 오버 라이딩 되지 않을 시에</a:t>
+              <a:rPr lang="en-US" altLang="ko-KR" sz="1500" dirty="0"/>
+              <a:t>perturbed input </a:t>
+            </a:r>
+            <a:r>
+              <a:rPr lang="ko-KR" altLang="en-US" sz="1500" dirty="0"/>
+              <a:t>여러 개 생성 </a:t>
+            </a:r>
+            <a:r>
+              <a:rPr lang="en-US" altLang="ko-KR" sz="1500" dirty="0"/>
+              <a:t>(</a:t>
+            </a:r>
+            <a:r>
+              <a:rPr lang="ko-KR" altLang="en-US" sz="1500" dirty="0"/>
+              <a:t>이 과정에서 생성되는 </a:t>
+            </a:r>
+            <a:r>
+              <a:rPr lang="en-US" altLang="ko-KR" sz="1500" dirty="0"/>
+              <a:t>input</a:t>
+            </a:r>
+            <a:r>
+              <a:rPr lang="ko-KR" altLang="en-US" sz="1500" dirty="0"/>
+              <a:t>은 </a:t>
+            </a:r>
+            <a:r>
+              <a:rPr lang="en-US" altLang="ko-KR" sz="1500" dirty="0" err="1"/>
+              <a:t>CalculationType.PRICE</a:t>
+            </a:r>
+            <a:r>
+              <a:rPr lang="ko-KR" altLang="en-US" sz="1500" dirty="0"/>
+              <a:t>로 세팅</a:t>
+            </a:r>
+            <a:r>
+              <a:rPr lang="en-US" altLang="ko-KR" sz="1500" dirty="0"/>
+              <a:t>)</a:t>
+            </a:r>
+          </a:p>
+          <a:p>
+            <a:pPr marL="0" indent="0">
+              <a:buNone/>
+            </a:pPr>
+            <a:r>
+              <a:rPr lang="ko-KR" altLang="en-US" sz="1500" dirty="0"/>
+              <a:t>이 </a:t>
+            </a:r>
+            <a:r>
+              <a:rPr lang="en-US" altLang="ko-KR" sz="1500" dirty="0"/>
+              <a:t>perturbed input</a:t>
+            </a:r>
+            <a:r>
+              <a:rPr lang="ko-KR" altLang="en-US" sz="1500" dirty="0"/>
+              <a:t>의 </a:t>
+            </a:r>
+            <a:r>
+              <a:rPr lang="en-US" altLang="ko-KR" sz="1500" dirty="0"/>
+              <a:t>price </a:t>
+            </a:r>
+            <a:r>
+              <a:rPr lang="ko-KR" altLang="en-US" sz="1500" dirty="0"/>
+              <a:t>계산을 위해 </a:t>
+            </a:r>
+            <a:r>
+              <a:rPr lang="en-US" altLang="ko-KR" sz="1500" dirty="0" err="1"/>
+              <a:t>calculateOutput</a:t>
+            </a:r>
+            <a:r>
+              <a:rPr lang="en-US" altLang="ko-KR" sz="1500" dirty="0"/>
+              <a:t>() </a:t>
+            </a:r>
+            <a:r>
+              <a:rPr lang="ko-KR" altLang="en-US" sz="1500" dirty="0"/>
+              <a:t>호출</a:t>
+            </a:r>
+            <a:r>
+              <a:rPr lang="en-US" altLang="ko-KR" sz="1500" dirty="0"/>
+              <a:t>.</a:t>
+            </a:r>
+          </a:p>
+          <a:p>
+            <a:pPr marL="0" indent="0">
+              <a:buNone/>
+            </a:pPr>
+            <a:r>
+              <a:rPr lang="en-US" altLang="ko-KR" sz="1500" dirty="0" err="1"/>
+              <a:t>calculateOutput</a:t>
+            </a:r>
+            <a:r>
+              <a:rPr lang="en-US" altLang="ko-KR" sz="1500" dirty="0"/>
+              <a:t>()</a:t>
+            </a:r>
+            <a:r>
+              <a:rPr lang="ko-KR" altLang="en-US" sz="1500" dirty="0"/>
+              <a:t>은 새로운 </a:t>
+            </a:r>
+            <a:r>
+              <a:rPr lang="en-US" altLang="ko-KR" sz="1500" dirty="0"/>
+              <a:t>Calculator instance </a:t>
+            </a:r>
+            <a:r>
+              <a:rPr lang="ko-KR" altLang="en-US" sz="1500" dirty="0"/>
+              <a:t>생성하고</a:t>
+            </a:r>
+            <a:r>
+              <a:rPr lang="en-US" altLang="ko-KR" sz="1500" dirty="0"/>
+              <a:t>, perturbed input</a:t>
+            </a:r>
+            <a:r>
+              <a:rPr lang="ko-KR" altLang="en-US" sz="1500" dirty="0"/>
+              <a:t>을 </a:t>
+            </a:r>
+            <a:r>
+              <a:rPr lang="en-US" altLang="ko-KR" sz="1500" dirty="0"/>
+              <a:t>parameter</a:t>
+            </a:r>
+            <a:r>
+              <a:rPr lang="ko-KR" altLang="en-US" sz="1500" dirty="0"/>
+              <a:t>로 </a:t>
+            </a:r>
+            <a:r>
+              <a:rPr lang="en-US" altLang="ko-KR" sz="1500" dirty="0" err="1"/>
+              <a:t>calculateByPricer</a:t>
+            </a:r>
+            <a:r>
+              <a:rPr lang="en-US" altLang="ko-KR" sz="1500" dirty="0"/>
+              <a:t>() </a:t>
+            </a:r>
+            <a:r>
+              <a:rPr lang="ko-KR" altLang="en-US" sz="1500" dirty="0"/>
+              <a:t>메소드 호출</a:t>
+            </a:r>
+            <a:r>
+              <a:rPr lang="en-US" altLang="ko-KR" sz="1500" dirty="0"/>
+              <a:t>. </a:t>
+            </a:r>
+            <a:r>
+              <a:rPr lang="ko-KR" altLang="en-US" sz="1500" dirty="0"/>
+              <a:t>이 경우</a:t>
             </a:r>
             <a:r>
               <a:rPr lang="en-US" altLang="ko-KR" sz="1500" dirty="0"/>
@@ -3780,11 +6043,7 @@
             </a:r>
             <a:r>
               <a:rPr lang="en-US" altLang="ko-KR" sz="1500" dirty="0" err="1"/>
-              <a:t>CalculationOutput</a:t>
-            </a:r>
-            <a:r>
-              <a:rPr lang="en-US" altLang="ko-KR" sz="1500" dirty="0"/>
-              <a:t> class type</a:t>
+              <a:t>StepDownPricingFactory</a:t>
             </a:r>
             <a:r>
               <a:rPr lang="ko-KR" altLang="en-US" sz="1500" dirty="0"/>
@@ -3792,61 +6051,167 @@
             </a:r>
             <a:r>
               <a:rPr lang="en-US" altLang="ko-KR" sz="1500" dirty="0"/>
+              <a:t>calculate</a:t>
+            </a:r>
+            <a:r>
+              <a:rPr lang="ko-KR" altLang="en-US" sz="1500" dirty="0"/>
+              <a:t>가 호출되는데</a:t>
+            </a:r>
+            <a:r>
+              <a:rPr lang="en-US" altLang="ko-KR" sz="1500" dirty="0"/>
+              <a:t>, </a:t>
+            </a:r>
+            <a:r>
+              <a:rPr lang="en-US" altLang="ko-KR" sz="1500" dirty="0" err="1"/>
+              <a:t>CalculationType</a:t>
+            </a:r>
+            <a:r>
+              <a:rPr lang="ko-KR" altLang="en-US" sz="1500" dirty="0"/>
+              <a:t>이 이제 </a:t>
+            </a:r>
+            <a:r>
+              <a:rPr lang="en-US" altLang="ko-KR" sz="1500" dirty="0"/>
+              <a:t>PRICE</a:t>
+            </a:r>
+            <a:r>
+              <a:rPr lang="ko-KR" altLang="en-US" sz="1500" dirty="0"/>
+              <a:t>이므로</a:t>
+            </a:r>
+            <a:r>
+              <a:rPr lang="en-US" altLang="ko-KR" sz="1500" dirty="0"/>
+              <a:t>, </a:t>
+            </a:r>
+            <a:r>
+              <a:rPr lang="en-US" altLang="ko-KR" sz="1500" dirty="0" err="1"/>
+              <a:t>CommonUtil</a:t>
+            </a:r>
+            <a:r>
+              <a:rPr lang="ko-KR" altLang="en-US" sz="1500" dirty="0"/>
+              <a:t>의 </a:t>
+            </a:r>
+            <a:r>
+              <a:rPr lang="en-US" altLang="ko-KR" sz="1500" dirty="0" err="1"/>
+              <a:t>needGreeks</a:t>
+            </a:r>
+            <a:r>
+              <a:rPr lang="ko-KR" altLang="en-US" sz="1500" dirty="0"/>
+              <a:t>가 호출 시</a:t>
+            </a:r>
+            <a:r>
+              <a:rPr lang="en-US" altLang="ko-KR" sz="1500" dirty="0"/>
+              <a:t>, </a:t>
+            </a:r>
+            <a:r>
+              <a:rPr lang="en-US" altLang="ko-KR" sz="1500" dirty="0" err="1"/>
+              <a:t>greekFlag</a:t>
+            </a:r>
+            <a:r>
+              <a:rPr lang="ko-KR" altLang="en-US" sz="1500" dirty="0"/>
+              <a:t>에 </a:t>
+            </a:r>
+            <a:r>
+              <a:rPr lang="en-US" altLang="ko-KR" sz="1500" dirty="0"/>
+              <a:t>false</a:t>
+            </a:r>
+            <a:r>
+              <a:rPr lang="ko-KR" altLang="en-US" sz="1500" dirty="0"/>
+              <a:t>가 </a:t>
+            </a:r>
+            <a:r>
+              <a:rPr lang="en-US" altLang="ko-KR" sz="1500" dirty="0"/>
+              <a:t>return</a:t>
+            </a:r>
+            <a:r>
+              <a:rPr lang="ko-KR" altLang="en-US" sz="1500" dirty="0"/>
+              <a:t>되고</a:t>
+            </a:r>
+            <a:r>
+              <a:rPr lang="en-US" altLang="ko-KR" sz="1500" dirty="0"/>
+              <a:t>, </a:t>
+            </a:r>
+            <a:r>
+              <a:rPr lang="ko-KR" altLang="en-US" sz="1500" dirty="0"/>
+              <a:t>가격 계산 후</a:t>
+            </a:r>
+            <a:r>
+              <a:rPr lang="en-US" altLang="ko-KR" sz="1500" dirty="0"/>
+              <a:t>, </a:t>
+            </a:r>
+            <a:r>
+              <a:rPr lang="en-US" altLang="ko-KR" sz="1500" dirty="0" err="1"/>
+              <a:t>GreeksUtil.calculateGreeks</a:t>
+            </a:r>
+            <a:r>
+              <a:rPr lang="ko-KR" altLang="en-US" sz="1500" dirty="0"/>
+              <a:t>가 호출되지 않는다</a:t>
+            </a:r>
+            <a:r>
+              <a:rPr lang="en-US" altLang="ko-KR" sz="1500" dirty="0"/>
+              <a:t>.</a:t>
+            </a:r>
+          </a:p>
+          <a:p>
+            <a:r>
+              <a:rPr lang="en-US" altLang="ko-KR" sz="1500" dirty="0"/>
+              <a:t>Greek</a:t>
+            </a:r>
+            <a:r>
+              <a:rPr lang="ko-KR" altLang="en-US" sz="1500" dirty="0"/>
+              <a:t>이 추가된 </a:t>
+            </a:r>
+            <a:r>
+              <a:rPr lang="en-US" altLang="ko-KR" sz="1500" dirty="0"/>
               <a:t>output</a:t>
             </a:r>
             <a:r>
               <a:rPr lang="ko-KR" altLang="en-US" sz="1500" dirty="0"/>
-              <a:t>의 필드 </a:t>
-            </a:r>
-            <a:r>
-              <a:rPr lang="en-US" altLang="ko-KR" sz="1500" dirty="0" err="1"/>
-              <a:t>ErrorMessage</a:t>
-            </a:r>
-            <a:r>
-              <a:rPr lang="ko-KR" altLang="en-US" sz="1500" dirty="0"/>
-              <a:t>가 </a:t>
-            </a:r>
-            <a:r>
-              <a:rPr lang="ko-KR" altLang="en-US" sz="1500" dirty="0" err="1"/>
-              <a:t>세팅된다</a:t>
-            </a:r>
-            <a:r>
-              <a:rPr lang="en-US" altLang="ko-KR" sz="1500" dirty="0"/>
-              <a:t>.</a:t>
-            </a:r>
-          </a:p>
-          <a:p>
-            <a:r>
-              <a:rPr lang="en-US" altLang="ko-KR" sz="1500" dirty="0" err="1"/>
-              <a:t>BarrierOptionType</a:t>
-            </a:r>
-            <a:r>
-              <a:rPr lang="ko-KR" altLang="en-US" sz="1500" dirty="0"/>
-              <a:t>을 </a:t>
-            </a:r>
-            <a:r>
-              <a:rPr lang="en-US" altLang="ko-KR" sz="1500" dirty="0"/>
-              <a:t>String</a:t>
-            </a:r>
-            <a:r>
-              <a:rPr lang="ko-KR" altLang="en-US" sz="1500" dirty="0"/>
-              <a:t>형태로 </a:t>
+              <a:t>이 </a:t>
             </a:r>
             <a:r>
               <a:rPr lang="en-US" altLang="ko-KR" sz="1500" dirty="0"/>
               <a:t>return</a:t>
             </a:r>
-            <a:r>
-              <a:rPr lang="ko-KR" altLang="en-US" sz="1500" dirty="0"/>
-              <a:t>하는 메소드</a:t>
-            </a:r>
+          </a:p>
+          <a:p>
+            <a:r>
+              <a:rPr lang="en-US" altLang="ko-KR" sz="1500" dirty="0"/>
+              <a:t>Output xml</a:t>
+            </a:r>
+            <a:r>
+              <a:rPr lang="ko-KR" altLang="en-US" sz="1500" dirty="0"/>
+              <a:t>형태로 변환</a:t>
+            </a:r>
+            <a:r>
+              <a:rPr lang="en-US" altLang="ko-KR" sz="1500" dirty="0"/>
+              <a:t>(marshal)</a:t>
+            </a:r>
+            <a:r>
+              <a:rPr lang="ko-KR" altLang="en-US" sz="1500" dirty="0"/>
+              <a:t>하고 파일 만들어서 </a:t>
+            </a:r>
+            <a:r>
+              <a:rPr lang="en-US" altLang="ko-KR" sz="1500" dirty="0"/>
+              <a:t>return</a:t>
+            </a:r>
+          </a:p>
+          <a:p>
+            <a:pPr marL="0" indent="0">
+              <a:buNone/>
+            </a:pPr>
+            <a:endParaRPr lang="en-US" altLang="ko-KR" sz="1500" dirty="0"/>
+          </a:p>
+          <a:p>
+            <a:pPr marL="0" indent="0">
+              <a:buNone/>
+            </a:pPr>
+            <a:endParaRPr lang="ko-KR" altLang="en-US" sz="1500" dirty="0"/>
           </a:p>
         </p:txBody>
       </p:sp>
     </p:spTree>
     <p:extLst>
       <p:ext uri="{BB962C8B-B14F-4D97-AF65-F5344CB8AC3E}">
-        <p14:creationId xmlns:p14="http://schemas.microsoft.com/office/powerpoint/2010/main" val="3802589177"/>
+        <p14:creationId xmlns:p14="http://schemas.microsoft.com/office/powerpoint/2010/main" val="416272471"/>
       </p:ext>
     </p:extLst>
   </p:cSld>
@@ -3878,6 +6243,212 @@
           <p:cNvPr id="2" name="제목 1">
             <a:extLst>
               <a:ext uri="{FF2B5EF4-FFF2-40B4-BE49-F238E27FC236}">
+                <a16:creationId xmlns:a16="http://schemas.microsoft.com/office/drawing/2014/main" id="{8439FA86-5439-D260-CA08-C0E3B6F36900}"/>
+              </a:ext>
+            </a:extLst>
+          </p:cNvPr>
+          <p:cNvSpPr>
+            <a:spLocks noGrp="1"/>
+          </p:cNvSpPr>
+          <p:nvPr>
+            <p:ph type="title"/>
+          </p:nvPr>
+        </p:nvSpPr>
+        <p:spPr/>
+        <p:txBody>
+          <a:bodyPr>
+            <a:normAutofit/>
+          </a:bodyPr>
+          <a:lstStyle/>
+          <a:p>
+            <a:r>
+              <a:rPr lang="ko-KR" altLang="en-US" sz="3000" dirty="0"/>
+              <a:t>추상 팩토리 패턴</a:t>
+            </a:r>
+          </a:p>
+        </p:txBody>
+      </p:sp>
+      <p:sp>
+        <p:nvSpPr>
+          <p:cNvPr id="3" name="내용 개체 틀 2">
+            <a:extLst>
+              <a:ext uri="{FF2B5EF4-FFF2-40B4-BE49-F238E27FC236}">
+                <a16:creationId xmlns:a16="http://schemas.microsoft.com/office/drawing/2014/main" id="{7A6EF342-1DE9-8B5F-76D4-EFA5127576B7}"/>
+              </a:ext>
+            </a:extLst>
+          </p:cNvPr>
+          <p:cNvSpPr>
+            <a:spLocks noGrp="1"/>
+          </p:cNvSpPr>
+          <p:nvPr>
+            <p:ph idx="1"/>
+          </p:nvPr>
+        </p:nvSpPr>
+        <p:spPr/>
+        <p:txBody>
+          <a:bodyPr>
+            <a:normAutofit/>
+          </a:bodyPr>
+          <a:lstStyle/>
+          <a:p>
+            <a:r>
+              <a:rPr lang="en-US" altLang="ko-KR" sz="1500" dirty="0"/>
+              <a:t>Dividend</a:t>
+            </a:r>
+            <a:r>
+              <a:rPr lang="ko-KR" altLang="en-US" sz="1500" dirty="0"/>
+              <a:t>을 계산에 사용할 지 여부를 결정하는 </a:t>
+            </a:r>
+            <a:r>
+              <a:rPr lang="en-US" altLang="ko-KR" sz="1500" dirty="0"/>
+              <a:t>USE_DIVIDEND (</a:t>
+            </a:r>
+            <a:r>
+              <a:rPr lang="ko-KR" altLang="en-US" sz="1500" dirty="0"/>
+              <a:t>이거 </a:t>
+            </a:r>
+            <a:r>
+              <a:rPr lang="en-US" altLang="ko-KR" sz="1500" dirty="0"/>
+              <a:t>final</a:t>
+            </a:r>
+            <a:r>
+              <a:rPr lang="ko-KR" altLang="en-US" sz="1500" dirty="0"/>
+              <a:t>로 </a:t>
+            </a:r>
+            <a:r>
+              <a:rPr lang="ko-KR" altLang="en-US" sz="1500" dirty="0" err="1"/>
+              <a:t>되서</a:t>
+            </a:r>
+            <a:r>
+              <a:rPr lang="ko-KR" altLang="en-US" sz="1500" dirty="0"/>
+              <a:t> 바뀔 수 없게 </a:t>
+            </a:r>
+            <a:r>
+              <a:rPr lang="ko-KR" altLang="en-US" sz="1500" dirty="0" err="1"/>
+              <a:t>되있는</a:t>
+            </a:r>
+            <a:r>
+              <a:rPr lang="ko-KR" altLang="en-US" sz="1500" dirty="0"/>
+              <a:t> 데 이유</a:t>
+            </a:r>
+            <a:r>
+              <a:rPr lang="en-US" altLang="ko-KR" sz="1500" dirty="0"/>
+              <a:t>?)</a:t>
+            </a:r>
+          </a:p>
+          <a:p>
+            <a:r>
+              <a:rPr lang="en-US" altLang="ko-KR" sz="1500" dirty="0"/>
+              <a:t>Calculate </a:t>
+            </a:r>
+            <a:r>
+              <a:rPr lang="ko-KR" altLang="en-US" sz="1500" dirty="0"/>
+              <a:t>메소드가 오버 라이딩 되지 않을 시에</a:t>
+            </a:r>
+            <a:r>
+              <a:rPr lang="en-US" altLang="ko-KR" sz="1500" dirty="0"/>
+              <a:t>, </a:t>
+            </a:r>
+            <a:r>
+              <a:rPr lang="en-US" altLang="ko-KR" sz="1500" dirty="0" err="1"/>
+              <a:t>CalculationOutput</a:t>
+            </a:r>
+            <a:r>
+              <a:rPr lang="en-US" altLang="ko-KR" sz="1500" dirty="0"/>
+              <a:t> class type</a:t>
+            </a:r>
+            <a:r>
+              <a:rPr lang="ko-KR" altLang="en-US" sz="1500" dirty="0"/>
+              <a:t>의 </a:t>
+            </a:r>
+            <a:r>
+              <a:rPr lang="en-US" altLang="ko-KR" sz="1500" dirty="0"/>
+              <a:t>output</a:t>
+            </a:r>
+            <a:r>
+              <a:rPr lang="ko-KR" altLang="en-US" sz="1500" dirty="0"/>
+              <a:t>의 필드 </a:t>
+            </a:r>
+            <a:r>
+              <a:rPr lang="en-US" altLang="ko-KR" sz="1500" dirty="0" err="1"/>
+              <a:t>ErrorMessage</a:t>
+            </a:r>
+            <a:r>
+              <a:rPr lang="ko-KR" altLang="en-US" sz="1500" dirty="0"/>
+              <a:t>가 </a:t>
+            </a:r>
+            <a:r>
+              <a:rPr lang="ko-KR" altLang="en-US" sz="1500" dirty="0" err="1"/>
+              <a:t>세팅된다</a:t>
+            </a:r>
+            <a:r>
+              <a:rPr lang="en-US" altLang="ko-KR" sz="1500" dirty="0"/>
+              <a:t>.</a:t>
+            </a:r>
+          </a:p>
+          <a:p>
+            <a:r>
+              <a:rPr lang="en-US" altLang="ko-KR" sz="1500" dirty="0" err="1"/>
+              <a:t>BarrierOptionType</a:t>
+            </a:r>
+            <a:r>
+              <a:rPr lang="ko-KR" altLang="en-US" sz="1500" dirty="0"/>
+              <a:t>을 </a:t>
+            </a:r>
+            <a:r>
+              <a:rPr lang="en-US" altLang="ko-KR" sz="1500" dirty="0"/>
+              <a:t>String</a:t>
+            </a:r>
+            <a:r>
+              <a:rPr lang="ko-KR" altLang="en-US" sz="1500" dirty="0"/>
+              <a:t>형태로 </a:t>
+            </a:r>
+            <a:r>
+              <a:rPr lang="en-US" altLang="ko-KR" sz="1500" dirty="0"/>
+              <a:t>return</a:t>
+            </a:r>
+            <a:r>
+              <a:rPr lang="ko-KR" altLang="en-US" sz="1500" dirty="0"/>
+              <a:t>하는 메소드</a:t>
+            </a:r>
+          </a:p>
+        </p:txBody>
+      </p:sp>
+    </p:spTree>
+    <p:extLst>
+      <p:ext uri="{BB962C8B-B14F-4D97-AF65-F5344CB8AC3E}">
+        <p14:creationId xmlns:p14="http://schemas.microsoft.com/office/powerpoint/2010/main" val="3802589177"/>
+      </p:ext>
+    </p:extLst>
+  </p:cSld>
+  <p:clrMapOvr>
+    <a:masterClrMapping/>
+  </p:clrMapOvr>
+</p:sld>
+</file>
+
+<file path=ppt/slides/slide5.xml><?xml version="1.0" encoding="utf-8"?>
+<p:sld xmlns:a="http://schemas.openxmlformats.org/drawingml/2006/main" xmlns:r="http://schemas.openxmlformats.org/officeDocument/2006/relationships" xmlns:p="http://schemas.openxmlformats.org/presentationml/2006/main">
+  <p:cSld>
+    <p:spTree>
+      <p:nvGrpSpPr>
+        <p:cNvPr id="1" name=""/>
+        <p:cNvGrpSpPr/>
+        <p:nvPr/>
+      </p:nvGrpSpPr>
+      <p:grpSpPr>
+        <a:xfrm>
+          <a:off x="0" y="0"/>
+          <a:ext cx="0" cy="0"/>
+          <a:chOff x="0" y="0"/>
+          <a:chExt cx="0" cy="0"/>
+        </a:xfrm>
+      </p:grpSpPr>
+      <p:sp>
+        <p:nvSpPr>
+          <p:cNvPr id="2" name="제목 1">
+            <a:extLst>
+              <a:ext uri="{FF2B5EF4-FFF2-40B4-BE49-F238E27FC236}">
                 <a16:creationId xmlns:a16="http://schemas.microsoft.com/office/drawing/2014/main" id="{9ECF9E28-3913-A75A-F973-95CFBD481E45}"/>
               </a:ext>
             </a:extLst>
@@ -4271,7 +6842,7 @@
 </p:sld>
 </file>
 
-<file path=ppt/slides/slide5.xml><?xml version="1.0" encoding="utf-8"?>
+<file path=ppt/slides/slide6.xml><?xml version="1.0" encoding="utf-8"?>
 <p:sld xmlns:a="http://schemas.openxmlformats.org/drawingml/2006/main" xmlns:r="http://schemas.openxmlformats.org/officeDocument/2006/relationships" xmlns:p="http://schemas.openxmlformats.org/presentationml/2006/main">
   <p:cSld>
     <p:spTree>
@@ -4539,223 +7110,6 @@
 </p:sld>
 </file>
 
-<file path=ppt/slides/slide6.xml><?xml version="1.0" encoding="utf-8"?>
-<p:sld xmlns:a="http://schemas.openxmlformats.org/drawingml/2006/main" xmlns:r="http://schemas.openxmlformats.org/officeDocument/2006/relationships" xmlns:p="http://schemas.openxmlformats.org/presentationml/2006/main">
-  <p:cSld>
-    <p:spTree>
-      <p:nvGrpSpPr>
-        <p:cNvPr id="1" name=""/>
-        <p:cNvGrpSpPr/>
-        <p:nvPr/>
-      </p:nvGrpSpPr>
-      <p:grpSpPr>
-        <a:xfrm>
-          <a:off x="0" y="0"/>
-          <a:ext cx="0" cy="0"/>
-          <a:chOff x="0" y="0"/>
-          <a:chExt cx="0" cy="0"/>
-        </a:xfrm>
-      </p:grpSpPr>
-      <p:sp>
-        <p:nvSpPr>
-          <p:cNvPr id="2" name="제목 1">
-            <a:extLst>
-              <a:ext uri="{FF2B5EF4-FFF2-40B4-BE49-F238E27FC236}">
-                <a16:creationId xmlns:a16="http://schemas.microsoft.com/office/drawing/2014/main" id="{C77CE1BC-0D52-7969-39CE-31357A258949}"/>
-              </a:ext>
-            </a:extLst>
-          </p:cNvPr>
-          <p:cNvSpPr>
-            <a:spLocks noGrp="1"/>
-          </p:cNvSpPr>
-          <p:nvPr>
-            <p:ph type="title"/>
-          </p:nvPr>
-        </p:nvSpPr>
-        <p:spPr/>
-        <p:txBody>
-          <a:bodyPr>
-            <a:normAutofit/>
-          </a:bodyPr>
-          <a:lstStyle/>
-          <a:p>
-            <a:r>
-              <a:rPr lang="en-US" altLang="ko-KR" sz="3000" dirty="0" err="1"/>
-              <a:t>InputFileReader</a:t>
-            </a:r>
-            <a:r>
-              <a:rPr lang="en-US" altLang="ko-KR" sz="3000" dirty="0"/>
-              <a:t>(util)</a:t>
-            </a:r>
-            <a:endParaRPr lang="ko-KR" altLang="en-US" sz="3000" dirty="0"/>
-          </a:p>
-        </p:txBody>
-      </p:sp>
-      <p:sp>
-        <p:nvSpPr>
-          <p:cNvPr id="3" name="내용 개체 틀 2">
-            <a:extLst>
-              <a:ext uri="{FF2B5EF4-FFF2-40B4-BE49-F238E27FC236}">
-                <a16:creationId xmlns:a16="http://schemas.microsoft.com/office/drawing/2014/main" id="{8DAA5F34-3377-E313-E26F-CA64E466CC07}"/>
-              </a:ext>
-            </a:extLst>
-          </p:cNvPr>
-          <p:cNvSpPr>
-            <a:spLocks noGrp="1"/>
-          </p:cNvSpPr>
-          <p:nvPr>
-            <p:ph idx="1"/>
-          </p:nvPr>
-        </p:nvSpPr>
-        <p:spPr/>
-        <p:txBody>
-          <a:bodyPr>
-            <a:normAutofit/>
-          </a:bodyPr>
-          <a:lstStyle/>
-          <a:p>
-            <a:r>
-              <a:rPr lang="en-US" altLang="ko-KR" sz="1500" dirty="0"/>
-              <a:t>Property: </a:t>
-            </a:r>
-            <a:r>
-              <a:rPr lang="en-US" altLang="ko-KR" sz="1500" dirty="0" err="1"/>
-              <a:t>rootDir</a:t>
-            </a:r>
-            <a:r>
-              <a:rPr lang="en-US" altLang="ko-KR" sz="1500" dirty="0"/>
-              <a:t> (String);</a:t>
-            </a:r>
-          </a:p>
-          <a:p>
-            <a:r>
-              <a:rPr lang="en-US" altLang="ko-KR" sz="1500" dirty="0"/>
-              <a:t>Setter:</a:t>
-            </a:r>
-            <a:r>
-              <a:rPr lang="ko-KR" altLang="en-US" sz="1500" dirty="0"/>
-              <a:t> </a:t>
-            </a:r>
-            <a:r>
-              <a:rPr lang="en-US" altLang="ko-KR" sz="1500" dirty="0" err="1"/>
-              <a:t>rootDir</a:t>
-            </a:r>
-            <a:endParaRPr lang="en-US" altLang="ko-KR" sz="1500" dirty="0"/>
-          </a:p>
-          <a:p>
-            <a:r>
-              <a:rPr lang="en-US" altLang="ko-KR" sz="1500" dirty="0"/>
-              <a:t>Method </a:t>
-            </a:r>
-            <a:r>
-              <a:rPr lang="en-US" altLang="ko-KR" sz="1500" dirty="0" err="1"/>
-              <a:t>readInputXml</a:t>
-            </a:r>
-            <a:endParaRPr lang="en-US" altLang="ko-KR" sz="1500" dirty="0"/>
-          </a:p>
-          <a:p>
-            <a:pPr marL="0" indent="0">
-              <a:buNone/>
-            </a:pPr>
-            <a:r>
-              <a:rPr lang="en-US" altLang="ko-KR" sz="1500" dirty="0"/>
-              <a:t>Param: </a:t>
-            </a:r>
-            <a:r>
-              <a:rPr lang="en-US" altLang="ko-KR" sz="1500" dirty="0" err="1"/>
-              <a:t>inputFileName</a:t>
-            </a:r>
-            <a:r>
-              <a:rPr lang="en-US" altLang="ko-KR" sz="1500" dirty="0"/>
-              <a:t>(String)</a:t>
-            </a:r>
-          </a:p>
-          <a:p>
-            <a:pPr marL="0" indent="0">
-              <a:buNone/>
-            </a:pPr>
-            <a:r>
-              <a:rPr lang="en-US" altLang="ko-KR" sz="1500" dirty="0"/>
-              <a:t>Return: String</a:t>
-            </a:r>
-          </a:p>
-          <a:p>
-            <a:pPr marL="0" indent="0">
-              <a:buNone/>
-            </a:pPr>
-            <a:r>
-              <a:rPr lang="en-US" altLang="ko-KR" sz="1500" dirty="0" err="1"/>
-              <a:t>inputFile</a:t>
-            </a:r>
-            <a:r>
-              <a:rPr lang="ko-KR" altLang="en-US" sz="1500" dirty="0"/>
-              <a:t>의 내용을 </a:t>
-            </a:r>
-            <a:r>
-              <a:rPr lang="ko-KR" altLang="en-US" sz="1500" dirty="0" err="1"/>
-              <a:t>한줄</a:t>
-            </a:r>
-            <a:r>
-              <a:rPr lang="ko-KR" altLang="en-US" sz="1500" dirty="0"/>
-              <a:t> </a:t>
-            </a:r>
-            <a:r>
-              <a:rPr lang="ko-KR" altLang="en-US" sz="1500" dirty="0" err="1"/>
-              <a:t>한줄</a:t>
-            </a:r>
-            <a:r>
-              <a:rPr lang="ko-KR" altLang="en-US" sz="1500" dirty="0"/>
-              <a:t> 읽어서</a:t>
-            </a:r>
-            <a:r>
-              <a:rPr lang="en-US" altLang="ko-KR" sz="1500" dirty="0"/>
-              <a:t>, </a:t>
-            </a:r>
-            <a:r>
-              <a:rPr lang="ko-KR" altLang="en-US" sz="1500" dirty="0" err="1"/>
-              <a:t>한줄</a:t>
-            </a:r>
-            <a:r>
-              <a:rPr lang="ko-KR" altLang="en-US" sz="1500" dirty="0"/>
-              <a:t> </a:t>
-            </a:r>
-            <a:r>
-              <a:rPr lang="ko-KR" altLang="en-US" sz="1500" dirty="0" err="1"/>
-              <a:t>한줄</a:t>
-            </a:r>
-            <a:r>
-              <a:rPr lang="ko-KR" altLang="en-US" sz="1500" dirty="0"/>
-              <a:t> 분리된 </a:t>
-            </a:r>
-            <a:r>
-              <a:rPr lang="en-US" altLang="ko-KR" sz="1500" dirty="0"/>
-              <a:t>String</a:t>
-            </a:r>
-            <a:r>
-              <a:rPr lang="ko-KR" altLang="en-US" sz="1500" dirty="0"/>
-              <a:t>으로 반환한다</a:t>
-            </a:r>
-            <a:r>
-              <a:rPr lang="en-US" altLang="ko-KR" sz="1500" dirty="0"/>
-              <a:t>.</a:t>
-            </a:r>
-            <a:endParaRPr lang="ko-KR" altLang="en-US" sz="1500" dirty="0"/>
-          </a:p>
-        </p:txBody>
-      </p:sp>
-    </p:spTree>
-    <p:extLst>
-      <p:ext uri="{BB962C8B-B14F-4D97-AF65-F5344CB8AC3E}">
-        <p14:creationId xmlns:p14="http://schemas.microsoft.com/office/powerpoint/2010/main" val="3899642307"/>
-      </p:ext>
-    </p:extLst>
-  </p:cSld>
-  <p:clrMapOvr>
-    <a:masterClrMapping/>
-  </p:clrMapOvr>
-</p:sld>
-</file>
-
 <file path=ppt/slides/slide7.xml><?xml version="1.0" encoding="utf-8"?>
 <p:sld xmlns:a="http://schemas.openxmlformats.org/drawingml/2006/main" xmlns:r="http://schemas.openxmlformats.org/officeDocument/2006/relationships" xmlns:p="http://schemas.openxmlformats.org/presentationml/2006/main">
   <p:cSld>
@@ -4778,7 +7132,7 @@
           <p:cNvPr id="2" name="제목 1">
             <a:extLst>
               <a:ext uri="{FF2B5EF4-FFF2-40B4-BE49-F238E27FC236}">
-                <a16:creationId xmlns:a16="http://schemas.microsoft.com/office/drawing/2014/main" id="{C95F2C8A-CB3C-DF58-3AD3-06548E533F39}"/>
+                <a16:creationId xmlns:a16="http://schemas.microsoft.com/office/drawing/2014/main" id="{C77CE1BC-0D52-7969-39CE-31357A258949}"/>
               </a:ext>
             </a:extLst>
           </p:cNvPr>
@@ -4798,7 +7152,7 @@
           <a:p>
             <a:r>
               <a:rPr lang="en-US" altLang="ko-KR" sz="3000" dirty="0" err="1"/>
-              <a:t>OutputFileWriter</a:t>
+              <a:t>InputFileReader</a:t>
             </a:r>
             <a:r>
               <a:rPr lang="en-US" altLang="ko-KR" sz="3000" dirty="0"/>
@@ -4813,7 +7167,7 @@
           <p:cNvPr id="3" name="내용 개체 틀 2">
             <a:extLst>
               <a:ext uri="{FF2B5EF4-FFF2-40B4-BE49-F238E27FC236}">
-                <a16:creationId xmlns:a16="http://schemas.microsoft.com/office/drawing/2014/main" id="{91A39B4F-C53A-956B-82FA-B68D78A634C7}"/>
+                <a16:creationId xmlns:a16="http://schemas.microsoft.com/office/drawing/2014/main" id="{8DAA5F34-3377-E313-E26F-CA64E466CC07}"/>
               </a:ext>
             </a:extLst>
           </p:cNvPr>
@@ -4841,64 +7195,129 @@
             </a:r>
             <a:r>
               <a:rPr lang="en-US" altLang="ko-KR" sz="1500" dirty="0"/>
+              <a:t> (String);</a:t>
+            </a:r>
+          </a:p>
+          <a:p>
+            <a:r>
+              <a:rPr lang="en-US" altLang="ko-KR" sz="1500" dirty="0"/>
+              <a:t>Setter:</a:t>
+            </a:r>
+            <a:r>
+              <a:rPr lang="ko-KR" altLang="en-US" sz="1500" dirty="0"/>
+              <a:t> </a:t>
+            </a:r>
+            <a:r>
+              <a:rPr lang="en-US" altLang="ko-KR" sz="1500" dirty="0" err="1"/>
+              <a:t>rootDir</a:t>
+            </a:r>
+            <a:endParaRPr lang="en-US" altLang="ko-KR" sz="1500" dirty="0"/>
+          </a:p>
+          <a:p>
+            <a:r>
+              <a:rPr lang="en-US" altLang="ko-KR" sz="1500" dirty="0"/>
+              <a:t>Method </a:t>
+            </a:r>
+            <a:r>
+              <a:rPr lang="en-US" altLang="ko-KR" sz="1500" dirty="0" err="1"/>
+              <a:t>readInputXml</a:t>
+            </a:r>
+            <a:endParaRPr lang="en-US" altLang="ko-KR" sz="1500" dirty="0"/>
+          </a:p>
+          <a:p>
+            <a:pPr marL="0" indent="0">
+              <a:buNone/>
+            </a:pPr>
+            <a:r>
+              <a:rPr lang="en-US" altLang="ko-KR" sz="1500" dirty="0"/>
+              <a:t>Param: </a:t>
+            </a:r>
+            <a:r>
+              <a:rPr lang="en-US" altLang="ko-KR" sz="1500" dirty="0" err="1"/>
+              <a:t>inputFileName</a:t>
+            </a:r>
+            <a:r>
+              <a:rPr lang="en-US" altLang="ko-KR" sz="1500" dirty="0"/>
               <a:t>(String)</a:t>
             </a:r>
           </a:p>
           <a:p>
-            <a:r>
-              <a:rPr lang="en-US" altLang="ko-KR" sz="1500" dirty="0"/>
-              <a:t>Setter</a:t>
-            </a:r>
-          </a:p>
-          <a:p>
-            <a:r>
-              <a:rPr lang="en-US" altLang="ko-KR" sz="1500" dirty="0"/>
-              <a:t>Method: </a:t>
-            </a:r>
+            <a:pPr marL="0" indent="0">
+              <a:buNone/>
+            </a:pPr>
+            <a:r>
+              <a:rPr lang="en-US" altLang="ko-KR" sz="1500" dirty="0"/>
+              <a:t>Return: String</a:t>
+            </a:r>
+          </a:p>
+          <a:p>
+            <a:pPr marL="0" indent="0">
+              <a:buNone/>
+            </a:pPr>
             <a:r>
               <a:rPr lang="en-US" altLang="ko-KR" sz="1500" dirty="0" err="1"/>
-              <a:t>writeOutputFile</a:t>
-            </a:r>
-            <a:endParaRPr lang="en-US" altLang="ko-KR" sz="1500" dirty="0"/>
-          </a:p>
-          <a:p>
-            <a:pPr marL="0" indent="0">
-              <a:buNone/>
-            </a:pPr>
-            <a:r>
-              <a:rPr lang="en-US" altLang="ko-KR" sz="1500" dirty="0"/>
-              <a:t>Param: </a:t>
-            </a:r>
-            <a:r>
-              <a:rPr lang="en-US" altLang="ko-KR" sz="1500" dirty="0" err="1"/>
-              <a:t>fileName</a:t>
-            </a:r>
-            <a:r>
-              <a:rPr lang="en-US" altLang="ko-KR" sz="1500" dirty="0"/>
-              <a:t>, output</a:t>
-            </a:r>
-          </a:p>
-          <a:p>
-            <a:pPr marL="0" indent="0">
-              <a:buNone/>
-            </a:pPr>
-            <a:r>
-              <a:rPr lang="en-US" altLang="ko-KR" sz="1500" dirty="0"/>
-              <a:t>Return: void</a:t>
-            </a:r>
-          </a:p>
-          <a:p>
-            <a:pPr marL="0" indent="0">
-              <a:buNone/>
-            </a:pPr>
-            <a:endParaRPr lang="en-US" altLang="ko-KR" sz="1500" dirty="0"/>
+              <a:t>inputFile</a:t>
+            </a:r>
+            <a:r>
+              <a:rPr lang="ko-KR" altLang="en-US" sz="1500" dirty="0"/>
+              <a:t>의 내용을 </a:t>
+            </a:r>
+            <a:r>
+              <a:rPr lang="ko-KR" altLang="en-US" sz="1500" dirty="0" err="1"/>
+              <a:t>한줄</a:t>
+            </a:r>
+            <a:r>
+              <a:rPr lang="ko-KR" altLang="en-US" sz="1500" dirty="0"/>
+              <a:t> </a:t>
+            </a:r>
+            <a:r>
+              <a:rPr lang="ko-KR" altLang="en-US" sz="1500" dirty="0" err="1"/>
+              <a:t>한줄</a:t>
+            </a:r>
+            <a:r>
+              <a:rPr lang="ko-KR" altLang="en-US" sz="1500" dirty="0"/>
+              <a:t> 읽어서</a:t>
+            </a:r>
+            <a:r>
+              <a:rPr lang="en-US" altLang="ko-KR" sz="1500" dirty="0"/>
+              <a:t>, </a:t>
+            </a:r>
+            <a:r>
+              <a:rPr lang="ko-KR" altLang="en-US" sz="1500" dirty="0" err="1"/>
+              <a:t>한줄</a:t>
+            </a:r>
+            <a:r>
+              <a:rPr lang="ko-KR" altLang="en-US" sz="1500" dirty="0"/>
+              <a:t> </a:t>
+            </a:r>
+            <a:r>
+              <a:rPr lang="ko-KR" altLang="en-US" sz="1500" dirty="0" err="1"/>
+              <a:t>한줄</a:t>
+            </a:r>
+            <a:r>
+              <a:rPr lang="ko-KR" altLang="en-US" sz="1500" dirty="0"/>
+              <a:t> 분리된 </a:t>
+            </a:r>
+            <a:r>
+              <a:rPr lang="en-US" altLang="ko-KR" sz="1500" dirty="0"/>
+              <a:t>String</a:t>
+            </a:r>
+            <a:r>
+              <a:rPr lang="ko-KR" altLang="en-US" sz="1500" dirty="0"/>
+              <a:t>으로 반환한다</a:t>
+            </a:r>
+            <a:r>
+              <a:rPr lang="en-US" altLang="ko-KR" sz="1500" dirty="0"/>
+              <a:t>.</a:t>
+            </a:r>
+            <a:endParaRPr lang="ko-KR" altLang="en-US" sz="1500" dirty="0"/>
           </a:p>
         </p:txBody>
       </p:sp>
     </p:spTree>
     <p:extLst>
       <p:ext uri="{BB962C8B-B14F-4D97-AF65-F5344CB8AC3E}">
-        <p14:creationId xmlns:p14="http://schemas.microsoft.com/office/powerpoint/2010/main" val="2426211500"/>
+        <p14:creationId xmlns:p14="http://schemas.microsoft.com/office/powerpoint/2010/main" val="3899642307"/>
       </p:ext>
     </p:extLst>
   </p:cSld>
@@ -4930,7 +7349,7 @@
           <p:cNvPr id="2" name="제목 1">
             <a:extLst>
               <a:ext uri="{FF2B5EF4-FFF2-40B4-BE49-F238E27FC236}">
-                <a16:creationId xmlns:a16="http://schemas.microsoft.com/office/drawing/2014/main" id="{8E188620-67AE-FE17-585C-7A357204D7CA}"/>
+                <a16:creationId xmlns:a16="http://schemas.microsoft.com/office/drawing/2014/main" id="{C95F2C8A-CB3C-DF58-3AD3-06548E533F39}"/>
               </a:ext>
             </a:extLst>
           </p:cNvPr>
@@ -4950,11 +7369,11 @@
           <a:p>
             <a:r>
               <a:rPr lang="en-US" altLang="ko-KR" sz="3000" dirty="0" err="1"/>
-              <a:t>XmlUtil</a:t>
+              <a:t>OutputFileWriter</a:t>
             </a:r>
             <a:r>
               <a:rPr lang="en-US" altLang="ko-KR" sz="3000" dirty="0"/>
-              <a:t>(Util)</a:t>
+              <a:t>(util)</a:t>
             </a:r>
             <a:endParaRPr lang="ko-KR" altLang="en-US" sz="3000" dirty="0"/>
           </a:p>
@@ -4965,7 +7384,7 @@
           <p:cNvPr id="3" name="내용 개체 틀 2">
             <a:extLst>
               <a:ext uri="{FF2B5EF4-FFF2-40B4-BE49-F238E27FC236}">
-                <a16:creationId xmlns:a16="http://schemas.microsoft.com/office/drawing/2014/main" id="{B4A8ACBC-092A-DFE7-4235-5728CA4B2F1D}"/>
+                <a16:creationId xmlns:a16="http://schemas.microsoft.com/office/drawing/2014/main" id="{91A39B4F-C53A-956B-82FA-B68D78A634C7}"/>
               </a:ext>
             </a:extLst>
           </p:cNvPr>
@@ -4984,59 +7403,73 @@
           <a:lstStyle/>
           <a:p>
             <a:r>
+              <a:rPr lang="en-US" altLang="ko-KR" sz="1500" dirty="0"/>
+              <a:t>Property: </a:t>
+            </a:r>
+            <a:r>
               <a:rPr lang="en-US" altLang="ko-KR" sz="1500" dirty="0" err="1"/>
-              <a:t>Unmarshal</a:t>
-            </a:r>
-            <a:r>
-              <a:rPr lang="en-US" altLang="ko-KR" sz="1500" dirty="0"/>
-              <a:t>: xml String &gt; </a:t>
+              <a:t>rootDir</a:t>
+            </a:r>
+            <a:r>
+              <a:rPr lang="en-US" altLang="ko-KR" sz="1500" dirty="0"/>
+              <a:t>(String)</a:t>
+            </a:r>
+          </a:p>
+          <a:p>
+            <a:r>
+              <a:rPr lang="en-US" altLang="ko-KR" sz="1500" dirty="0"/>
+              <a:t>Setter</a:t>
+            </a:r>
+          </a:p>
+          <a:p>
+            <a:r>
+              <a:rPr lang="en-US" altLang="ko-KR" sz="1500" dirty="0"/>
+              <a:t>Method: </a:t>
             </a:r>
             <a:r>
               <a:rPr lang="en-US" altLang="ko-KR" sz="1500" dirty="0" err="1"/>
-              <a:t>CalculationInput</a:t>
-            </a:r>
-            <a:r>
-              <a:rPr lang="en-US" altLang="ko-KR" sz="1500" dirty="0"/>
-              <a:t> </a:t>
-            </a:r>
-            <a:r>
-              <a:rPr lang="ko-KR" altLang="en-US" sz="1500" dirty="0"/>
-              <a:t>객체로 변환</a:t>
+              <a:t>writeOutputFile</a:t>
             </a:r>
             <a:endParaRPr lang="en-US" altLang="ko-KR" sz="1500" dirty="0"/>
           </a:p>
           <a:p>
-            <a:r>
-              <a:rPr lang="en-US" altLang="ko-KR" sz="1500" dirty="0"/>
-              <a:t>Marshal: </a:t>
+            <a:pPr marL="0" indent="0">
+              <a:buNone/>
+            </a:pPr>
+            <a:r>
+              <a:rPr lang="en-US" altLang="ko-KR" sz="1500" dirty="0"/>
+              <a:t>Param: </a:t>
             </a:r>
             <a:r>
               <a:rPr lang="en-US" altLang="ko-KR" sz="1500" dirty="0" err="1"/>
-              <a:t>CalculationOutput</a:t>
-            </a:r>
-            <a:r>
-              <a:rPr lang="en-US" altLang="ko-KR" sz="1500" dirty="0"/>
-              <a:t> </a:t>
-            </a:r>
-            <a:r>
-              <a:rPr lang="ko-KR" altLang="en-US" sz="1500" dirty="0"/>
-              <a:t>객체 </a:t>
-            </a:r>
-            <a:r>
-              <a:rPr lang="en-US" altLang="ko-KR" sz="1500" dirty="0"/>
-              <a:t>&gt; xml String</a:t>
-            </a:r>
-            <a:r>
-              <a:rPr lang="ko-KR" altLang="en-US" sz="1500" dirty="0"/>
-              <a:t>으로 변환</a:t>
-            </a:r>
+              <a:t>fileName</a:t>
+            </a:r>
+            <a:r>
+              <a:rPr lang="en-US" altLang="ko-KR" sz="1500" dirty="0"/>
+              <a:t>, output</a:t>
+            </a:r>
+          </a:p>
+          <a:p>
+            <a:pPr marL="0" indent="0">
+              <a:buNone/>
+            </a:pPr>
+            <a:r>
+              <a:rPr lang="en-US" altLang="ko-KR" sz="1500" dirty="0"/>
+              <a:t>Return: void</a:t>
+            </a:r>
+          </a:p>
+          <a:p>
+            <a:pPr marL="0" indent="0">
+              <a:buNone/>
+            </a:pPr>
+            <a:endParaRPr lang="en-US" altLang="ko-KR" sz="1500" dirty="0"/>
           </a:p>
         </p:txBody>
       </p:sp>
     </p:spTree>
     <p:extLst>
       <p:ext uri="{BB962C8B-B14F-4D97-AF65-F5344CB8AC3E}">
-        <p14:creationId xmlns:p14="http://schemas.microsoft.com/office/powerpoint/2010/main" val="3490411030"/>
+        <p14:creationId xmlns:p14="http://schemas.microsoft.com/office/powerpoint/2010/main" val="2426211500"/>
       </p:ext>
     </p:extLst>
   </p:cSld>
@@ -5068,7 +7501,7 @@
           <p:cNvPr id="2" name="제목 1">
             <a:extLst>
               <a:ext uri="{FF2B5EF4-FFF2-40B4-BE49-F238E27FC236}">
-                <a16:creationId xmlns:a16="http://schemas.microsoft.com/office/drawing/2014/main" id="{64C66E31-D752-FF76-3850-B5B266E75FB8}"/>
+                <a16:creationId xmlns:a16="http://schemas.microsoft.com/office/drawing/2014/main" id="{8E188620-67AE-FE17-585C-7A357204D7CA}"/>
               </a:ext>
             </a:extLst>
           </p:cNvPr>
@@ -5087,13 +7520,14 @@
           <a:lstStyle/>
           <a:p>
             <a:r>
+              <a:rPr lang="en-US" altLang="ko-KR" sz="3000" dirty="0" err="1"/>
+              <a:t>XmlUtil</a:t>
+            </a:r>
+            <a:r>
               <a:rPr lang="en-US" altLang="ko-KR" sz="3000" dirty="0"/>
-              <a:t>Calculator</a:t>
-            </a:r>
-            <a:r>
-              <a:rPr lang="ko-KR" altLang="en-US" sz="3000" dirty="0"/>
-              <a:t> 클래스</a:t>
-            </a:r>
+              <a:t>(Util)</a:t>
+            </a:r>
+            <a:endParaRPr lang="ko-KR" altLang="en-US" sz="3000" dirty="0"/>
           </a:p>
         </p:txBody>
       </p:sp>
@@ -5102,7 +7536,7 @@
           <p:cNvPr id="3" name="내용 개체 틀 2">
             <a:extLst>
               <a:ext uri="{FF2B5EF4-FFF2-40B4-BE49-F238E27FC236}">
-                <a16:creationId xmlns:a16="http://schemas.microsoft.com/office/drawing/2014/main" id="{45466457-5988-4896-0EEF-D1B8B24F377C}"/>
+                <a16:creationId xmlns:a16="http://schemas.microsoft.com/office/drawing/2014/main" id="{B4A8ACBC-092A-DFE7-4235-5728CA4B2F1D}"/>
               </a:ext>
             </a:extLst>
           </p:cNvPr>
@@ -5121,89 +7555,59 @@
           <a:lstStyle/>
           <a:p>
             <a:r>
-              <a:rPr lang="en-US" altLang="ko-KR" sz="1500" dirty="0"/>
-              <a:t>Calculate </a:t>
-            </a:r>
-            <a:r>
-              <a:rPr lang="ko-KR" altLang="en-US" sz="1500" dirty="0"/>
-              <a:t>메소드</a:t>
+              <a:rPr lang="en-US" altLang="ko-KR" sz="1500" dirty="0" err="1"/>
+              <a:t>Unmarshal</a:t>
+            </a:r>
+            <a:r>
+              <a:rPr lang="en-US" altLang="ko-KR" sz="1500" dirty="0"/>
+              <a:t>: xml String &gt; </a:t>
+            </a:r>
+            <a:r>
+              <a:rPr lang="en-US" altLang="ko-KR" sz="1500" dirty="0" err="1"/>
+              <a:t>CalculationInput</a:t>
+            </a:r>
+            <a:r>
+              <a:rPr lang="en-US" altLang="ko-KR" sz="1500" dirty="0"/>
+              <a:t> </a:t>
+            </a:r>
+            <a:r>
+              <a:rPr lang="ko-KR" altLang="en-US" sz="1500" dirty="0"/>
+              <a:t>객체로 변환</a:t>
             </a:r>
             <a:endParaRPr lang="en-US" altLang="ko-KR" sz="1500" dirty="0"/>
           </a:p>
           <a:p>
-            <a:pPr marL="0" indent="0">
-              <a:buNone/>
-            </a:pPr>
-            <a:r>
-              <a:rPr lang="en-US" altLang="ko-KR" sz="1500" dirty="0"/>
-              <a:t>Param: </a:t>
+            <a:r>
+              <a:rPr lang="en-US" altLang="ko-KR" sz="1500" dirty="0"/>
+              <a:t>Marshal: </a:t>
             </a:r>
             <a:r>
               <a:rPr lang="en-US" altLang="ko-KR" sz="1500" dirty="0" err="1"/>
-              <a:t>xmlPath</a:t>
-            </a:r>
-            <a:r>
-              <a:rPr lang="en-US" altLang="ko-KR" sz="1500" dirty="0"/>
-              <a:t> (xml data </a:t>
-            </a:r>
-            <a:r>
-              <a:rPr lang="ko-KR" altLang="en-US" sz="1500" dirty="0"/>
-              <a:t>받고</a:t>
-            </a:r>
-            <a:r>
-              <a:rPr lang="en-US" altLang="ko-KR" sz="1500" dirty="0"/>
-              <a:t>)</a:t>
-            </a:r>
-          </a:p>
-          <a:p>
-            <a:pPr marL="0" indent="0">
-              <a:buNone/>
-            </a:pPr>
-            <a:r>
-              <a:rPr lang="en-US" altLang="ko-KR" sz="1500" dirty="0"/>
-              <a:t>Return: void</a:t>
-            </a:r>
-          </a:p>
-          <a:p>
-            <a:pPr marL="0" indent="0">
-              <a:buNone/>
-            </a:pPr>
-            <a:r>
-              <a:rPr lang="en-US" altLang="ko-KR" sz="1500" dirty="0"/>
-              <a:t>Xml</a:t>
-            </a:r>
-            <a:r>
-              <a:rPr lang="ko-KR" altLang="en-US" sz="1500" dirty="0"/>
-              <a:t>형태의 </a:t>
-            </a:r>
-            <a:r>
-              <a:rPr lang="en-US" altLang="ko-KR" sz="1500" dirty="0"/>
-              <a:t>output</a:t>
-            </a:r>
-            <a:r>
-              <a:rPr lang="ko-KR" altLang="en-US" sz="1500" dirty="0"/>
-              <a:t>을 </a:t>
-            </a:r>
-            <a:r>
-              <a:rPr lang="en-US" altLang="ko-KR" sz="1500" dirty="0"/>
-              <a:t>xml input data</a:t>
-            </a:r>
-            <a:r>
-              <a:rPr lang="ko-KR" altLang="en-US" sz="1500" dirty="0"/>
-              <a:t>와 같은 위치에 생성해줌</a:t>
-            </a:r>
-            <a:r>
-              <a:rPr lang="en-US" altLang="ko-KR" sz="1500"/>
-              <a:t>.</a:t>
-            </a:r>
-            <a:endParaRPr lang="ko-KR" altLang="en-US" sz="1500" dirty="0"/>
+              <a:t>CalculationOutput</a:t>
+            </a:r>
+            <a:r>
+              <a:rPr lang="en-US" altLang="ko-KR" sz="1500" dirty="0"/>
+              <a:t> </a:t>
+            </a:r>
+            <a:r>
+              <a:rPr lang="ko-KR" altLang="en-US" sz="1500" dirty="0"/>
+              <a:t>객체 </a:t>
+            </a:r>
+            <a:r>
+              <a:rPr lang="en-US" altLang="ko-KR" sz="1500" dirty="0"/>
+              <a:t>&gt; xml String</a:t>
+            </a:r>
+            <a:r>
+              <a:rPr lang="ko-KR" altLang="en-US" sz="1500" dirty="0"/>
+              <a:t>으로 변환</a:t>
+            </a:r>
           </a:p>
         </p:txBody>
       </p:sp>
     </p:spTree>
     <p:extLst>
       <p:ext uri="{BB962C8B-B14F-4D97-AF65-F5344CB8AC3E}">
-        <p14:creationId xmlns:p14="http://schemas.microsoft.com/office/powerpoint/2010/main" val="2222338400"/>
+        <p14:creationId xmlns:p14="http://schemas.microsoft.com/office/powerpoint/2010/main" val="3490411030"/>
       </p:ext>
     </p:extLst>
   </p:cSld>

</xml_diff>